<commit_message>
HP added week 7 media
</commit_message>
<xml_diff>
--- a/Week_7_lists_and_testing_code/Seminar_4_scope_and_memory/seminar_scope_and_memory.pptx
+++ b/Week_7_lists_and_testing_code/Seminar_4_scope_and_memory/seminar_scope_and_memory.pptx
@@ -5,7 +5,7 @@
     <p:sldMasterId id="2147483648" r:id="rId1"/>
   </p:sldMasterIdLst>
   <p:notesMasterIdLst>
-    <p:notesMasterId r:id="rId9"/>
+    <p:notesMasterId r:id="rId11"/>
   </p:notesMasterIdLst>
   <p:sldIdLst>
     <p:sldId id="256" r:id="rId2"/>
@@ -14,7 +14,9 @@
     <p:sldId id="259" r:id="rId5"/>
     <p:sldId id="260" r:id="rId6"/>
     <p:sldId id="261" r:id="rId7"/>
-    <p:sldId id="262" r:id="rId8"/>
+    <p:sldId id="263" r:id="rId8"/>
+    <p:sldId id="262" r:id="rId9"/>
+    <p:sldId id="264" r:id="rId10"/>
   </p:sldIdLst>
   <p:sldSz cx="12192000" cy="6858000"/>
   <p:notesSz cx="6858000" cy="9144000"/>
@@ -125,7 +127,7 @@
 <p1510:revInfo xmlns:a="http://schemas.openxmlformats.org/drawingml/2006/main" xmlns:r="http://schemas.openxmlformats.org/officeDocument/2006/relationships" xmlns:p1510="http://schemas.microsoft.com/office/powerpoint/2015/10/main">
   <p1510:revLst>
     <p1510:client id="{84C58783-0833-2642-9CD5-D489389CB76F}" v="57" dt="2025-10-31T16:56:34.878"/>
-    <p1510:client id="{AAC1F951-0C65-8B4C-9B54-8D30421C746A}" v="18" dt="2025-10-31T22:34:06.322"/>
+    <p1510:client id="{AAC1F951-0C65-8B4C-9B54-8D30421C746A}" v="20" dt="2025-10-31T22:47:58.185"/>
   </p1510:revLst>
 </p1510:revInfo>
 </file>
@@ -135,7 +137,7 @@
   <pc:docChgLst>
     <pc:chgData name="Hemma Philamore" userId="db50e2f3-17b2-4cc0-b719-fb6254d3e9df" providerId="ADAL" clId="{B5D85944-D90A-5912-90C6-4C26E424D3D6}"/>
     <pc:docChg chg="undo custSel addSld modSld">
-      <pc:chgData name="Hemma Philamore" userId="db50e2f3-17b2-4cc0-b719-fb6254d3e9df" providerId="ADAL" clId="{B5D85944-D90A-5912-90C6-4C26E424D3D6}" dt="2025-10-31T22:34:06.322" v="77" actId="164"/>
+      <pc:chgData name="Hemma Philamore" userId="db50e2f3-17b2-4cc0-b719-fb6254d3e9df" providerId="ADAL" clId="{B5D85944-D90A-5912-90C6-4C26E424D3D6}" dt="2025-10-31T22:48:15.790" v="91" actId="20577"/>
       <pc:docMkLst>
         <pc:docMk/>
       </pc:docMkLst>
@@ -1004,6 +1006,188 @@
             <pc:docMk/>
             <pc:sldMk cId="4195481004" sldId="262"/>
             <ac:cxnSpMk id="24" creationId="{A68154E9-C7FF-640E-9974-E68C6BE980DB}"/>
+          </ac:cxnSpMkLst>
+        </pc:cxnChg>
+      </pc:sldChg>
+      <pc:sldChg chg="addSp delSp modSp add mod">
+        <pc:chgData name="Hemma Philamore" userId="db50e2f3-17b2-4cc0-b719-fb6254d3e9df" providerId="ADAL" clId="{B5D85944-D90A-5912-90C6-4C26E424D3D6}" dt="2025-10-31T22:48:02.577" v="87" actId="478"/>
+        <pc:sldMkLst>
+          <pc:docMk/>
+          <pc:sldMk cId="118815274" sldId="263"/>
+        </pc:sldMkLst>
+        <pc:spChg chg="del">
+          <ac:chgData name="Hemma Philamore" userId="db50e2f3-17b2-4cc0-b719-fb6254d3e9df" providerId="ADAL" clId="{B5D85944-D90A-5912-90C6-4C26E424D3D6}" dt="2025-10-31T22:47:08.218" v="80" actId="478"/>
+          <ac:spMkLst>
+            <pc:docMk/>
+            <pc:sldMk cId="118815274" sldId="263"/>
+            <ac:spMk id="9" creationId="{71F10D0D-4070-A329-2FEF-51DB3C225250}"/>
+          </ac:spMkLst>
+        </pc:spChg>
+        <pc:spChg chg="mod">
+          <ac:chgData name="Hemma Philamore" userId="db50e2f3-17b2-4cc0-b719-fb6254d3e9df" providerId="ADAL" clId="{B5D85944-D90A-5912-90C6-4C26E424D3D6}" dt="2025-10-31T22:47:29.254" v="85" actId="1076"/>
+          <ac:spMkLst>
+            <pc:docMk/>
+            <pc:sldMk cId="118815274" sldId="263"/>
+            <ac:spMk id="12" creationId="{73A06DFA-1369-7514-D0E2-8C4254013FC3}"/>
+          </ac:spMkLst>
+        </pc:spChg>
+        <pc:spChg chg="mod">
+          <ac:chgData name="Hemma Philamore" userId="db50e2f3-17b2-4cc0-b719-fb6254d3e9df" providerId="ADAL" clId="{B5D85944-D90A-5912-90C6-4C26E424D3D6}" dt="2025-10-31T22:47:53.982" v="86"/>
+          <ac:spMkLst>
+            <pc:docMk/>
+            <pc:sldMk cId="118815274" sldId="263"/>
+            <ac:spMk id="27" creationId="{29DCE0AA-C9B3-F8EB-1E6A-AE4972CCA242}"/>
+          </ac:spMkLst>
+        </pc:spChg>
+        <pc:spChg chg="mod">
+          <ac:chgData name="Hemma Philamore" userId="db50e2f3-17b2-4cc0-b719-fb6254d3e9df" providerId="ADAL" clId="{B5D85944-D90A-5912-90C6-4C26E424D3D6}" dt="2025-10-31T22:47:53.982" v="86"/>
+          <ac:spMkLst>
+            <pc:docMk/>
+            <pc:sldMk cId="118815274" sldId="263"/>
+            <ac:spMk id="63" creationId="{D09BF560-F40E-2B0F-9C96-6A705DBF2F58}"/>
+          </ac:spMkLst>
+        </pc:spChg>
+        <pc:spChg chg="mod">
+          <ac:chgData name="Hemma Philamore" userId="db50e2f3-17b2-4cc0-b719-fb6254d3e9df" providerId="ADAL" clId="{B5D85944-D90A-5912-90C6-4C26E424D3D6}" dt="2025-10-31T22:47:53.982" v="86"/>
+          <ac:spMkLst>
+            <pc:docMk/>
+            <pc:sldMk cId="118815274" sldId="263"/>
+            <ac:spMk id="66" creationId="{774A9B4A-4424-3E80-A8FB-EF2BA4C1B748}"/>
+          </ac:spMkLst>
+        </pc:spChg>
+        <pc:spChg chg="mod">
+          <ac:chgData name="Hemma Philamore" userId="db50e2f3-17b2-4cc0-b719-fb6254d3e9df" providerId="ADAL" clId="{B5D85944-D90A-5912-90C6-4C26E424D3D6}" dt="2025-10-31T22:47:53.982" v="86"/>
+          <ac:spMkLst>
+            <pc:docMk/>
+            <pc:sldMk cId="118815274" sldId="263"/>
+            <ac:spMk id="68" creationId="{B2A5ABBE-5E85-9AA6-4B8A-9DEF07026FF5}"/>
+          </ac:spMkLst>
+        </pc:spChg>
+        <pc:spChg chg="mod">
+          <ac:chgData name="Hemma Philamore" userId="db50e2f3-17b2-4cc0-b719-fb6254d3e9df" providerId="ADAL" clId="{B5D85944-D90A-5912-90C6-4C26E424D3D6}" dt="2025-10-31T22:47:53.982" v="86"/>
+          <ac:spMkLst>
+            <pc:docMk/>
+            <pc:sldMk cId="118815274" sldId="263"/>
+            <ac:spMk id="72" creationId="{07B3CDBC-0DA5-D629-961F-65D088F64F7D}"/>
+          </ac:spMkLst>
+        </pc:spChg>
+        <pc:spChg chg="mod">
+          <ac:chgData name="Hemma Philamore" userId="db50e2f3-17b2-4cc0-b719-fb6254d3e9df" providerId="ADAL" clId="{B5D85944-D90A-5912-90C6-4C26E424D3D6}" dt="2025-10-31T22:47:53.982" v="86"/>
+          <ac:spMkLst>
+            <pc:docMk/>
+            <pc:sldMk cId="118815274" sldId="263"/>
+            <ac:spMk id="74" creationId="{316D9450-D32A-F218-A98E-EB2013E4C29C}"/>
+          </ac:spMkLst>
+        </pc:spChg>
+        <pc:spChg chg="mod">
+          <ac:chgData name="Hemma Philamore" userId="db50e2f3-17b2-4cc0-b719-fb6254d3e9df" providerId="ADAL" clId="{B5D85944-D90A-5912-90C6-4C26E424D3D6}" dt="2025-10-31T22:47:53.982" v="86"/>
+          <ac:spMkLst>
+            <pc:docMk/>
+            <pc:sldMk cId="118815274" sldId="263"/>
+            <ac:spMk id="76" creationId="{8C6159F7-3B4D-0CFB-A7E9-2B513F9F04B4}"/>
+          </ac:spMkLst>
+        </pc:spChg>
+        <pc:spChg chg="mod">
+          <ac:chgData name="Hemma Philamore" userId="db50e2f3-17b2-4cc0-b719-fb6254d3e9df" providerId="ADAL" clId="{B5D85944-D90A-5912-90C6-4C26E424D3D6}" dt="2025-10-31T22:47:53.982" v="86"/>
+          <ac:spMkLst>
+            <pc:docMk/>
+            <pc:sldMk cId="118815274" sldId="263"/>
+            <ac:spMk id="81" creationId="{0132B1B2-43BA-A5F6-4C2C-87739589694B}"/>
+          </ac:spMkLst>
+        </pc:spChg>
+        <pc:spChg chg="mod">
+          <ac:chgData name="Hemma Philamore" userId="db50e2f3-17b2-4cc0-b719-fb6254d3e9df" providerId="ADAL" clId="{B5D85944-D90A-5912-90C6-4C26E424D3D6}" dt="2025-10-31T22:47:53.982" v="86"/>
+          <ac:spMkLst>
+            <pc:docMk/>
+            <pc:sldMk cId="118815274" sldId="263"/>
+            <ac:spMk id="82" creationId="{D34B2480-B9E7-70CC-2378-18C18E4D6531}"/>
+          </ac:spMkLst>
+        </pc:spChg>
+        <pc:spChg chg="mod">
+          <ac:chgData name="Hemma Philamore" userId="db50e2f3-17b2-4cc0-b719-fb6254d3e9df" providerId="ADAL" clId="{B5D85944-D90A-5912-90C6-4C26E424D3D6}" dt="2025-10-31T22:47:53.982" v="86"/>
+          <ac:spMkLst>
+            <pc:docMk/>
+            <pc:sldMk cId="118815274" sldId="263"/>
+            <ac:spMk id="86" creationId="{AEFE426F-D0CC-D6C2-56FA-C3C01E13D8C2}"/>
+          </ac:spMkLst>
+        </pc:spChg>
+        <pc:grpChg chg="del">
+          <ac:chgData name="Hemma Philamore" userId="db50e2f3-17b2-4cc0-b719-fb6254d3e9df" providerId="ADAL" clId="{B5D85944-D90A-5912-90C6-4C26E424D3D6}" dt="2025-10-31T22:47:08.218" v="80" actId="478"/>
+          <ac:grpSpMkLst>
+            <pc:docMk/>
+            <pc:sldMk cId="118815274" sldId="263"/>
+            <ac:grpSpMk id="7" creationId="{AE69A846-92F3-1C97-D4B6-D940AEDBCC26}"/>
+          </ac:grpSpMkLst>
+        </pc:grpChg>
+        <pc:grpChg chg="del">
+          <ac:chgData name="Hemma Philamore" userId="db50e2f3-17b2-4cc0-b719-fb6254d3e9df" providerId="ADAL" clId="{B5D85944-D90A-5912-90C6-4C26E424D3D6}" dt="2025-10-31T22:48:02.577" v="87" actId="478"/>
+          <ac:grpSpMkLst>
+            <pc:docMk/>
+            <pc:sldMk cId="118815274" sldId="263"/>
+            <ac:grpSpMk id="26" creationId="{C3E10BD8-936C-0C07-4925-6B0CD68D132B}"/>
+          </ac:grpSpMkLst>
+        </pc:grpChg>
+        <pc:grpChg chg="add del">
+          <ac:chgData name="Hemma Philamore" userId="db50e2f3-17b2-4cc0-b719-fb6254d3e9df" providerId="ADAL" clId="{B5D85944-D90A-5912-90C6-4C26E424D3D6}" dt="2025-10-31T22:47:10.440" v="82" actId="478"/>
+          <ac:grpSpMkLst>
+            <pc:docMk/>
+            <pc:sldMk cId="118815274" sldId="263"/>
+            <ac:grpSpMk id="62" creationId="{87DB2D66-6E3A-8128-E952-85DE8137DA03}"/>
+          </ac:grpSpMkLst>
+        </pc:grpChg>
+        <pc:cxnChg chg="del">
+          <ac:chgData name="Hemma Philamore" userId="db50e2f3-17b2-4cc0-b719-fb6254d3e9df" providerId="ADAL" clId="{B5D85944-D90A-5912-90C6-4C26E424D3D6}" dt="2025-10-31T22:47:11.360" v="83" actId="478"/>
+          <ac:cxnSpMkLst>
+            <pc:docMk/>
+            <pc:sldMk cId="118815274" sldId="263"/>
+            <ac:cxnSpMk id="8" creationId="{79A0614B-01B1-AB00-B3C4-48B3A82E7AF5}"/>
+          </ac:cxnSpMkLst>
+        </pc:cxnChg>
+        <pc:cxnChg chg="mod">
+          <ac:chgData name="Hemma Philamore" userId="db50e2f3-17b2-4cc0-b719-fb6254d3e9df" providerId="ADAL" clId="{B5D85944-D90A-5912-90C6-4C26E424D3D6}" dt="2025-10-31T22:47:29.254" v="85" actId="1076"/>
+          <ac:cxnSpMkLst>
+            <pc:docMk/>
+            <pc:sldMk cId="118815274" sldId="263"/>
+            <ac:cxnSpMk id="11" creationId="{721274E1-CD15-256B-EAF7-1F93FC884B33}"/>
+          </ac:cxnSpMkLst>
+        </pc:cxnChg>
+      </pc:sldChg>
+      <pc:sldChg chg="delSp modSp add mod">
+        <pc:chgData name="Hemma Philamore" userId="db50e2f3-17b2-4cc0-b719-fb6254d3e9df" providerId="ADAL" clId="{B5D85944-D90A-5912-90C6-4C26E424D3D6}" dt="2025-10-31T22:48:15.790" v="91" actId="20577"/>
+        <pc:sldMkLst>
+          <pc:docMk/>
+          <pc:sldMk cId="3318247048" sldId="264"/>
+        </pc:sldMkLst>
+        <pc:spChg chg="del">
+          <ac:chgData name="Hemma Philamore" userId="db50e2f3-17b2-4cc0-b719-fb6254d3e9df" providerId="ADAL" clId="{B5D85944-D90A-5912-90C6-4C26E424D3D6}" dt="2025-10-31T22:48:09.739" v="89" actId="478"/>
+          <ac:spMkLst>
+            <pc:docMk/>
+            <pc:sldMk cId="3318247048" sldId="264"/>
+            <ac:spMk id="13" creationId="{2DB70A16-5335-2BB7-FEA7-B3E01968F648}"/>
+          </ac:spMkLst>
+        </pc:spChg>
+        <pc:spChg chg="mod">
+          <ac:chgData name="Hemma Philamore" userId="db50e2f3-17b2-4cc0-b719-fb6254d3e9df" providerId="ADAL" clId="{B5D85944-D90A-5912-90C6-4C26E424D3D6}" dt="2025-10-31T22:48:15.790" v="91" actId="20577"/>
+          <ac:spMkLst>
+            <pc:docMk/>
+            <pc:sldMk cId="3318247048" sldId="264"/>
+            <ac:spMk id="30" creationId="{50C81553-87C7-470E-FC4A-D1EBBF9123F4}"/>
+          </ac:spMkLst>
+        </pc:spChg>
+        <pc:grpChg chg="del">
+          <ac:chgData name="Hemma Philamore" userId="db50e2f3-17b2-4cc0-b719-fb6254d3e9df" providerId="ADAL" clId="{B5D85944-D90A-5912-90C6-4C26E424D3D6}" dt="2025-10-31T22:48:09.739" v="89" actId="478"/>
+          <ac:grpSpMkLst>
+            <pc:docMk/>
+            <pc:sldMk cId="3318247048" sldId="264"/>
+            <ac:grpSpMk id="11" creationId="{D1249D02-847F-6F0B-D1A5-41D8E11E748F}"/>
+          </ac:grpSpMkLst>
+        </pc:grpChg>
+        <pc:cxnChg chg="del">
+          <ac:chgData name="Hemma Philamore" userId="db50e2f3-17b2-4cc0-b719-fb6254d3e9df" providerId="ADAL" clId="{B5D85944-D90A-5912-90C6-4C26E424D3D6}" dt="2025-10-31T22:48:13.024" v="90" actId="478"/>
+          <ac:cxnSpMkLst>
+            <pc:docMk/>
+            <pc:sldMk cId="3318247048" sldId="264"/>
+            <ac:cxnSpMk id="12" creationId="{6B710EFE-437E-F3A2-C935-AD0CFB30FBC2}"/>
           </ac:cxnSpMkLst>
         </pc:cxnChg>
       </pc:sldChg>
@@ -12352,6 +12536,2600 @@
   <p:cSld>
     <p:spTree>
       <p:nvGrpSpPr>
+        <p:cNvPr id="1" name="">
+          <a:extLst>
+            <a:ext uri="{FF2B5EF4-FFF2-40B4-BE49-F238E27FC236}">
+              <a16:creationId xmlns:a16="http://schemas.microsoft.com/office/drawing/2014/main" id="{225065A3-3450-1F31-B89D-E92CB5696CD2}"/>
+            </a:ext>
+          </a:extLst>
+        </p:cNvPr>
+        <p:cNvGrpSpPr/>
+        <p:nvPr/>
+      </p:nvGrpSpPr>
+      <p:grpSpPr>
+        <a:xfrm>
+          <a:off x="0" y="0"/>
+          <a:ext cx="0" cy="0"/>
+          <a:chOff x="0" y="0"/>
+          <a:chExt cx="0" cy="0"/>
+        </a:xfrm>
+      </p:grpSpPr>
+      <p:grpSp>
+        <p:nvGrpSpPr>
+          <p:cNvPr id="61" name="Group 60">
+            <a:extLst>
+              <a:ext uri="{FF2B5EF4-FFF2-40B4-BE49-F238E27FC236}">
+                <a16:creationId xmlns:a16="http://schemas.microsoft.com/office/drawing/2014/main" id="{6227E506-7B55-E35E-2BF1-732ABED8B2AB}"/>
+              </a:ext>
+            </a:extLst>
+          </p:cNvPr>
+          <p:cNvGrpSpPr/>
+          <p:nvPr/>
+        </p:nvGrpSpPr>
+        <p:grpSpPr>
+          <a:xfrm>
+            <a:off x="9148663" y="-1901623"/>
+            <a:ext cx="8992718" cy="5362707"/>
+            <a:chOff x="9148663" y="-1901623"/>
+            <a:chExt cx="8992718" cy="5362707"/>
+          </a:xfrm>
+        </p:grpSpPr>
+        <p:sp>
+          <p:nvSpPr>
+            <p:cNvPr id="19" name="Rounded Rectangle 18">
+              <a:extLst>
+                <a:ext uri="{FF2B5EF4-FFF2-40B4-BE49-F238E27FC236}">
+                  <a16:creationId xmlns:a16="http://schemas.microsoft.com/office/drawing/2014/main" id="{6C8967F1-2F8D-4B49-B936-EFB4B6A780F2}"/>
+                </a:ext>
+              </a:extLst>
+            </p:cNvPr>
+            <p:cNvSpPr/>
+            <p:nvPr/>
+          </p:nvSpPr>
+          <p:spPr>
+            <a:xfrm>
+              <a:off x="9791499" y="572171"/>
+              <a:ext cx="5326912" cy="1083141"/>
+            </a:xfrm>
+            <a:prstGeom prst="roundRect">
+              <a:avLst/>
+            </a:prstGeom>
+            <a:solidFill>
+              <a:schemeClr val="accent1"/>
+            </a:solidFill>
+            <a:ln w="38100">
+              <a:solidFill>
+                <a:schemeClr val="tx1"/>
+              </a:solidFill>
+            </a:ln>
+          </p:spPr>
+          <p:style>
+            <a:lnRef idx="2">
+              <a:schemeClr val="accent1">
+                <a:shade val="15000"/>
+              </a:schemeClr>
+            </a:lnRef>
+            <a:fillRef idx="1">
+              <a:schemeClr val="accent1"/>
+            </a:fillRef>
+            <a:effectRef idx="0">
+              <a:schemeClr val="accent1"/>
+            </a:effectRef>
+            <a:fontRef idx="minor">
+              <a:schemeClr val="lt1"/>
+            </a:fontRef>
+          </p:style>
+          <p:txBody>
+            <a:bodyPr rtlCol="0" anchor="ctr"/>
+            <a:lstStyle/>
+            <a:p>
+              <a:pPr algn="ctr"/>
+              <a:endParaRPr lang="en-US"/>
+            </a:p>
+          </p:txBody>
+        </p:sp>
+        <p:sp>
+          <p:nvSpPr>
+            <p:cNvPr id="29" name="TextBox 28">
+              <a:extLst>
+                <a:ext uri="{FF2B5EF4-FFF2-40B4-BE49-F238E27FC236}">
+                  <a16:creationId xmlns:a16="http://schemas.microsoft.com/office/drawing/2014/main" id="{361A1CE0-B681-381E-679C-37BA9EA00521}"/>
+                </a:ext>
+              </a:extLst>
+            </p:cNvPr>
+            <p:cNvSpPr txBox="1"/>
+            <p:nvPr/>
+          </p:nvSpPr>
+          <p:spPr>
+            <a:xfrm>
+              <a:off x="9929288" y="704496"/>
+              <a:ext cx="4913326" cy="369332"/>
+            </a:xfrm>
+            <a:prstGeom prst="rect">
+              <a:avLst/>
+            </a:prstGeom>
+            <a:noFill/>
+          </p:spPr>
+          <p:txBody>
+            <a:bodyPr wrap="square" rtlCol="0">
+              <a:spAutoFit/>
+            </a:bodyPr>
+            <a:lstStyle/>
+            <a:p>
+              <a:pPr algn="ctr"/>
+              <a:r>
+                <a:rPr lang="en-US" dirty="0">
+                  <a:solidFill>
+                    <a:schemeClr val="bg1"/>
+                  </a:solidFill>
+                </a:rPr>
+                <a:t>Ref: 01			Ref: 02</a:t>
+              </a:r>
+            </a:p>
+          </p:txBody>
+        </p:sp>
+        <p:sp>
+          <p:nvSpPr>
+            <p:cNvPr id="38" name="TextBox 37">
+              <a:extLst>
+                <a:ext uri="{FF2B5EF4-FFF2-40B4-BE49-F238E27FC236}">
+                  <a16:creationId xmlns:a16="http://schemas.microsoft.com/office/drawing/2014/main" id="{80BBE716-18EE-D9DC-22B4-A740405A24D1}"/>
+                </a:ext>
+              </a:extLst>
+            </p:cNvPr>
+            <p:cNvSpPr txBox="1"/>
+            <p:nvPr/>
+          </p:nvSpPr>
+          <p:spPr>
+            <a:xfrm>
+              <a:off x="11393471" y="992043"/>
+              <a:ext cx="1860698" cy="646331"/>
+            </a:xfrm>
+            <a:prstGeom prst="rect">
+              <a:avLst/>
+            </a:prstGeom>
+            <a:noFill/>
+          </p:spPr>
+          <p:txBody>
+            <a:bodyPr wrap="square" rtlCol="0">
+              <a:spAutoFit/>
+            </a:bodyPr>
+            <a:lstStyle/>
+            <a:p>
+              <a:pPr algn="ctr"/>
+              <a:r>
+                <a:rPr lang="en-US" dirty="0">
+                  <a:solidFill>
+                    <a:schemeClr val="bg1"/>
+                  </a:solidFill>
+                </a:rPr>
+                <a:t>Address: 10</a:t>
+              </a:r>
+            </a:p>
+            <a:p>
+              <a:pPr algn="ctr"/>
+              <a:r>
+                <a:rPr lang="en-US" dirty="0">
+                  <a:solidFill>
+                    <a:schemeClr val="bg1"/>
+                  </a:solidFill>
+                </a:rPr>
+                <a:t>Type: List</a:t>
+              </a:r>
+            </a:p>
+          </p:txBody>
+        </p:sp>
+        <p:sp>
+          <p:nvSpPr>
+            <p:cNvPr id="20" name="Rounded Rectangle 19">
+              <a:extLst>
+                <a:ext uri="{FF2B5EF4-FFF2-40B4-BE49-F238E27FC236}">
+                  <a16:creationId xmlns:a16="http://schemas.microsoft.com/office/drawing/2014/main" id="{EF7DCEB5-0407-BD4B-7188-73672CF262C9}"/>
+                </a:ext>
+              </a:extLst>
+            </p:cNvPr>
+            <p:cNvSpPr/>
+            <p:nvPr/>
+          </p:nvSpPr>
+          <p:spPr>
+            <a:xfrm>
+              <a:off x="9148663" y="-1223254"/>
+              <a:ext cx="8992718" cy="3179519"/>
+            </a:xfrm>
+            <a:prstGeom prst="roundRect">
+              <a:avLst/>
+            </a:prstGeom>
+            <a:noFill/>
+            <a:ln w="38100">
+              <a:solidFill>
+                <a:schemeClr val="tx1"/>
+              </a:solidFill>
+            </a:ln>
+          </p:spPr>
+          <p:style>
+            <a:lnRef idx="2">
+              <a:schemeClr val="accent1">
+                <a:shade val="15000"/>
+              </a:schemeClr>
+            </a:lnRef>
+            <a:fillRef idx="1">
+              <a:schemeClr val="accent1"/>
+            </a:fillRef>
+            <a:effectRef idx="0">
+              <a:schemeClr val="accent1"/>
+            </a:effectRef>
+            <a:fontRef idx="minor">
+              <a:schemeClr val="lt1"/>
+            </a:fontRef>
+          </p:style>
+          <p:txBody>
+            <a:bodyPr rtlCol="0" anchor="ctr"/>
+            <a:lstStyle/>
+            <a:p>
+              <a:pPr algn="ctr"/>
+              <a:endParaRPr lang="en-US"/>
+            </a:p>
+          </p:txBody>
+        </p:sp>
+        <p:sp>
+          <p:nvSpPr>
+            <p:cNvPr id="21" name="Rounded Rectangle 20">
+              <a:extLst>
+                <a:ext uri="{FF2B5EF4-FFF2-40B4-BE49-F238E27FC236}">
+                  <a16:creationId xmlns:a16="http://schemas.microsoft.com/office/drawing/2014/main" id="{FE14E1C6-DB3F-5333-858C-61EC9587E8BA}"/>
+                </a:ext>
+              </a:extLst>
+            </p:cNvPr>
+            <p:cNvSpPr/>
+            <p:nvPr/>
+          </p:nvSpPr>
+          <p:spPr>
+            <a:xfrm>
+              <a:off x="9673201" y="-992528"/>
+              <a:ext cx="2452577" cy="1472610"/>
+            </a:xfrm>
+            <a:prstGeom prst="roundRect">
+              <a:avLst/>
+            </a:prstGeom>
+            <a:solidFill>
+              <a:schemeClr val="accent1"/>
+            </a:solidFill>
+            <a:ln w="38100">
+              <a:solidFill>
+                <a:schemeClr val="tx1"/>
+              </a:solidFill>
+            </a:ln>
+          </p:spPr>
+          <p:style>
+            <a:lnRef idx="2">
+              <a:schemeClr val="accent1">
+                <a:shade val="15000"/>
+              </a:schemeClr>
+            </a:lnRef>
+            <a:fillRef idx="1">
+              <a:schemeClr val="accent1"/>
+            </a:fillRef>
+            <a:effectRef idx="0">
+              <a:schemeClr val="accent1"/>
+            </a:effectRef>
+            <a:fontRef idx="minor">
+              <a:schemeClr val="lt1"/>
+            </a:fontRef>
+          </p:style>
+          <p:txBody>
+            <a:bodyPr rtlCol="0" anchor="ctr"/>
+            <a:lstStyle/>
+            <a:p>
+              <a:pPr algn="ctr"/>
+              <a:endParaRPr lang="en-US"/>
+            </a:p>
+          </p:txBody>
+        </p:sp>
+        <p:sp>
+          <p:nvSpPr>
+            <p:cNvPr id="22" name="TextBox 21">
+              <a:extLst>
+                <a:ext uri="{FF2B5EF4-FFF2-40B4-BE49-F238E27FC236}">
+                  <a16:creationId xmlns:a16="http://schemas.microsoft.com/office/drawing/2014/main" id="{BC4E13B1-40CD-E0A0-8B25-139E5C2A9186}"/>
+                </a:ext>
+              </a:extLst>
+            </p:cNvPr>
+            <p:cNvSpPr txBox="1"/>
+            <p:nvPr/>
+          </p:nvSpPr>
+          <p:spPr>
+            <a:xfrm>
+              <a:off x="9969140" y="-719695"/>
+              <a:ext cx="1860698" cy="923330"/>
+            </a:xfrm>
+            <a:prstGeom prst="rect">
+              <a:avLst/>
+            </a:prstGeom>
+            <a:noFill/>
+          </p:spPr>
+          <p:txBody>
+            <a:bodyPr wrap="square" rtlCol="0">
+              <a:spAutoFit/>
+            </a:bodyPr>
+            <a:lstStyle/>
+            <a:p>
+              <a:pPr algn="ctr"/>
+              <a:r>
+                <a:rPr lang="en-US" dirty="0">
+                  <a:solidFill>
+                    <a:schemeClr val="bg1"/>
+                  </a:solidFill>
+                </a:rPr>
+                <a:t>Value: 1</a:t>
+              </a:r>
+            </a:p>
+            <a:p>
+              <a:pPr algn="ctr"/>
+              <a:r>
+                <a:rPr lang="en-US" dirty="0">
+                  <a:solidFill>
+                    <a:schemeClr val="bg1"/>
+                  </a:solidFill>
+                </a:rPr>
+                <a:t>Address: 1</a:t>
+              </a:r>
+            </a:p>
+            <a:p>
+              <a:pPr algn="ctr"/>
+              <a:r>
+                <a:rPr lang="en-US" dirty="0">
+                  <a:solidFill>
+                    <a:schemeClr val="bg1"/>
+                  </a:solidFill>
+                </a:rPr>
+                <a:t>Type: Integer</a:t>
+              </a:r>
+            </a:p>
+          </p:txBody>
+        </p:sp>
+        <p:sp>
+          <p:nvSpPr>
+            <p:cNvPr id="23" name="Rounded Rectangle 22">
+              <a:extLst>
+                <a:ext uri="{FF2B5EF4-FFF2-40B4-BE49-F238E27FC236}">
+                  <a16:creationId xmlns:a16="http://schemas.microsoft.com/office/drawing/2014/main" id="{E3B7F759-1E94-8ED1-CC0C-674DEFCC8914}"/>
+                </a:ext>
+              </a:extLst>
+            </p:cNvPr>
+            <p:cNvSpPr/>
+            <p:nvPr/>
+          </p:nvSpPr>
+          <p:spPr>
+            <a:xfrm>
+              <a:off x="12454955" y="-1004486"/>
+              <a:ext cx="2452577" cy="1472610"/>
+            </a:xfrm>
+            <a:prstGeom prst="roundRect">
+              <a:avLst/>
+            </a:prstGeom>
+            <a:solidFill>
+              <a:schemeClr val="accent1"/>
+            </a:solidFill>
+            <a:ln w="38100">
+              <a:solidFill>
+                <a:schemeClr val="tx1"/>
+              </a:solidFill>
+            </a:ln>
+          </p:spPr>
+          <p:style>
+            <a:lnRef idx="2">
+              <a:schemeClr val="accent1">
+                <a:shade val="15000"/>
+              </a:schemeClr>
+            </a:lnRef>
+            <a:fillRef idx="1">
+              <a:schemeClr val="accent1"/>
+            </a:fillRef>
+            <a:effectRef idx="0">
+              <a:schemeClr val="accent1"/>
+            </a:effectRef>
+            <a:fontRef idx="minor">
+              <a:schemeClr val="lt1"/>
+            </a:fontRef>
+          </p:style>
+          <p:txBody>
+            <a:bodyPr rtlCol="0" anchor="ctr"/>
+            <a:lstStyle/>
+            <a:p>
+              <a:pPr algn="ctr"/>
+              <a:endParaRPr lang="en-US"/>
+            </a:p>
+          </p:txBody>
+        </p:sp>
+        <p:sp>
+          <p:nvSpPr>
+            <p:cNvPr id="24" name="TextBox 23">
+              <a:extLst>
+                <a:ext uri="{FF2B5EF4-FFF2-40B4-BE49-F238E27FC236}">
+                  <a16:creationId xmlns:a16="http://schemas.microsoft.com/office/drawing/2014/main" id="{0EBEBAD6-6C40-FBE8-80D4-515A27504824}"/>
+                </a:ext>
+              </a:extLst>
+            </p:cNvPr>
+            <p:cNvSpPr txBox="1"/>
+            <p:nvPr/>
+          </p:nvSpPr>
+          <p:spPr>
+            <a:xfrm>
+              <a:off x="12750894" y="-657756"/>
+              <a:ext cx="1860698" cy="923330"/>
+            </a:xfrm>
+            <a:prstGeom prst="rect">
+              <a:avLst/>
+            </a:prstGeom>
+            <a:noFill/>
+          </p:spPr>
+          <p:txBody>
+            <a:bodyPr wrap="square" rtlCol="0">
+              <a:spAutoFit/>
+            </a:bodyPr>
+            <a:lstStyle/>
+            <a:p>
+              <a:pPr algn="ctr"/>
+              <a:r>
+                <a:rPr lang="en-US" dirty="0">
+                  <a:solidFill>
+                    <a:schemeClr val="bg1"/>
+                  </a:solidFill>
+                </a:rPr>
+                <a:t>Value: 3</a:t>
+              </a:r>
+            </a:p>
+            <a:p>
+              <a:pPr algn="ctr"/>
+              <a:r>
+                <a:rPr lang="en-US" dirty="0">
+                  <a:solidFill>
+                    <a:schemeClr val="bg1"/>
+                  </a:solidFill>
+                </a:rPr>
+                <a:t>Address: 2</a:t>
+              </a:r>
+            </a:p>
+            <a:p>
+              <a:pPr algn="ctr"/>
+              <a:r>
+                <a:rPr lang="en-US" dirty="0">
+                  <a:solidFill>
+                    <a:schemeClr val="bg1"/>
+                  </a:solidFill>
+                </a:rPr>
+                <a:t>Type: Integer</a:t>
+              </a:r>
+            </a:p>
+          </p:txBody>
+        </p:sp>
+        <p:sp>
+          <p:nvSpPr>
+            <p:cNvPr id="25" name="TextBox 24">
+              <a:extLst>
+                <a:ext uri="{FF2B5EF4-FFF2-40B4-BE49-F238E27FC236}">
+                  <a16:creationId xmlns:a16="http://schemas.microsoft.com/office/drawing/2014/main" id="{5EA8301D-A0FD-85B9-FB74-1BCF8B9C1D25}"/>
+                </a:ext>
+              </a:extLst>
+            </p:cNvPr>
+            <p:cNvSpPr txBox="1"/>
+            <p:nvPr/>
+          </p:nvSpPr>
+          <p:spPr>
+            <a:xfrm>
+              <a:off x="12750894" y="-1901623"/>
+              <a:ext cx="1711842" cy="461665"/>
+            </a:xfrm>
+            <a:prstGeom prst="rect">
+              <a:avLst/>
+            </a:prstGeom>
+            <a:noFill/>
+          </p:spPr>
+          <p:txBody>
+            <a:bodyPr wrap="square" rtlCol="0">
+              <a:spAutoFit/>
+            </a:bodyPr>
+            <a:lstStyle/>
+            <a:p>
+              <a:pPr algn="ctr"/>
+              <a:r>
+                <a:rPr lang="en-US" sz="2400" dirty="0"/>
+                <a:t>Memory</a:t>
+              </a:r>
+            </a:p>
+          </p:txBody>
+        </p:sp>
+        <p:cxnSp>
+          <p:nvCxnSpPr>
+            <p:cNvPr id="28" name="Straight Arrow Connector 27">
+              <a:extLst>
+                <a:ext uri="{FF2B5EF4-FFF2-40B4-BE49-F238E27FC236}">
+                  <a16:creationId xmlns:a16="http://schemas.microsoft.com/office/drawing/2014/main" id="{52158F22-4756-BCDD-7887-C0D03FB8D049}"/>
+                </a:ext>
+              </a:extLst>
+            </p:cNvPr>
+            <p:cNvCxnSpPr>
+              <a:cxnSpLocks/>
+            </p:cNvCxnSpPr>
+            <p:nvPr/>
+          </p:nvCxnSpPr>
+          <p:spPr>
+            <a:xfrm flipV="1">
+              <a:off x="10911375" y="183333"/>
+              <a:ext cx="0" cy="593497"/>
+            </a:xfrm>
+            <a:prstGeom prst="straightConnector1">
+              <a:avLst/>
+            </a:prstGeom>
+            <a:ln w="63500">
+              <a:solidFill>
+                <a:schemeClr val="accent2"/>
+              </a:solidFill>
+              <a:tailEnd type="triangle"/>
+            </a:ln>
+          </p:spPr>
+          <p:style>
+            <a:lnRef idx="2">
+              <a:schemeClr val="accent1"/>
+            </a:lnRef>
+            <a:fillRef idx="0">
+              <a:schemeClr val="accent1"/>
+            </a:fillRef>
+            <a:effectRef idx="1">
+              <a:schemeClr val="accent1"/>
+            </a:effectRef>
+            <a:fontRef idx="minor">
+              <a:schemeClr val="tx1"/>
+            </a:fontRef>
+          </p:style>
+        </p:cxnSp>
+        <p:sp>
+          <p:nvSpPr>
+            <p:cNvPr id="30" name="Rounded Rectangle 29">
+              <a:extLst>
+                <a:ext uri="{FF2B5EF4-FFF2-40B4-BE49-F238E27FC236}">
+                  <a16:creationId xmlns:a16="http://schemas.microsoft.com/office/drawing/2014/main" id="{2FD7D224-4045-C7B7-D003-D9F88145BC90}"/>
+                </a:ext>
+              </a:extLst>
+            </p:cNvPr>
+            <p:cNvSpPr/>
+            <p:nvPr/>
+          </p:nvSpPr>
+          <p:spPr>
+            <a:xfrm>
+              <a:off x="15203472" y="-992528"/>
+              <a:ext cx="2452577" cy="1472610"/>
+            </a:xfrm>
+            <a:prstGeom prst="roundRect">
+              <a:avLst/>
+            </a:prstGeom>
+            <a:solidFill>
+              <a:schemeClr val="accent1"/>
+            </a:solidFill>
+            <a:ln w="38100">
+              <a:solidFill>
+                <a:schemeClr val="tx1"/>
+              </a:solidFill>
+            </a:ln>
+          </p:spPr>
+          <p:style>
+            <a:lnRef idx="2">
+              <a:schemeClr val="accent1">
+                <a:shade val="15000"/>
+              </a:schemeClr>
+            </a:lnRef>
+            <a:fillRef idx="1">
+              <a:schemeClr val="accent1"/>
+            </a:fillRef>
+            <a:effectRef idx="0">
+              <a:schemeClr val="accent1"/>
+            </a:effectRef>
+            <a:fontRef idx="minor">
+              <a:schemeClr val="lt1"/>
+            </a:fontRef>
+          </p:style>
+          <p:txBody>
+            <a:bodyPr rtlCol="0" anchor="ctr"/>
+            <a:lstStyle/>
+            <a:p>
+              <a:pPr algn="ctr"/>
+              <a:endParaRPr lang="en-US"/>
+            </a:p>
+          </p:txBody>
+        </p:sp>
+        <p:grpSp>
+          <p:nvGrpSpPr>
+            <p:cNvPr id="31" name="Group 30">
+              <a:extLst>
+                <a:ext uri="{FF2B5EF4-FFF2-40B4-BE49-F238E27FC236}">
+                  <a16:creationId xmlns:a16="http://schemas.microsoft.com/office/drawing/2014/main" id="{11C6ABC0-A98B-02A0-366C-8A114A4C56C6}"/>
+                </a:ext>
+              </a:extLst>
+            </p:cNvPr>
+            <p:cNvGrpSpPr/>
+            <p:nvPr/>
+          </p:nvGrpSpPr>
+          <p:grpSpPr>
+            <a:xfrm>
+              <a:off x="10256564" y="1650536"/>
+              <a:ext cx="2334930" cy="1810548"/>
+              <a:chOff x="8053475" y="2746628"/>
+              <a:chExt cx="2334930" cy="1810548"/>
+            </a:xfrm>
+          </p:grpSpPr>
+          <p:cxnSp>
+            <p:nvCxnSpPr>
+              <p:cNvPr id="32" name="Straight Arrow Connector 31">
+                <a:extLst>
+                  <a:ext uri="{FF2B5EF4-FFF2-40B4-BE49-F238E27FC236}">
+                    <a16:creationId xmlns:a16="http://schemas.microsoft.com/office/drawing/2014/main" id="{2BE929F9-4EAE-CC34-3AEF-8591F153061A}"/>
+                  </a:ext>
+                </a:extLst>
+              </p:cNvPr>
+              <p:cNvCxnSpPr>
+                <a:cxnSpLocks/>
+              </p:cNvCxnSpPr>
+              <p:nvPr/>
+            </p:nvCxnSpPr>
+            <p:spPr>
+              <a:xfrm flipV="1">
+                <a:off x="9208770" y="2746628"/>
+                <a:ext cx="0" cy="945766"/>
+              </a:xfrm>
+              <a:prstGeom prst="straightConnector1">
+                <a:avLst/>
+              </a:prstGeom>
+              <a:ln w="63500">
+                <a:solidFill>
+                  <a:schemeClr val="accent2"/>
+                </a:solidFill>
+                <a:tailEnd type="triangle"/>
+              </a:ln>
+            </p:spPr>
+            <p:style>
+              <a:lnRef idx="2">
+                <a:schemeClr val="accent1"/>
+              </a:lnRef>
+              <a:fillRef idx="0">
+                <a:schemeClr val="accent1"/>
+              </a:fillRef>
+              <a:effectRef idx="1">
+                <a:schemeClr val="accent1"/>
+              </a:effectRef>
+              <a:fontRef idx="minor">
+                <a:schemeClr val="tx1"/>
+              </a:fontRef>
+            </p:style>
+          </p:cxnSp>
+          <p:sp>
+            <p:nvSpPr>
+              <p:cNvPr id="33" name="TextBox 32">
+                <a:extLst>
+                  <a:ext uri="{FF2B5EF4-FFF2-40B4-BE49-F238E27FC236}">
+                    <a16:creationId xmlns:a16="http://schemas.microsoft.com/office/drawing/2014/main" id="{76CDAB8C-3D7E-0CE9-A5C9-10B1B4DB2ED8}"/>
+                  </a:ext>
+                </a:extLst>
+              </p:cNvPr>
+              <p:cNvSpPr txBox="1"/>
+              <p:nvPr/>
+            </p:nvSpPr>
+            <p:spPr>
+              <a:xfrm>
+                <a:off x="8053475" y="3726179"/>
+                <a:ext cx="2334930" cy="830997"/>
+              </a:xfrm>
+              <a:prstGeom prst="rect">
+                <a:avLst/>
+              </a:prstGeom>
+              <a:noFill/>
+            </p:spPr>
+            <p:txBody>
+              <a:bodyPr wrap="square" rtlCol="0">
+                <a:spAutoFit/>
+              </a:bodyPr>
+              <a:lstStyle/>
+              <a:p>
+                <a:pPr algn="ctr"/>
+                <a:r>
+                  <a:rPr lang="en-US" sz="2400" dirty="0">
+                    <a:latin typeface="Consolas" panose="020B0609020204030204" pitchFamily="49" charset="0"/>
+                    <a:cs typeface="Consolas" panose="020B0609020204030204" pitchFamily="49" charset="0"/>
+                  </a:rPr>
+                  <a:t>X</a:t>
+                </a:r>
+              </a:p>
+              <a:p>
+                <a:pPr algn="ctr"/>
+                <a:r>
+                  <a:rPr lang="en-US" sz="2400" dirty="0">
+                    <a:latin typeface="Consolas" panose="020B0609020204030204" pitchFamily="49" charset="0"/>
+                    <a:cs typeface="Consolas" panose="020B0609020204030204" pitchFamily="49" charset="0"/>
+                  </a:rPr>
+                  <a:t>(global)</a:t>
+                </a:r>
+              </a:p>
+            </p:txBody>
+          </p:sp>
+        </p:grpSp>
+        <p:grpSp>
+          <p:nvGrpSpPr>
+            <p:cNvPr id="34" name="Group 33">
+              <a:extLst>
+                <a:ext uri="{FF2B5EF4-FFF2-40B4-BE49-F238E27FC236}">
+                  <a16:creationId xmlns:a16="http://schemas.microsoft.com/office/drawing/2014/main" id="{00D2BF3D-8F33-C56F-02BB-94D8F293A109}"/>
+                </a:ext>
+              </a:extLst>
+            </p:cNvPr>
+            <p:cNvGrpSpPr/>
+            <p:nvPr/>
+          </p:nvGrpSpPr>
+          <p:grpSpPr>
+            <a:xfrm>
+              <a:off x="11995222" y="1650536"/>
+              <a:ext cx="2334930" cy="1810548"/>
+              <a:chOff x="8053475" y="2746628"/>
+              <a:chExt cx="2334930" cy="1810548"/>
+            </a:xfrm>
+          </p:grpSpPr>
+          <p:cxnSp>
+            <p:nvCxnSpPr>
+              <p:cNvPr id="35" name="Straight Arrow Connector 34">
+                <a:extLst>
+                  <a:ext uri="{FF2B5EF4-FFF2-40B4-BE49-F238E27FC236}">
+                    <a16:creationId xmlns:a16="http://schemas.microsoft.com/office/drawing/2014/main" id="{07C09007-41CE-84AC-523B-26B07671CE76}"/>
+                  </a:ext>
+                </a:extLst>
+              </p:cNvPr>
+              <p:cNvCxnSpPr>
+                <a:cxnSpLocks/>
+              </p:cNvCxnSpPr>
+              <p:nvPr/>
+            </p:nvCxnSpPr>
+            <p:spPr>
+              <a:xfrm flipV="1">
+                <a:off x="9208770" y="2746628"/>
+                <a:ext cx="0" cy="945766"/>
+              </a:xfrm>
+              <a:prstGeom prst="straightConnector1">
+                <a:avLst/>
+              </a:prstGeom>
+              <a:ln w="63500">
+                <a:solidFill>
+                  <a:schemeClr val="accent2"/>
+                </a:solidFill>
+                <a:tailEnd type="triangle"/>
+              </a:ln>
+            </p:spPr>
+            <p:style>
+              <a:lnRef idx="2">
+                <a:schemeClr val="accent1"/>
+              </a:lnRef>
+              <a:fillRef idx="0">
+                <a:schemeClr val="accent1"/>
+              </a:fillRef>
+              <a:effectRef idx="1">
+                <a:schemeClr val="accent1"/>
+              </a:effectRef>
+              <a:fontRef idx="minor">
+                <a:schemeClr val="tx1"/>
+              </a:fontRef>
+            </p:style>
+          </p:cxnSp>
+          <p:sp>
+            <p:nvSpPr>
+              <p:cNvPr id="36" name="TextBox 35">
+                <a:extLst>
+                  <a:ext uri="{FF2B5EF4-FFF2-40B4-BE49-F238E27FC236}">
+                    <a16:creationId xmlns:a16="http://schemas.microsoft.com/office/drawing/2014/main" id="{DAA18984-CCA1-7E99-4C06-E187AFA0EB94}"/>
+                  </a:ext>
+                </a:extLst>
+              </p:cNvPr>
+              <p:cNvSpPr txBox="1"/>
+              <p:nvPr/>
+            </p:nvSpPr>
+            <p:spPr>
+              <a:xfrm>
+                <a:off x="8053475" y="3726179"/>
+                <a:ext cx="2334930" cy="830997"/>
+              </a:xfrm>
+              <a:prstGeom prst="rect">
+                <a:avLst/>
+              </a:prstGeom>
+              <a:noFill/>
+            </p:spPr>
+            <p:txBody>
+              <a:bodyPr wrap="square" rtlCol="0">
+                <a:spAutoFit/>
+              </a:bodyPr>
+              <a:lstStyle/>
+              <a:p>
+                <a:pPr algn="ctr"/>
+                <a:r>
+                  <a:rPr lang="en-US" sz="2400" dirty="0">
+                    <a:latin typeface="Consolas" panose="020B0609020204030204" pitchFamily="49" charset="0"/>
+                    <a:cs typeface="Consolas" panose="020B0609020204030204" pitchFamily="49" charset="0"/>
+                  </a:rPr>
+                  <a:t>X</a:t>
+                </a:r>
+              </a:p>
+              <a:p>
+                <a:pPr algn="ctr"/>
+                <a:r>
+                  <a:rPr lang="en-US" sz="2400" dirty="0">
+                    <a:latin typeface="Consolas" panose="020B0609020204030204" pitchFamily="49" charset="0"/>
+                    <a:cs typeface="Consolas" panose="020B0609020204030204" pitchFamily="49" charset="0"/>
+                  </a:rPr>
+                  <a:t>(local)</a:t>
+                </a:r>
+              </a:p>
+            </p:txBody>
+          </p:sp>
+        </p:grpSp>
+        <p:sp>
+          <p:nvSpPr>
+            <p:cNvPr id="37" name="TextBox 36">
+              <a:extLst>
+                <a:ext uri="{FF2B5EF4-FFF2-40B4-BE49-F238E27FC236}">
+                  <a16:creationId xmlns:a16="http://schemas.microsoft.com/office/drawing/2014/main" id="{033F70E7-06B9-E069-8EBC-A976A5F416C9}"/>
+                </a:ext>
+              </a:extLst>
+            </p:cNvPr>
+            <p:cNvSpPr txBox="1"/>
+            <p:nvPr/>
+          </p:nvSpPr>
+          <p:spPr>
+            <a:xfrm>
+              <a:off x="15514923" y="-658066"/>
+              <a:ext cx="1860698" cy="923330"/>
+            </a:xfrm>
+            <a:prstGeom prst="rect">
+              <a:avLst/>
+            </a:prstGeom>
+            <a:noFill/>
+          </p:spPr>
+          <p:txBody>
+            <a:bodyPr wrap="square" rtlCol="0">
+              <a:spAutoFit/>
+            </a:bodyPr>
+            <a:lstStyle/>
+            <a:p>
+              <a:pPr algn="ctr"/>
+              <a:r>
+                <a:rPr lang="en-US" dirty="0">
+                  <a:solidFill>
+                    <a:schemeClr val="bg1"/>
+                  </a:solidFill>
+                </a:rPr>
+                <a:t>Value: 6</a:t>
+              </a:r>
+            </a:p>
+            <a:p>
+              <a:pPr algn="ctr"/>
+              <a:r>
+                <a:rPr lang="en-US" dirty="0">
+                  <a:solidFill>
+                    <a:schemeClr val="bg1"/>
+                  </a:solidFill>
+                </a:rPr>
+                <a:t>Address: 3</a:t>
+              </a:r>
+            </a:p>
+            <a:p>
+              <a:pPr algn="ctr"/>
+              <a:r>
+                <a:rPr lang="en-US" dirty="0">
+                  <a:solidFill>
+                    <a:schemeClr val="bg1"/>
+                  </a:solidFill>
+                </a:rPr>
+                <a:t>Type: Integer</a:t>
+              </a:r>
+            </a:p>
+          </p:txBody>
+        </p:sp>
+        <p:cxnSp>
+          <p:nvCxnSpPr>
+            <p:cNvPr id="39" name="Elbow Connector 38">
+              <a:extLst>
+                <a:ext uri="{FF2B5EF4-FFF2-40B4-BE49-F238E27FC236}">
+                  <a16:creationId xmlns:a16="http://schemas.microsoft.com/office/drawing/2014/main" id="{1C106301-90EF-A5E2-1E88-A2EFB3A21F12}"/>
+                </a:ext>
+              </a:extLst>
+            </p:cNvPr>
+            <p:cNvCxnSpPr>
+              <a:cxnSpLocks/>
+            </p:cNvCxnSpPr>
+            <p:nvPr/>
+          </p:nvCxnSpPr>
+          <p:spPr>
+            <a:xfrm flipV="1">
+              <a:off x="14192974" y="225180"/>
+              <a:ext cx="2236786" cy="693981"/>
+            </a:xfrm>
+            <a:prstGeom prst="bentConnector2">
+              <a:avLst/>
+            </a:prstGeom>
+            <a:ln w="63500">
+              <a:solidFill>
+                <a:schemeClr val="accent2"/>
+              </a:solidFill>
+              <a:tailEnd type="triangle"/>
+            </a:ln>
+          </p:spPr>
+          <p:style>
+            <a:lnRef idx="2">
+              <a:schemeClr val="accent1"/>
+            </a:lnRef>
+            <a:fillRef idx="0">
+              <a:schemeClr val="accent1"/>
+            </a:fillRef>
+            <a:effectRef idx="1">
+              <a:schemeClr val="accent1"/>
+            </a:effectRef>
+            <a:fontRef idx="minor">
+              <a:schemeClr val="tx1"/>
+            </a:fontRef>
+          </p:style>
+        </p:cxnSp>
+      </p:grpSp>
+      <p:grpSp>
+        <p:nvGrpSpPr>
+          <p:cNvPr id="62" name="Group 61">
+            <a:extLst>
+              <a:ext uri="{FF2B5EF4-FFF2-40B4-BE49-F238E27FC236}">
+                <a16:creationId xmlns:a16="http://schemas.microsoft.com/office/drawing/2014/main" id="{87DB2D66-6E3A-8128-E952-85DE8137DA03}"/>
+              </a:ext>
+            </a:extLst>
+          </p:cNvPr>
+          <p:cNvGrpSpPr/>
+          <p:nvPr/>
+        </p:nvGrpSpPr>
+        <p:grpSpPr>
+          <a:xfrm>
+            <a:off x="776924" y="329465"/>
+            <a:ext cx="6273204" cy="5139126"/>
+            <a:chOff x="776924" y="329465"/>
+            <a:chExt cx="6273204" cy="5139126"/>
+          </a:xfrm>
+        </p:grpSpPr>
+        <p:sp>
+          <p:nvSpPr>
+            <p:cNvPr id="2" name="Rounded Rectangle 1">
+              <a:extLst>
+                <a:ext uri="{FF2B5EF4-FFF2-40B4-BE49-F238E27FC236}">
+                  <a16:creationId xmlns:a16="http://schemas.microsoft.com/office/drawing/2014/main" id="{9000D93D-3E65-E339-4AFA-805F564E6C30}"/>
+                </a:ext>
+              </a:extLst>
+            </p:cNvPr>
+            <p:cNvSpPr/>
+            <p:nvPr/>
+          </p:nvSpPr>
+          <p:spPr>
+            <a:xfrm>
+              <a:off x="776924" y="1103723"/>
+              <a:ext cx="6273204" cy="3179519"/>
+            </a:xfrm>
+            <a:prstGeom prst="roundRect">
+              <a:avLst/>
+            </a:prstGeom>
+            <a:noFill/>
+            <a:ln w="38100">
+              <a:solidFill>
+                <a:schemeClr val="tx1"/>
+              </a:solidFill>
+            </a:ln>
+          </p:spPr>
+          <p:style>
+            <a:lnRef idx="2">
+              <a:schemeClr val="accent1">
+                <a:shade val="15000"/>
+              </a:schemeClr>
+            </a:lnRef>
+            <a:fillRef idx="1">
+              <a:schemeClr val="accent1"/>
+            </a:fillRef>
+            <a:effectRef idx="0">
+              <a:schemeClr val="accent1"/>
+            </a:effectRef>
+            <a:fontRef idx="minor">
+              <a:schemeClr val="lt1"/>
+            </a:fontRef>
+          </p:style>
+          <p:txBody>
+            <a:bodyPr rtlCol="0" anchor="ctr"/>
+            <a:lstStyle/>
+            <a:p>
+              <a:pPr algn="ctr"/>
+              <a:endParaRPr lang="en-US"/>
+            </a:p>
+          </p:txBody>
+        </p:sp>
+        <p:sp>
+          <p:nvSpPr>
+            <p:cNvPr id="3" name="Rounded Rectangle 2">
+              <a:extLst>
+                <a:ext uri="{FF2B5EF4-FFF2-40B4-BE49-F238E27FC236}">
+                  <a16:creationId xmlns:a16="http://schemas.microsoft.com/office/drawing/2014/main" id="{2068B745-DB8F-93D8-2085-791924E7656B}"/>
+                </a:ext>
+              </a:extLst>
+            </p:cNvPr>
+            <p:cNvSpPr/>
+            <p:nvPr/>
+          </p:nvSpPr>
+          <p:spPr>
+            <a:xfrm>
+              <a:off x="1301462" y="1334449"/>
+              <a:ext cx="2452577" cy="1472610"/>
+            </a:xfrm>
+            <a:prstGeom prst="roundRect">
+              <a:avLst/>
+            </a:prstGeom>
+            <a:solidFill>
+              <a:schemeClr val="accent1"/>
+            </a:solidFill>
+            <a:ln w="38100">
+              <a:solidFill>
+                <a:schemeClr val="tx1"/>
+              </a:solidFill>
+            </a:ln>
+          </p:spPr>
+          <p:style>
+            <a:lnRef idx="2">
+              <a:schemeClr val="accent1">
+                <a:shade val="15000"/>
+              </a:schemeClr>
+            </a:lnRef>
+            <a:fillRef idx="1">
+              <a:schemeClr val="accent1"/>
+            </a:fillRef>
+            <a:effectRef idx="0">
+              <a:schemeClr val="accent1"/>
+            </a:effectRef>
+            <a:fontRef idx="minor">
+              <a:schemeClr val="lt1"/>
+            </a:fontRef>
+          </p:style>
+          <p:txBody>
+            <a:bodyPr rtlCol="0" anchor="ctr"/>
+            <a:lstStyle/>
+            <a:p>
+              <a:pPr algn="ctr"/>
+              <a:endParaRPr lang="en-US"/>
+            </a:p>
+          </p:txBody>
+        </p:sp>
+        <p:sp>
+          <p:nvSpPr>
+            <p:cNvPr id="4" name="TextBox 3">
+              <a:extLst>
+                <a:ext uri="{FF2B5EF4-FFF2-40B4-BE49-F238E27FC236}">
+                  <a16:creationId xmlns:a16="http://schemas.microsoft.com/office/drawing/2014/main" id="{322E8261-6FEB-0D4B-13FF-C55FFA9B584A}"/>
+                </a:ext>
+              </a:extLst>
+            </p:cNvPr>
+            <p:cNvSpPr txBox="1"/>
+            <p:nvPr/>
+          </p:nvSpPr>
+          <p:spPr>
+            <a:xfrm>
+              <a:off x="1597401" y="1607282"/>
+              <a:ext cx="1860698" cy="923330"/>
+            </a:xfrm>
+            <a:prstGeom prst="rect">
+              <a:avLst/>
+            </a:prstGeom>
+            <a:noFill/>
+          </p:spPr>
+          <p:txBody>
+            <a:bodyPr wrap="square" rtlCol="0">
+              <a:spAutoFit/>
+            </a:bodyPr>
+            <a:lstStyle/>
+            <a:p>
+              <a:pPr algn="ctr"/>
+              <a:r>
+                <a:rPr lang="en-US" dirty="0">
+                  <a:solidFill>
+                    <a:schemeClr val="bg1"/>
+                  </a:solidFill>
+                </a:rPr>
+                <a:t>Value: 1</a:t>
+              </a:r>
+            </a:p>
+            <a:p>
+              <a:pPr algn="ctr"/>
+              <a:r>
+                <a:rPr lang="en-US" dirty="0">
+                  <a:solidFill>
+                    <a:schemeClr val="bg1"/>
+                  </a:solidFill>
+                </a:rPr>
+                <a:t>Address: 1</a:t>
+              </a:r>
+            </a:p>
+            <a:p>
+              <a:pPr algn="ctr"/>
+              <a:r>
+                <a:rPr lang="en-US" dirty="0">
+                  <a:solidFill>
+                    <a:schemeClr val="bg1"/>
+                  </a:solidFill>
+                </a:rPr>
+                <a:t>Type: Integer</a:t>
+              </a:r>
+            </a:p>
+          </p:txBody>
+        </p:sp>
+        <p:sp>
+          <p:nvSpPr>
+            <p:cNvPr id="5" name="Rounded Rectangle 4">
+              <a:extLst>
+                <a:ext uri="{FF2B5EF4-FFF2-40B4-BE49-F238E27FC236}">
+                  <a16:creationId xmlns:a16="http://schemas.microsoft.com/office/drawing/2014/main" id="{67D1B2D3-BA7F-C045-AC8A-2F7607842C1F}"/>
+                </a:ext>
+              </a:extLst>
+            </p:cNvPr>
+            <p:cNvSpPr/>
+            <p:nvPr/>
+          </p:nvSpPr>
+          <p:spPr>
+            <a:xfrm>
+              <a:off x="4175797" y="1334449"/>
+              <a:ext cx="2452577" cy="1472610"/>
+            </a:xfrm>
+            <a:prstGeom prst="roundRect">
+              <a:avLst/>
+            </a:prstGeom>
+            <a:solidFill>
+              <a:schemeClr val="accent1"/>
+            </a:solidFill>
+            <a:ln w="38100">
+              <a:solidFill>
+                <a:schemeClr val="tx1"/>
+              </a:solidFill>
+            </a:ln>
+          </p:spPr>
+          <p:style>
+            <a:lnRef idx="2">
+              <a:schemeClr val="accent1">
+                <a:shade val="15000"/>
+              </a:schemeClr>
+            </a:lnRef>
+            <a:fillRef idx="1">
+              <a:schemeClr val="accent1"/>
+            </a:fillRef>
+            <a:effectRef idx="0">
+              <a:schemeClr val="accent1"/>
+            </a:effectRef>
+            <a:fontRef idx="minor">
+              <a:schemeClr val="lt1"/>
+            </a:fontRef>
+          </p:style>
+          <p:txBody>
+            <a:bodyPr rtlCol="0" anchor="ctr"/>
+            <a:lstStyle/>
+            <a:p>
+              <a:pPr algn="ctr"/>
+              <a:endParaRPr lang="en-US"/>
+            </a:p>
+          </p:txBody>
+        </p:sp>
+        <p:sp>
+          <p:nvSpPr>
+            <p:cNvPr id="6" name="TextBox 5">
+              <a:extLst>
+                <a:ext uri="{FF2B5EF4-FFF2-40B4-BE49-F238E27FC236}">
+                  <a16:creationId xmlns:a16="http://schemas.microsoft.com/office/drawing/2014/main" id="{941FCE07-CA6A-BC13-A657-8261B063BF95}"/>
+                </a:ext>
+              </a:extLst>
+            </p:cNvPr>
+            <p:cNvSpPr txBox="1"/>
+            <p:nvPr/>
+          </p:nvSpPr>
+          <p:spPr>
+            <a:xfrm>
+              <a:off x="4471736" y="1607282"/>
+              <a:ext cx="1860698" cy="923330"/>
+            </a:xfrm>
+            <a:prstGeom prst="rect">
+              <a:avLst/>
+            </a:prstGeom>
+            <a:noFill/>
+          </p:spPr>
+          <p:txBody>
+            <a:bodyPr wrap="square" rtlCol="0">
+              <a:spAutoFit/>
+            </a:bodyPr>
+            <a:lstStyle/>
+            <a:p>
+              <a:pPr algn="ctr"/>
+              <a:r>
+                <a:rPr lang="en-US" dirty="0">
+                  <a:solidFill>
+                    <a:schemeClr val="bg1"/>
+                  </a:solidFill>
+                </a:rPr>
+                <a:t>Value: 3</a:t>
+              </a:r>
+            </a:p>
+            <a:p>
+              <a:pPr algn="ctr"/>
+              <a:r>
+                <a:rPr lang="en-US" dirty="0">
+                  <a:solidFill>
+                    <a:schemeClr val="bg1"/>
+                  </a:solidFill>
+                </a:rPr>
+                <a:t>Address: 2</a:t>
+              </a:r>
+            </a:p>
+            <a:p>
+              <a:pPr algn="ctr"/>
+              <a:r>
+                <a:rPr lang="en-US" dirty="0">
+                  <a:solidFill>
+                    <a:schemeClr val="bg1"/>
+                  </a:solidFill>
+                </a:rPr>
+                <a:t>Type: Integer</a:t>
+              </a:r>
+            </a:p>
+          </p:txBody>
+        </p:sp>
+        <p:sp>
+          <p:nvSpPr>
+            <p:cNvPr id="13" name="TextBox 12">
+              <a:extLst>
+                <a:ext uri="{FF2B5EF4-FFF2-40B4-BE49-F238E27FC236}">
+                  <a16:creationId xmlns:a16="http://schemas.microsoft.com/office/drawing/2014/main" id="{C228CBCD-A860-F697-93CA-827E9B5267EB}"/>
+                </a:ext>
+              </a:extLst>
+            </p:cNvPr>
+            <p:cNvSpPr txBox="1"/>
+            <p:nvPr/>
+          </p:nvSpPr>
+          <p:spPr>
+            <a:xfrm>
+              <a:off x="3052290" y="329465"/>
+              <a:ext cx="1711842" cy="461665"/>
+            </a:xfrm>
+            <a:prstGeom prst="rect">
+              <a:avLst/>
+            </a:prstGeom>
+            <a:noFill/>
+          </p:spPr>
+          <p:txBody>
+            <a:bodyPr wrap="square" rtlCol="0">
+              <a:spAutoFit/>
+            </a:bodyPr>
+            <a:lstStyle/>
+            <a:p>
+              <a:pPr algn="ctr"/>
+              <a:r>
+                <a:rPr lang="en-US" sz="2400" dirty="0"/>
+                <a:t>Memory</a:t>
+              </a:r>
+            </a:p>
+          </p:txBody>
+        </p:sp>
+        <p:sp>
+          <p:nvSpPr>
+            <p:cNvPr id="14" name="Rounded Rectangle 13">
+              <a:extLst>
+                <a:ext uri="{FF2B5EF4-FFF2-40B4-BE49-F238E27FC236}">
+                  <a16:creationId xmlns:a16="http://schemas.microsoft.com/office/drawing/2014/main" id="{24695CC7-A4A3-1CED-E4A3-128889DFC51B}"/>
+                </a:ext>
+              </a:extLst>
+            </p:cNvPr>
+            <p:cNvSpPr/>
+            <p:nvPr/>
+          </p:nvSpPr>
+          <p:spPr>
+            <a:xfrm>
+              <a:off x="1301462" y="2959470"/>
+              <a:ext cx="5326912" cy="1083141"/>
+            </a:xfrm>
+            <a:prstGeom prst="roundRect">
+              <a:avLst/>
+            </a:prstGeom>
+            <a:solidFill>
+              <a:schemeClr val="accent1"/>
+            </a:solidFill>
+            <a:ln w="38100">
+              <a:solidFill>
+                <a:schemeClr val="tx1"/>
+              </a:solidFill>
+            </a:ln>
+          </p:spPr>
+          <p:style>
+            <a:lnRef idx="2">
+              <a:schemeClr val="accent1">
+                <a:shade val="15000"/>
+              </a:schemeClr>
+            </a:lnRef>
+            <a:fillRef idx="1">
+              <a:schemeClr val="accent1"/>
+            </a:fillRef>
+            <a:effectRef idx="0">
+              <a:schemeClr val="accent1"/>
+            </a:effectRef>
+            <a:fontRef idx="minor">
+              <a:schemeClr val="lt1"/>
+            </a:fontRef>
+          </p:style>
+          <p:txBody>
+            <a:bodyPr rtlCol="0" anchor="ctr"/>
+            <a:lstStyle/>
+            <a:p>
+              <a:pPr algn="ctr"/>
+              <a:endParaRPr lang="en-US"/>
+            </a:p>
+          </p:txBody>
+        </p:sp>
+        <p:sp>
+          <p:nvSpPr>
+            <p:cNvPr id="15" name="TextBox 14">
+              <a:extLst>
+                <a:ext uri="{FF2B5EF4-FFF2-40B4-BE49-F238E27FC236}">
+                  <a16:creationId xmlns:a16="http://schemas.microsoft.com/office/drawing/2014/main" id="{E98FB0ED-000A-BB0F-8D96-6C1E983D195C}"/>
+                </a:ext>
+              </a:extLst>
+            </p:cNvPr>
+            <p:cNvSpPr txBox="1"/>
+            <p:nvPr/>
+          </p:nvSpPr>
+          <p:spPr>
+            <a:xfrm>
+              <a:off x="1439251" y="3091795"/>
+              <a:ext cx="4913326" cy="369332"/>
+            </a:xfrm>
+            <a:prstGeom prst="rect">
+              <a:avLst/>
+            </a:prstGeom>
+            <a:noFill/>
+          </p:spPr>
+          <p:txBody>
+            <a:bodyPr wrap="square" rtlCol="0">
+              <a:spAutoFit/>
+            </a:bodyPr>
+            <a:lstStyle/>
+            <a:p>
+              <a:pPr algn="ctr"/>
+              <a:r>
+                <a:rPr lang="en-US" dirty="0">
+                  <a:solidFill>
+                    <a:schemeClr val="bg1"/>
+                  </a:solidFill>
+                </a:rPr>
+                <a:t>Ref: 01			Ref: 02</a:t>
+              </a:r>
+            </a:p>
+          </p:txBody>
+        </p:sp>
+        <p:cxnSp>
+          <p:nvCxnSpPr>
+            <p:cNvPr id="16" name="Straight Arrow Connector 15">
+              <a:extLst>
+                <a:ext uri="{FF2B5EF4-FFF2-40B4-BE49-F238E27FC236}">
+                  <a16:creationId xmlns:a16="http://schemas.microsoft.com/office/drawing/2014/main" id="{E182181D-8674-49FA-7798-39784157A20D}"/>
+                </a:ext>
+              </a:extLst>
+            </p:cNvPr>
+            <p:cNvCxnSpPr>
+              <a:cxnSpLocks/>
+            </p:cNvCxnSpPr>
+            <p:nvPr/>
+          </p:nvCxnSpPr>
+          <p:spPr>
+            <a:xfrm flipV="1">
+              <a:off x="2539636" y="2510310"/>
+              <a:ext cx="0" cy="593497"/>
+            </a:xfrm>
+            <a:prstGeom prst="straightConnector1">
+              <a:avLst/>
+            </a:prstGeom>
+            <a:ln w="63500">
+              <a:solidFill>
+                <a:schemeClr val="accent2"/>
+              </a:solidFill>
+              <a:tailEnd type="triangle"/>
+            </a:ln>
+          </p:spPr>
+          <p:style>
+            <a:lnRef idx="2">
+              <a:schemeClr val="accent1"/>
+            </a:lnRef>
+            <a:fillRef idx="0">
+              <a:schemeClr val="accent1"/>
+            </a:fillRef>
+            <a:effectRef idx="1">
+              <a:schemeClr val="accent1"/>
+            </a:effectRef>
+            <a:fontRef idx="minor">
+              <a:schemeClr val="tx1"/>
+            </a:fontRef>
+          </p:style>
+        </p:cxnSp>
+        <p:cxnSp>
+          <p:nvCxnSpPr>
+            <p:cNvPr id="18" name="Straight Arrow Connector 17">
+              <a:extLst>
+                <a:ext uri="{FF2B5EF4-FFF2-40B4-BE49-F238E27FC236}">
+                  <a16:creationId xmlns:a16="http://schemas.microsoft.com/office/drawing/2014/main" id="{25C38074-DCF9-E4A1-C251-89097E6765C5}"/>
+                </a:ext>
+              </a:extLst>
+            </p:cNvPr>
+            <p:cNvCxnSpPr>
+              <a:cxnSpLocks/>
+            </p:cNvCxnSpPr>
+            <p:nvPr/>
+          </p:nvCxnSpPr>
+          <p:spPr>
+            <a:xfrm flipV="1">
+              <a:off x="5491513" y="2510310"/>
+              <a:ext cx="0" cy="593497"/>
+            </a:xfrm>
+            <a:prstGeom prst="straightConnector1">
+              <a:avLst/>
+            </a:prstGeom>
+            <a:ln w="63500">
+              <a:solidFill>
+                <a:schemeClr val="accent2"/>
+              </a:solidFill>
+              <a:tailEnd type="triangle"/>
+            </a:ln>
+          </p:spPr>
+          <p:style>
+            <a:lnRef idx="2">
+              <a:schemeClr val="accent1"/>
+            </a:lnRef>
+            <a:fillRef idx="0">
+              <a:schemeClr val="accent1"/>
+            </a:fillRef>
+            <a:effectRef idx="1">
+              <a:schemeClr val="accent1"/>
+            </a:effectRef>
+            <a:fontRef idx="minor">
+              <a:schemeClr val="tx1"/>
+            </a:fontRef>
+          </p:style>
+        </p:cxnSp>
+        <p:grpSp>
+          <p:nvGrpSpPr>
+            <p:cNvPr id="10" name="Group 9">
+              <a:extLst>
+                <a:ext uri="{FF2B5EF4-FFF2-40B4-BE49-F238E27FC236}">
+                  <a16:creationId xmlns:a16="http://schemas.microsoft.com/office/drawing/2014/main" id="{19553EE0-F40F-6BB2-EA42-14DD924FA591}"/>
+                </a:ext>
+              </a:extLst>
+            </p:cNvPr>
+            <p:cNvGrpSpPr/>
+            <p:nvPr/>
+          </p:nvGrpSpPr>
+          <p:grpSpPr>
+            <a:xfrm>
+              <a:off x="2826208" y="4027375"/>
+              <a:ext cx="2334930" cy="1441216"/>
+              <a:chOff x="8994858" y="2796490"/>
+              <a:chExt cx="2334930" cy="1441216"/>
+            </a:xfrm>
+          </p:grpSpPr>
+          <p:cxnSp>
+            <p:nvCxnSpPr>
+              <p:cNvPr id="11" name="Straight Arrow Connector 10">
+                <a:extLst>
+                  <a:ext uri="{FF2B5EF4-FFF2-40B4-BE49-F238E27FC236}">
+                    <a16:creationId xmlns:a16="http://schemas.microsoft.com/office/drawing/2014/main" id="{721274E1-CD15-256B-EAF7-1F93FC884B33}"/>
+                  </a:ext>
+                </a:extLst>
+              </p:cNvPr>
+              <p:cNvCxnSpPr>
+                <a:cxnSpLocks/>
+              </p:cNvCxnSpPr>
+              <p:nvPr/>
+            </p:nvCxnSpPr>
+            <p:spPr>
+              <a:xfrm flipV="1">
+                <a:off x="10150153" y="2796490"/>
+                <a:ext cx="0" cy="945766"/>
+              </a:xfrm>
+              <a:prstGeom prst="straightConnector1">
+                <a:avLst/>
+              </a:prstGeom>
+              <a:ln w="63500">
+                <a:solidFill>
+                  <a:schemeClr val="accent2"/>
+                </a:solidFill>
+                <a:tailEnd type="triangle"/>
+              </a:ln>
+            </p:spPr>
+            <p:style>
+              <a:lnRef idx="2">
+                <a:schemeClr val="accent1"/>
+              </a:lnRef>
+              <a:fillRef idx="0">
+                <a:schemeClr val="accent1"/>
+              </a:fillRef>
+              <a:effectRef idx="1">
+                <a:schemeClr val="accent1"/>
+              </a:effectRef>
+              <a:fontRef idx="minor">
+                <a:schemeClr val="tx1"/>
+              </a:fontRef>
+            </p:style>
+          </p:cxnSp>
+          <p:sp>
+            <p:nvSpPr>
+              <p:cNvPr id="12" name="TextBox 11">
+                <a:extLst>
+                  <a:ext uri="{FF2B5EF4-FFF2-40B4-BE49-F238E27FC236}">
+                    <a16:creationId xmlns:a16="http://schemas.microsoft.com/office/drawing/2014/main" id="{73A06DFA-1369-7514-D0E2-8C4254013FC3}"/>
+                  </a:ext>
+                </a:extLst>
+              </p:cNvPr>
+              <p:cNvSpPr txBox="1"/>
+              <p:nvPr/>
+            </p:nvSpPr>
+            <p:spPr>
+              <a:xfrm>
+                <a:off x="8994858" y="3776041"/>
+                <a:ext cx="2334930" cy="461665"/>
+              </a:xfrm>
+              <a:prstGeom prst="rect">
+                <a:avLst/>
+              </a:prstGeom>
+              <a:noFill/>
+            </p:spPr>
+            <p:txBody>
+              <a:bodyPr wrap="square" rtlCol="0">
+                <a:spAutoFit/>
+              </a:bodyPr>
+              <a:lstStyle/>
+              <a:p>
+                <a:pPr algn="ctr"/>
+                <a:r>
+                  <a:rPr lang="en-US" sz="2400" dirty="0">
+                    <a:latin typeface="Consolas" panose="020B0609020204030204" pitchFamily="49" charset="0"/>
+                    <a:cs typeface="Consolas" panose="020B0609020204030204" pitchFamily="49" charset="0"/>
+                  </a:rPr>
+                  <a:t>X</a:t>
+                </a:r>
+              </a:p>
+            </p:txBody>
+          </p:sp>
+        </p:grpSp>
+        <p:sp>
+          <p:nvSpPr>
+            <p:cNvPr id="17" name="TextBox 16">
+              <a:extLst>
+                <a:ext uri="{FF2B5EF4-FFF2-40B4-BE49-F238E27FC236}">
+                  <a16:creationId xmlns:a16="http://schemas.microsoft.com/office/drawing/2014/main" id="{0F68367C-8EB1-B18A-1A71-17F16A5A519E}"/>
+                </a:ext>
+              </a:extLst>
+            </p:cNvPr>
+            <p:cNvSpPr txBox="1"/>
+            <p:nvPr/>
+          </p:nvSpPr>
+          <p:spPr>
+            <a:xfrm>
+              <a:off x="2903434" y="3379342"/>
+              <a:ext cx="1860698" cy="646331"/>
+            </a:xfrm>
+            <a:prstGeom prst="rect">
+              <a:avLst/>
+            </a:prstGeom>
+            <a:noFill/>
+          </p:spPr>
+          <p:txBody>
+            <a:bodyPr wrap="square" rtlCol="0">
+              <a:spAutoFit/>
+            </a:bodyPr>
+            <a:lstStyle/>
+            <a:p>
+              <a:pPr algn="ctr"/>
+              <a:r>
+                <a:rPr lang="en-US" dirty="0">
+                  <a:solidFill>
+                    <a:schemeClr val="bg1"/>
+                  </a:solidFill>
+                </a:rPr>
+                <a:t>Address: 10</a:t>
+              </a:r>
+            </a:p>
+            <a:p>
+              <a:pPr algn="ctr"/>
+              <a:r>
+                <a:rPr lang="en-US" dirty="0">
+                  <a:solidFill>
+                    <a:schemeClr val="bg1"/>
+                  </a:solidFill>
+                </a:rPr>
+                <a:t>Type: List</a:t>
+              </a:r>
+            </a:p>
+          </p:txBody>
+        </p:sp>
+      </p:grpSp>
+      <p:grpSp>
+        <p:nvGrpSpPr>
+          <p:cNvPr id="58" name="Group 57">
+            <a:extLst>
+              <a:ext uri="{FF2B5EF4-FFF2-40B4-BE49-F238E27FC236}">
+                <a16:creationId xmlns:a16="http://schemas.microsoft.com/office/drawing/2014/main" id="{641671C8-8B0E-ECD2-B9B4-B792BE44C4E6}"/>
+              </a:ext>
+            </a:extLst>
+          </p:cNvPr>
+          <p:cNvGrpSpPr/>
+          <p:nvPr/>
+        </p:nvGrpSpPr>
+        <p:grpSpPr>
+          <a:xfrm>
+            <a:off x="9148663" y="4109789"/>
+            <a:ext cx="8992718" cy="5271925"/>
+            <a:chOff x="9148663" y="4109789"/>
+            <a:chExt cx="8992718" cy="5271925"/>
+          </a:xfrm>
+        </p:grpSpPr>
+        <p:sp>
+          <p:nvSpPr>
+            <p:cNvPr id="41" name="Rounded Rectangle 40">
+              <a:extLst>
+                <a:ext uri="{FF2B5EF4-FFF2-40B4-BE49-F238E27FC236}">
+                  <a16:creationId xmlns:a16="http://schemas.microsoft.com/office/drawing/2014/main" id="{C56DC98D-BF98-092A-5130-2F087F8C0533}"/>
+                </a:ext>
+              </a:extLst>
+            </p:cNvPr>
+            <p:cNvSpPr/>
+            <p:nvPr/>
+          </p:nvSpPr>
+          <p:spPr>
+            <a:xfrm>
+              <a:off x="9148663" y="4788158"/>
+              <a:ext cx="8992718" cy="3179519"/>
+            </a:xfrm>
+            <a:prstGeom prst="roundRect">
+              <a:avLst/>
+            </a:prstGeom>
+            <a:noFill/>
+            <a:ln w="38100">
+              <a:solidFill>
+                <a:schemeClr val="tx1"/>
+              </a:solidFill>
+            </a:ln>
+          </p:spPr>
+          <p:style>
+            <a:lnRef idx="2">
+              <a:schemeClr val="accent1">
+                <a:shade val="15000"/>
+              </a:schemeClr>
+            </a:lnRef>
+            <a:fillRef idx="1">
+              <a:schemeClr val="accent1"/>
+            </a:fillRef>
+            <a:effectRef idx="0">
+              <a:schemeClr val="accent1"/>
+            </a:effectRef>
+            <a:fontRef idx="minor">
+              <a:schemeClr val="lt1"/>
+            </a:fontRef>
+          </p:style>
+          <p:txBody>
+            <a:bodyPr rtlCol="0" anchor="ctr"/>
+            <a:lstStyle/>
+            <a:p>
+              <a:pPr algn="ctr"/>
+              <a:endParaRPr lang="en-US"/>
+            </a:p>
+          </p:txBody>
+        </p:sp>
+        <p:sp>
+          <p:nvSpPr>
+            <p:cNvPr id="42" name="Rounded Rectangle 41">
+              <a:extLst>
+                <a:ext uri="{FF2B5EF4-FFF2-40B4-BE49-F238E27FC236}">
+                  <a16:creationId xmlns:a16="http://schemas.microsoft.com/office/drawing/2014/main" id="{89BAA5E7-22A4-3D34-4CCE-9ADACCE62DE7}"/>
+                </a:ext>
+              </a:extLst>
+            </p:cNvPr>
+            <p:cNvSpPr/>
+            <p:nvPr/>
+          </p:nvSpPr>
+          <p:spPr>
+            <a:xfrm>
+              <a:off x="9673201" y="5018884"/>
+              <a:ext cx="2452577" cy="1472610"/>
+            </a:xfrm>
+            <a:prstGeom prst="roundRect">
+              <a:avLst/>
+            </a:prstGeom>
+            <a:solidFill>
+              <a:schemeClr val="accent1"/>
+            </a:solidFill>
+            <a:ln w="38100">
+              <a:solidFill>
+                <a:schemeClr val="tx1"/>
+              </a:solidFill>
+            </a:ln>
+          </p:spPr>
+          <p:style>
+            <a:lnRef idx="2">
+              <a:schemeClr val="accent1">
+                <a:shade val="15000"/>
+              </a:schemeClr>
+            </a:lnRef>
+            <a:fillRef idx="1">
+              <a:schemeClr val="accent1"/>
+            </a:fillRef>
+            <a:effectRef idx="0">
+              <a:schemeClr val="accent1"/>
+            </a:effectRef>
+            <a:fontRef idx="minor">
+              <a:schemeClr val="lt1"/>
+            </a:fontRef>
+          </p:style>
+          <p:txBody>
+            <a:bodyPr rtlCol="0" anchor="ctr"/>
+            <a:lstStyle/>
+            <a:p>
+              <a:pPr algn="ctr"/>
+              <a:endParaRPr lang="en-US"/>
+            </a:p>
+          </p:txBody>
+        </p:sp>
+        <p:sp>
+          <p:nvSpPr>
+            <p:cNvPr id="43" name="TextBox 42">
+              <a:extLst>
+                <a:ext uri="{FF2B5EF4-FFF2-40B4-BE49-F238E27FC236}">
+                  <a16:creationId xmlns:a16="http://schemas.microsoft.com/office/drawing/2014/main" id="{71E904B9-D81F-6803-D337-4A0934A8ECA4}"/>
+                </a:ext>
+              </a:extLst>
+            </p:cNvPr>
+            <p:cNvSpPr txBox="1"/>
+            <p:nvPr/>
+          </p:nvSpPr>
+          <p:spPr>
+            <a:xfrm>
+              <a:off x="9969140" y="5291717"/>
+              <a:ext cx="1860698" cy="923330"/>
+            </a:xfrm>
+            <a:prstGeom prst="rect">
+              <a:avLst/>
+            </a:prstGeom>
+            <a:noFill/>
+          </p:spPr>
+          <p:txBody>
+            <a:bodyPr wrap="square" rtlCol="0">
+              <a:spAutoFit/>
+            </a:bodyPr>
+            <a:lstStyle/>
+            <a:p>
+              <a:pPr algn="ctr"/>
+              <a:r>
+                <a:rPr lang="en-US" dirty="0">
+                  <a:solidFill>
+                    <a:schemeClr val="bg1"/>
+                  </a:solidFill>
+                </a:rPr>
+                <a:t>Value: 1</a:t>
+              </a:r>
+            </a:p>
+            <a:p>
+              <a:pPr algn="ctr"/>
+              <a:r>
+                <a:rPr lang="en-US" dirty="0">
+                  <a:solidFill>
+                    <a:schemeClr val="bg1"/>
+                  </a:solidFill>
+                </a:rPr>
+                <a:t>Address: 1</a:t>
+              </a:r>
+            </a:p>
+            <a:p>
+              <a:pPr algn="ctr"/>
+              <a:r>
+                <a:rPr lang="en-US" dirty="0">
+                  <a:solidFill>
+                    <a:schemeClr val="bg1"/>
+                  </a:solidFill>
+                </a:rPr>
+                <a:t>Type: Integer</a:t>
+              </a:r>
+            </a:p>
+          </p:txBody>
+        </p:sp>
+        <p:sp>
+          <p:nvSpPr>
+            <p:cNvPr id="44" name="Rounded Rectangle 43">
+              <a:extLst>
+                <a:ext uri="{FF2B5EF4-FFF2-40B4-BE49-F238E27FC236}">
+                  <a16:creationId xmlns:a16="http://schemas.microsoft.com/office/drawing/2014/main" id="{85F8EEC0-E531-AE32-C300-FB8731B49469}"/>
+                </a:ext>
+              </a:extLst>
+            </p:cNvPr>
+            <p:cNvSpPr/>
+            <p:nvPr/>
+          </p:nvSpPr>
+          <p:spPr>
+            <a:xfrm>
+              <a:off x="12454955" y="5006926"/>
+              <a:ext cx="2452577" cy="1472610"/>
+            </a:xfrm>
+            <a:prstGeom prst="roundRect">
+              <a:avLst/>
+            </a:prstGeom>
+            <a:solidFill>
+              <a:schemeClr val="accent1"/>
+            </a:solidFill>
+            <a:ln w="38100">
+              <a:solidFill>
+                <a:schemeClr val="tx1"/>
+              </a:solidFill>
+            </a:ln>
+          </p:spPr>
+          <p:style>
+            <a:lnRef idx="2">
+              <a:schemeClr val="accent1">
+                <a:shade val="15000"/>
+              </a:schemeClr>
+            </a:lnRef>
+            <a:fillRef idx="1">
+              <a:schemeClr val="accent1"/>
+            </a:fillRef>
+            <a:effectRef idx="0">
+              <a:schemeClr val="accent1"/>
+            </a:effectRef>
+            <a:fontRef idx="minor">
+              <a:schemeClr val="lt1"/>
+            </a:fontRef>
+          </p:style>
+          <p:txBody>
+            <a:bodyPr rtlCol="0" anchor="ctr"/>
+            <a:lstStyle/>
+            <a:p>
+              <a:pPr algn="ctr"/>
+              <a:endParaRPr lang="en-US"/>
+            </a:p>
+          </p:txBody>
+        </p:sp>
+        <p:sp>
+          <p:nvSpPr>
+            <p:cNvPr id="45" name="TextBox 44">
+              <a:extLst>
+                <a:ext uri="{FF2B5EF4-FFF2-40B4-BE49-F238E27FC236}">
+                  <a16:creationId xmlns:a16="http://schemas.microsoft.com/office/drawing/2014/main" id="{742CD093-FEB8-BD2E-B87A-72ED9B5A4B3E}"/>
+                </a:ext>
+              </a:extLst>
+            </p:cNvPr>
+            <p:cNvSpPr txBox="1"/>
+            <p:nvPr/>
+          </p:nvSpPr>
+          <p:spPr>
+            <a:xfrm>
+              <a:off x="12750894" y="5353656"/>
+              <a:ext cx="1860698" cy="923330"/>
+            </a:xfrm>
+            <a:prstGeom prst="rect">
+              <a:avLst/>
+            </a:prstGeom>
+            <a:noFill/>
+          </p:spPr>
+          <p:txBody>
+            <a:bodyPr wrap="square" rtlCol="0">
+              <a:spAutoFit/>
+            </a:bodyPr>
+            <a:lstStyle/>
+            <a:p>
+              <a:pPr algn="ctr"/>
+              <a:r>
+                <a:rPr lang="en-US" dirty="0">
+                  <a:solidFill>
+                    <a:schemeClr val="bg1"/>
+                  </a:solidFill>
+                </a:rPr>
+                <a:t>Value: 3</a:t>
+              </a:r>
+            </a:p>
+            <a:p>
+              <a:pPr algn="ctr"/>
+              <a:r>
+                <a:rPr lang="en-US" dirty="0">
+                  <a:solidFill>
+                    <a:schemeClr val="bg1"/>
+                  </a:solidFill>
+                </a:rPr>
+                <a:t>Address: 2</a:t>
+              </a:r>
+            </a:p>
+            <a:p>
+              <a:pPr algn="ctr"/>
+              <a:r>
+                <a:rPr lang="en-US" dirty="0">
+                  <a:solidFill>
+                    <a:schemeClr val="bg1"/>
+                  </a:solidFill>
+                </a:rPr>
+                <a:t>Type: Integer</a:t>
+              </a:r>
+            </a:p>
+          </p:txBody>
+        </p:sp>
+        <p:sp>
+          <p:nvSpPr>
+            <p:cNvPr id="46" name="TextBox 45">
+              <a:extLst>
+                <a:ext uri="{FF2B5EF4-FFF2-40B4-BE49-F238E27FC236}">
+                  <a16:creationId xmlns:a16="http://schemas.microsoft.com/office/drawing/2014/main" id="{4BACB375-4790-9DC9-47F1-5ACB13B4DCAD}"/>
+                </a:ext>
+              </a:extLst>
+            </p:cNvPr>
+            <p:cNvSpPr txBox="1"/>
+            <p:nvPr/>
+          </p:nvSpPr>
+          <p:spPr>
+            <a:xfrm>
+              <a:off x="12750894" y="4109789"/>
+              <a:ext cx="1711842" cy="461665"/>
+            </a:xfrm>
+            <a:prstGeom prst="rect">
+              <a:avLst/>
+            </a:prstGeom>
+            <a:noFill/>
+          </p:spPr>
+          <p:txBody>
+            <a:bodyPr wrap="square" rtlCol="0">
+              <a:spAutoFit/>
+            </a:bodyPr>
+            <a:lstStyle/>
+            <a:p>
+              <a:pPr algn="ctr"/>
+              <a:r>
+                <a:rPr lang="en-US" sz="2400" dirty="0"/>
+                <a:t>Memory</a:t>
+              </a:r>
+            </a:p>
+          </p:txBody>
+        </p:sp>
+        <p:sp>
+          <p:nvSpPr>
+            <p:cNvPr id="47" name="Rounded Rectangle 46">
+              <a:extLst>
+                <a:ext uri="{FF2B5EF4-FFF2-40B4-BE49-F238E27FC236}">
+                  <a16:creationId xmlns:a16="http://schemas.microsoft.com/office/drawing/2014/main" id="{812D56AB-5F8E-84CD-06E9-834A246BE1CB}"/>
+                </a:ext>
+              </a:extLst>
+            </p:cNvPr>
+            <p:cNvSpPr/>
+            <p:nvPr/>
+          </p:nvSpPr>
+          <p:spPr>
+            <a:xfrm>
+              <a:off x="9673201" y="6643905"/>
+              <a:ext cx="7982848" cy="1083141"/>
+            </a:xfrm>
+            <a:prstGeom prst="roundRect">
+              <a:avLst/>
+            </a:prstGeom>
+            <a:solidFill>
+              <a:schemeClr val="accent1"/>
+            </a:solidFill>
+            <a:ln w="38100">
+              <a:solidFill>
+                <a:schemeClr val="tx1"/>
+              </a:solidFill>
+            </a:ln>
+          </p:spPr>
+          <p:style>
+            <a:lnRef idx="2">
+              <a:schemeClr val="accent1">
+                <a:shade val="15000"/>
+              </a:schemeClr>
+            </a:lnRef>
+            <a:fillRef idx="1">
+              <a:schemeClr val="accent1"/>
+            </a:fillRef>
+            <a:effectRef idx="0">
+              <a:schemeClr val="accent1"/>
+            </a:effectRef>
+            <a:fontRef idx="minor">
+              <a:schemeClr val="lt1"/>
+            </a:fontRef>
+          </p:style>
+          <p:txBody>
+            <a:bodyPr rtlCol="0" anchor="ctr"/>
+            <a:lstStyle/>
+            <a:p>
+              <a:pPr algn="ctr"/>
+              <a:endParaRPr lang="en-US"/>
+            </a:p>
+          </p:txBody>
+        </p:sp>
+        <p:sp>
+          <p:nvSpPr>
+            <p:cNvPr id="48" name="TextBox 47">
+              <a:extLst>
+                <a:ext uri="{FF2B5EF4-FFF2-40B4-BE49-F238E27FC236}">
+                  <a16:creationId xmlns:a16="http://schemas.microsoft.com/office/drawing/2014/main" id="{54CFBFBC-2CED-97BE-725E-F87562823427}"/>
+                </a:ext>
+              </a:extLst>
+            </p:cNvPr>
+            <p:cNvSpPr txBox="1"/>
+            <p:nvPr/>
+          </p:nvSpPr>
+          <p:spPr>
+            <a:xfrm>
+              <a:off x="10081990" y="6822027"/>
+              <a:ext cx="7293631" cy="369332"/>
+            </a:xfrm>
+            <a:prstGeom prst="rect">
+              <a:avLst/>
+            </a:prstGeom>
+            <a:noFill/>
+          </p:spPr>
+          <p:txBody>
+            <a:bodyPr wrap="square" rtlCol="0">
+              <a:spAutoFit/>
+            </a:bodyPr>
+            <a:lstStyle/>
+            <a:p>
+              <a:pPr algn="ctr"/>
+              <a:r>
+                <a:rPr lang="en-US" dirty="0">
+                  <a:solidFill>
+                    <a:schemeClr val="bg1"/>
+                  </a:solidFill>
+                </a:rPr>
+                <a:t>Ref: 01			Ref: 02			Ref:03</a:t>
+              </a:r>
+            </a:p>
+          </p:txBody>
+        </p:sp>
+        <p:cxnSp>
+          <p:nvCxnSpPr>
+            <p:cNvPr id="49" name="Straight Arrow Connector 48">
+              <a:extLst>
+                <a:ext uri="{FF2B5EF4-FFF2-40B4-BE49-F238E27FC236}">
+                  <a16:creationId xmlns:a16="http://schemas.microsoft.com/office/drawing/2014/main" id="{C0A67D41-9C69-0F4E-D801-28CC5B10709A}"/>
+                </a:ext>
+              </a:extLst>
+            </p:cNvPr>
+            <p:cNvCxnSpPr>
+              <a:cxnSpLocks/>
+            </p:cNvCxnSpPr>
+            <p:nvPr/>
+          </p:nvCxnSpPr>
+          <p:spPr>
+            <a:xfrm flipV="1">
+              <a:off x="10911375" y="6194745"/>
+              <a:ext cx="0" cy="593497"/>
+            </a:xfrm>
+            <a:prstGeom prst="straightConnector1">
+              <a:avLst/>
+            </a:prstGeom>
+            <a:ln w="63500">
+              <a:solidFill>
+                <a:schemeClr val="accent2"/>
+              </a:solidFill>
+              <a:tailEnd type="triangle"/>
+            </a:ln>
+          </p:spPr>
+          <p:style>
+            <a:lnRef idx="2">
+              <a:schemeClr val="accent1"/>
+            </a:lnRef>
+            <a:fillRef idx="0">
+              <a:schemeClr val="accent1"/>
+            </a:fillRef>
+            <a:effectRef idx="1">
+              <a:schemeClr val="accent1"/>
+            </a:effectRef>
+            <a:fontRef idx="minor">
+              <a:schemeClr val="tx1"/>
+            </a:fontRef>
+          </p:style>
+        </p:cxnSp>
+        <p:sp>
+          <p:nvSpPr>
+            <p:cNvPr id="50" name="Rounded Rectangle 49">
+              <a:extLst>
+                <a:ext uri="{FF2B5EF4-FFF2-40B4-BE49-F238E27FC236}">
+                  <a16:creationId xmlns:a16="http://schemas.microsoft.com/office/drawing/2014/main" id="{7A5AD296-EF97-AB16-D012-606BCA4BA722}"/>
+                </a:ext>
+              </a:extLst>
+            </p:cNvPr>
+            <p:cNvSpPr/>
+            <p:nvPr/>
+          </p:nvSpPr>
+          <p:spPr>
+            <a:xfrm>
+              <a:off x="15203472" y="5018884"/>
+              <a:ext cx="2452577" cy="1472610"/>
+            </a:xfrm>
+            <a:prstGeom prst="roundRect">
+              <a:avLst/>
+            </a:prstGeom>
+            <a:solidFill>
+              <a:schemeClr val="accent1"/>
+            </a:solidFill>
+            <a:ln w="38100">
+              <a:solidFill>
+                <a:schemeClr val="tx1"/>
+              </a:solidFill>
+            </a:ln>
+          </p:spPr>
+          <p:style>
+            <a:lnRef idx="2">
+              <a:schemeClr val="accent1">
+                <a:shade val="15000"/>
+              </a:schemeClr>
+            </a:lnRef>
+            <a:fillRef idx="1">
+              <a:schemeClr val="accent1"/>
+            </a:fillRef>
+            <a:effectRef idx="0">
+              <a:schemeClr val="accent1"/>
+            </a:effectRef>
+            <a:fontRef idx="minor">
+              <a:schemeClr val="lt1"/>
+            </a:fontRef>
+          </p:style>
+          <p:txBody>
+            <a:bodyPr rtlCol="0" anchor="ctr"/>
+            <a:lstStyle/>
+            <a:p>
+              <a:pPr algn="ctr"/>
+              <a:endParaRPr lang="en-US"/>
+            </a:p>
+          </p:txBody>
+        </p:sp>
+        <p:grpSp>
+          <p:nvGrpSpPr>
+            <p:cNvPr id="51" name="Group 50">
+              <a:extLst>
+                <a:ext uri="{FF2B5EF4-FFF2-40B4-BE49-F238E27FC236}">
+                  <a16:creationId xmlns:a16="http://schemas.microsoft.com/office/drawing/2014/main" id="{D9FBBB82-EDBA-8A4F-E2AF-F11D62AFBF4E}"/>
+                </a:ext>
+              </a:extLst>
+            </p:cNvPr>
+            <p:cNvGrpSpPr/>
+            <p:nvPr/>
+          </p:nvGrpSpPr>
+          <p:grpSpPr>
+            <a:xfrm>
+              <a:off x="11705469" y="7571166"/>
+              <a:ext cx="2334930" cy="1810548"/>
+              <a:chOff x="8053475" y="2746628"/>
+              <a:chExt cx="2334930" cy="1810548"/>
+            </a:xfrm>
+          </p:grpSpPr>
+          <p:cxnSp>
+            <p:nvCxnSpPr>
+              <p:cNvPr id="52" name="Straight Arrow Connector 51">
+                <a:extLst>
+                  <a:ext uri="{FF2B5EF4-FFF2-40B4-BE49-F238E27FC236}">
+                    <a16:creationId xmlns:a16="http://schemas.microsoft.com/office/drawing/2014/main" id="{C3546024-4BE6-A568-5973-13A665DBF840}"/>
+                  </a:ext>
+                </a:extLst>
+              </p:cNvPr>
+              <p:cNvCxnSpPr>
+                <a:cxnSpLocks/>
+              </p:cNvCxnSpPr>
+              <p:nvPr/>
+            </p:nvCxnSpPr>
+            <p:spPr>
+              <a:xfrm flipV="1">
+                <a:off x="9208770" y="2746628"/>
+                <a:ext cx="0" cy="945766"/>
+              </a:xfrm>
+              <a:prstGeom prst="straightConnector1">
+                <a:avLst/>
+              </a:prstGeom>
+              <a:ln w="63500">
+                <a:solidFill>
+                  <a:schemeClr val="accent2"/>
+                </a:solidFill>
+                <a:tailEnd type="triangle"/>
+              </a:ln>
+            </p:spPr>
+            <p:style>
+              <a:lnRef idx="2">
+                <a:schemeClr val="accent1"/>
+              </a:lnRef>
+              <a:fillRef idx="0">
+                <a:schemeClr val="accent1"/>
+              </a:fillRef>
+              <a:effectRef idx="1">
+                <a:schemeClr val="accent1"/>
+              </a:effectRef>
+              <a:fontRef idx="minor">
+                <a:schemeClr val="tx1"/>
+              </a:fontRef>
+            </p:style>
+          </p:cxnSp>
+          <p:sp>
+            <p:nvSpPr>
+              <p:cNvPr id="53" name="TextBox 52">
+                <a:extLst>
+                  <a:ext uri="{FF2B5EF4-FFF2-40B4-BE49-F238E27FC236}">
+                    <a16:creationId xmlns:a16="http://schemas.microsoft.com/office/drawing/2014/main" id="{C243C7E6-CC0D-83CB-856B-C34950CCB34C}"/>
+                  </a:ext>
+                </a:extLst>
+              </p:cNvPr>
+              <p:cNvSpPr txBox="1"/>
+              <p:nvPr/>
+            </p:nvSpPr>
+            <p:spPr>
+              <a:xfrm>
+                <a:off x="8053475" y="3726179"/>
+                <a:ext cx="2334930" cy="830997"/>
+              </a:xfrm>
+              <a:prstGeom prst="rect">
+                <a:avLst/>
+              </a:prstGeom>
+              <a:noFill/>
+            </p:spPr>
+            <p:txBody>
+              <a:bodyPr wrap="square" rtlCol="0">
+                <a:spAutoFit/>
+              </a:bodyPr>
+              <a:lstStyle/>
+              <a:p>
+                <a:pPr algn="ctr"/>
+                <a:r>
+                  <a:rPr lang="en-US" sz="2400" dirty="0">
+                    <a:latin typeface="Consolas" panose="020B0609020204030204" pitchFamily="49" charset="0"/>
+                    <a:cs typeface="Consolas" panose="020B0609020204030204" pitchFamily="49" charset="0"/>
+                  </a:rPr>
+                  <a:t>X</a:t>
+                </a:r>
+              </a:p>
+              <a:p>
+                <a:pPr algn="ctr"/>
+                <a:r>
+                  <a:rPr lang="en-US" sz="2400" dirty="0">
+                    <a:latin typeface="Consolas" panose="020B0609020204030204" pitchFamily="49" charset="0"/>
+                    <a:cs typeface="Consolas" panose="020B0609020204030204" pitchFamily="49" charset="0"/>
+                  </a:rPr>
+                  <a:t>(global)</a:t>
+                </a:r>
+              </a:p>
+            </p:txBody>
+          </p:sp>
+        </p:grpSp>
+        <p:grpSp>
+          <p:nvGrpSpPr>
+            <p:cNvPr id="54" name="Group 53">
+              <a:extLst>
+                <a:ext uri="{FF2B5EF4-FFF2-40B4-BE49-F238E27FC236}">
+                  <a16:creationId xmlns:a16="http://schemas.microsoft.com/office/drawing/2014/main" id="{4D93A8F1-3E82-C1DA-2D14-1CB424BBDC75}"/>
+                </a:ext>
+              </a:extLst>
+            </p:cNvPr>
+            <p:cNvGrpSpPr/>
+            <p:nvPr/>
+          </p:nvGrpSpPr>
+          <p:grpSpPr>
+            <a:xfrm>
+              <a:off x="13444127" y="7571166"/>
+              <a:ext cx="2334930" cy="1810548"/>
+              <a:chOff x="8053475" y="2746628"/>
+              <a:chExt cx="2334930" cy="1810548"/>
+            </a:xfrm>
+          </p:grpSpPr>
+          <p:cxnSp>
+            <p:nvCxnSpPr>
+              <p:cNvPr id="55" name="Straight Arrow Connector 54">
+                <a:extLst>
+                  <a:ext uri="{FF2B5EF4-FFF2-40B4-BE49-F238E27FC236}">
+                    <a16:creationId xmlns:a16="http://schemas.microsoft.com/office/drawing/2014/main" id="{30F00210-DB12-01CD-F666-359D7DF5F3C4}"/>
+                  </a:ext>
+                </a:extLst>
+              </p:cNvPr>
+              <p:cNvCxnSpPr>
+                <a:cxnSpLocks/>
+              </p:cNvCxnSpPr>
+              <p:nvPr/>
+            </p:nvCxnSpPr>
+            <p:spPr>
+              <a:xfrm flipV="1">
+                <a:off x="9208770" y="2746628"/>
+                <a:ext cx="0" cy="945766"/>
+              </a:xfrm>
+              <a:prstGeom prst="straightConnector1">
+                <a:avLst/>
+              </a:prstGeom>
+              <a:ln w="63500">
+                <a:solidFill>
+                  <a:schemeClr val="accent2"/>
+                </a:solidFill>
+                <a:tailEnd type="triangle"/>
+              </a:ln>
+            </p:spPr>
+            <p:style>
+              <a:lnRef idx="2">
+                <a:schemeClr val="accent1"/>
+              </a:lnRef>
+              <a:fillRef idx="0">
+                <a:schemeClr val="accent1"/>
+              </a:fillRef>
+              <a:effectRef idx="1">
+                <a:schemeClr val="accent1"/>
+              </a:effectRef>
+              <a:fontRef idx="minor">
+                <a:schemeClr val="tx1"/>
+              </a:fontRef>
+            </p:style>
+          </p:cxnSp>
+          <p:sp>
+            <p:nvSpPr>
+              <p:cNvPr id="56" name="TextBox 55">
+                <a:extLst>
+                  <a:ext uri="{FF2B5EF4-FFF2-40B4-BE49-F238E27FC236}">
+                    <a16:creationId xmlns:a16="http://schemas.microsoft.com/office/drawing/2014/main" id="{24F2E9C1-D62D-9396-A1C3-C73249B96ED1}"/>
+                  </a:ext>
+                </a:extLst>
+              </p:cNvPr>
+              <p:cNvSpPr txBox="1"/>
+              <p:nvPr/>
+            </p:nvSpPr>
+            <p:spPr>
+              <a:xfrm>
+                <a:off x="8053475" y="3726179"/>
+                <a:ext cx="2334930" cy="830997"/>
+              </a:xfrm>
+              <a:prstGeom prst="rect">
+                <a:avLst/>
+              </a:prstGeom>
+              <a:noFill/>
+            </p:spPr>
+            <p:txBody>
+              <a:bodyPr wrap="square" rtlCol="0">
+                <a:spAutoFit/>
+              </a:bodyPr>
+              <a:lstStyle/>
+              <a:p>
+                <a:pPr algn="ctr"/>
+                <a:r>
+                  <a:rPr lang="en-US" sz="2400" dirty="0">
+                    <a:latin typeface="Consolas" panose="020B0609020204030204" pitchFamily="49" charset="0"/>
+                    <a:cs typeface="Consolas" panose="020B0609020204030204" pitchFamily="49" charset="0"/>
+                  </a:rPr>
+                  <a:t>X</a:t>
+                </a:r>
+              </a:p>
+              <a:p>
+                <a:pPr algn="ctr"/>
+                <a:r>
+                  <a:rPr lang="en-US" sz="2400" dirty="0">
+                    <a:latin typeface="Consolas" panose="020B0609020204030204" pitchFamily="49" charset="0"/>
+                    <a:cs typeface="Consolas" panose="020B0609020204030204" pitchFamily="49" charset="0"/>
+                  </a:rPr>
+                  <a:t>(local)</a:t>
+                </a:r>
+              </a:p>
+            </p:txBody>
+          </p:sp>
+        </p:grpSp>
+        <p:sp>
+          <p:nvSpPr>
+            <p:cNvPr id="57" name="TextBox 56">
+              <a:extLst>
+                <a:ext uri="{FF2B5EF4-FFF2-40B4-BE49-F238E27FC236}">
+                  <a16:creationId xmlns:a16="http://schemas.microsoft.com/office/drawing/2014/main" id="{41CCE3BC-7D84-E61B-7083-587553514382}"/>
+                </a:ext>
+              </a:extLst>
+            </p:cNvPr>
+            <p:cNvSpPr txBox="1"/>
+            <p:nvPr/>
+          </p:nvSpPr>
+          <p:spPr>
+            <a:xfrm>
+              <a:off x="15514923" y="5353346"/>
+              <a:ext cx="1860698" cy="923330"/>
+            </a:xfrm>
+            <a:prstGeom prst="rect">
+              <a:avLst/>
+            </a:prstGeom>
+            <a:noFill/>
+          </p:spPr>
+          <p:txBody>
+            <a:bodyPr wrap="square" rtlCol="0">
+              <a:spAutoFit/>
+            </a:bodyPr>
+            <a:lstStyle/>
+            <a:p>
+              <a:pPr algn="ctr"/>
+              <a:r>
+                <a:rPr lang="en-US" dirty="0">
+                  <a:solidFill>
+                    <a:schemeClr val="bg1"/>
+                  </a:solidFill>
+                </a:rPr>
+                <a:t>Value: 6</a:t>
+              </a:r>
+            </a:p>
+            <a:p>
+              <a:pPr algn="ctr"/>
+              <a:r>
+                <a:rPr lang="en-US" dirty="0">
+                  <a:solidFill>
+                    <a:schemeClr val="bg1"/>
+                  </a:solidFill>
+                </a:rPr>
+                <a:t>Address: 3</a:t>
+              </a:r>
+            </a:p>
+            <a:p>
+              <a:pPr algn="ctr"/>
+              <a:r>
+                <a:rPr lang="en-US" dirty="0">
+                  <a:solidFill>
+                    <a:schemeClr val="bg1"/>
+                  </a:solidFill>
+                </a:rPr>
+                <a:t>Type: Integer</a:t>
+              </a:r>
+            </a:p>
+          </p:txBody>
+        </p:sp>
+        <p:cxnSp>
+          <p:nvCxnSpPr>
+            <p:cNvPr id="59" name="Straight Arrow Connector 58">
+              <a:extLst>
+                <a:ext uri="{FF2B5EF4-FFF2-40B4-BE49-F238E27FC236}">
+                  <a16:creationId xmlns:a16="http://schemas.microsoft.com/office/drawing/2014/main" id="{95CE5381-E06C-7651-2D9F-529338FB7751}"/>
+                </a:ext>
+              </a:extLst>
+            </p:cNvPr>
+            <p:cNvCxnSpPr>
+              <a:cxnSpLocks/>
+            </p:cNvCxnSpPr>
+            <p:nvPr/>
+          </p:nvCxnSpPr>
+          <p:spPr>
+            <a:xfrm flipV="1">
+              <a:off x="13728805" y="6237324"/>
+              <a:ext cx="0" cy="593497"/>
+            </a:xfrm>
+            <a:prstGeom prst="straightConnector1">
+              <a:avLst/>
+            </a:prstGeom>
+            <a:ln w="63500">
+              <a:solidFill>
+                <a:schemeClr val="accent2"/>
+              </a:solidFill>
+              <a:tailEnd type="triangle"/>
+            </a:ln>
+          </p:spPr>
+          <p:style>
+            <a:lnRef idx="2">
+              <a:schemeClr val="accent1"/>
+            </a:lnRef>
+            <a:fillRef idx="0">
+              <a:schemeClr val="accent1"/>
+            </a:fillRef>
+            <a:effectRef idx="1">
+              <a:schemeClr val="accent1"/>
+            </a:effectRef>
+            <a:fontRef idx="minor">
+              <a:schemeClr val="tx1"/>
+            </a:fontRef>
+          </p:style>
+        </p:cxnSp>
+        <p:cxnSp>
+          <p:nvCxnSpPr>
+            <p:cNvPr id="60" name="Straight Arrow Connector 59">
+              <a:extLst>
+                <a:ext uri="{FF2B5EF4-FFF2-40B4-BE49-F238E27FC236}">
+                  <a16:creationId xmlns:a16="http://schemas.microsoft.com/office/drawing/2014/main" id="{871B0B45-3A53-C7A9-E79B-ED5E1D6650AA}"/>
+                </a:ext>
+              </a:extLst>
+            </p:cNvPr>
+            <p:cNvCxnSpPr>
+              <a:cxnSpLocks/>
+            </p:cNvCxnSpPr>
+            <p:nvPr/>
+          </p:nvCxnSpPr>
+          <p:spPr>
+            <a:xfrm flipV="1">
+              <a:off x="16450056" y="6237324"/>
+              <a:ext cx="0" cy="593497"/>
+            </a:xfrm>
+            <a:prstGeom prst="straightConnector1">
+              <a:avLst/>
+            </a:prstGeom>
+            <a:ln w="63500">
+              <a:solidFill>
+                <a:schemeClr val="accent2"/>
+              </a:solidFill>
+              <a:tailEnd type="triangle"/>
+            </a:ln>
+          </p:spPr>
+          <p:style>
+            <a:lnRef idx="2">
+              <a:schemeClr val="accent1"/>
+            </a:lnRef>
+            <a:fillRef idx="0">
+              <a:schemeClr val="accent1"/>
+            </a:fillRef>
+            <a:effectRef idx="1">
+              <a:schemeClr val="accent1"/>
+            </a:effectRef>
+            <a:fontRef idx="minor">
+              <a:schemeClr val="tx1"/>
+            </a:fontRef>
+          </p:style>
+        </p:cxnSp>
+        <p:sp>
+          <p:nvSpPr>
+            <p:cNvPr id="40" name="TextBox 39">
+              <a:extLst>
+                <a:ext uri="{FF2B5EF4-FFF2-40B4-BE49-F238E27FC236}">
+                  <a16:creationId xmlns:a16="http://schemas.microsoft.com/office/drawing/2014/main" id="{00C78E5D-E780-201C-E3AA-F4161907ED0C}"/>
+                </a:ext>
+              </a:extLst>
+            </p:cNvPr>
+            <p:cNvSpPr txBox="1"/>
+            <p:nvPr/>
+          </p:nvSpPr>
+          <p:spPr>
+            <a:xfrm>
+              <a:off x="12798456" y="7099456"/>
+              <a:ext cx="1860698" cy="646331"/>
+            </a:xfrm>
+            <a:prstGeom prst="rect">
+              <a:avLst/>
+            </a:prstGeom>
+            <a:noFill/>
+          </p:spPr>
+          <p:txBody>
+            <a:bodyPr wrap="square" rtlCol="0">
+              <a:spAutoFit/>
+            </a:bodyPr>
+            <a:lstStyle/>
+            <a:p>
+              <a:pPr algn="ctr"/>
+              <a:r>
+                <a:rPr lang="en-US" dirty="0">
+                  <a:solidFill>
+                    <a:schemeClr val="bg1"/>
+                  </a:solidFill>
+                </a:rPr>
+                <a:t>Address: 10</a:t>
+              </a:r>
+            </a:p>
+            <a:p>
+              <a:pPr algn="ctr"/>
+              <a:r>
+                <a:rPr lang="en-US" dirty="0">
+                  <a:solidFill>
+                    <a:schemeClr val="bg1"/>
+                  </a:solidFill>
+                </a:rPr>
+                <a:t>Type: List</a:t>
+              </a:r>
+            </a:p>
+          </p:txBody>
+        </p:sp>
+      </p:grpSp>
+    </p:spTree>
+    <p:extLst>
+      <p:ext uri="{BB962C8B-B14F-4D97-AF65-F5344CB8AC3E}">
+        <p14:creationId xmlns:p14="http://schemas.microsoft.com/office/powerpoint/2010/main" val="118815274"/>
+      </p:ext>
+    </p:extLst>
+  </p:cSld>
+  <p:clrMapOvr>
+    <a:masterClrMapping/>
+  </p:clrMapOvr>
+</p:sld>
+</file>
+
+<file path=ppt/slides/slide8.xml><?xml version="1.0" encoding="utf-8"?>
+<p:sld xmlns:a="http://schemas.openxmlformats.org/drawingml/2006/main" xmlns:r="http://schemas.openxmlformats.org/officeDocument/2006/relationships" xmlns:p="http://schemas.openxmlformats.org/presentationml/2006/main">
+  <p:cSld>
+    <p:spTree>
+      <p:nvGrpSpPr>
         <p:cNvPr id="1" name=""/>
         <p:cNvGrpSpPr/>
         <p:nvPr/>
@@ -13599,6 +16377,1149 @@
     <p:extLst>
       <p:ext uri="{BB962C8B-B14F-4D97-AF65-F5344CB8AC3E}">
         <p14:creationId xmlns:p14="http://schemas.microsoft.com/office/powerpoint/2010/main" val="4195481004"/>
+      </p:ext>
+    </p:extLst>
+  </p:cSld>
+  <p:clrMapOvr>
+    <a:masterClrMapping/>
+  </p:clrMapOvr>
+</p:sld>
+</file>
+
+<file path=ppt/slides/slide9.xml><?xml version="1.0" encoding="utf-8"?>
+<p:sld xmlns:a="http://schemas.openxmlformats.org/drawingml/2006/main" xmlns:r="http://schemas.openxmlformats.org/officeDocument/2006/relationships" xmlns:p="http://schemas.openxmlformats.org/presentationml/2006/main">
+  <p:cSld>
+    <p:spTree>
+      <p:nvGrpSpPr>
+        <p:cNvPr id="1" name="">
+          <a:extLst>
+            <a:ext uri="{FF2B5EF4-FFF2-40B4-BE49-F238E27FC236}">
+              <a16:creationId xmlns:a16="http://schemas.microsoft.com/office/drawing/2014/main" id="{30FFF86B-4512-C9CD-3F59-9C524F47E86B}"/>
+            </a:ext>
+          </a:extLst>
+        </p:cNvPr>
+        <p:cNvGrpSpPr/>
+        <p:nvPr/>
+      </p:nvGrpSpPr>
+      <p:grpSpPr>
+        <a:xfrm>
+          <a:off x="0" y="0"/>
+          <a:ext cx="0" cy="0"/>
+          <a:chOff x="0" y="0"/>
+          <a:chExt cx="0" cy="0"/>
+        </a:xfrm>
+      </p:grpSpPr>
+      <p:grpSp>
+        <p:nvGrpSpPr>
+          <p:cNvPr id="33" name="Group 32">
+            <a:extLst>
+              <a:ext uri="{FF2B5EF4-FFF2-40B4-BE49-F238E27FC236}">
+                <a16:creationId xmlns:a16="http://schemas.microsoft.com/office/drawing/2014/main" id="{4055B41C-8BC3-2EE3-DD83-52EFF89FE6BE}"/>
+              </a:ext>
+            </a:extLst>
+          </p:cNvPr>
+          <p:cNvGrpSpPr/>
+          <p:nvPr/>
+        </p:nvGrpSpPr>
+        <p:grpSpPr>
+          <a:xfrm>
+            <a:off x="776923" y="1103723"/>
+            <a:ext cx="13619557" cy="4222120"/>
+            <a:chOff x="776923" y="1103723"/>
+            <a:chExt cx="13619557" cy="4222120"/>
+          </a:xfrm>
+        </p:grpSpPr>
+        <p:sp>
+          <p:nvSpPr>
+            <p:cNvPr id="2" name="Rounded Rectangle 1">
+              <a:extLst>
+                <a:ext uri="{FF2B5EF4-FFF2-40B4-BE49-F238E27FC236}">
+                  <a16:creationId xmlns:a16="http://schemas.microsoft.com/office/drawing/2014/main" id="{0AB16E72-133F-0F00-D923-F98AFBD680F8}"/>
+                </a:ext>
+              </a:extLst>
+            </p:cNvPr>
+            <p:cNvSpPr/>
+            <p:nvPr/>
+          </p:nvSpPr>
+          <p:spPr>
+            <a:xfrm>
+              <a:off x="776923" y="1103723"/>
+              <a:ext cx="13619557" cy="3179519"/>
+            </a:xfrm>
+            <a:prstGeom prst="roundRect">
+              <a:avLst/>
+            </a:prstGeom>
+            <a:noFill/>
+            <a:ln w="38100">
+              <a:solidFill>
+                <a:schemeClr val="tx1"/>
+              </a:solidFill>
+            </a:ln>
+          </p:spPr>
+          <p:style>
+            <a:lnRef idx="2">
+              <a:schemeClr val="accent1">
+                <a:shade val="15000"/>
+              </a:schemeClr>
+            </a:lnRef>
+            <a:fillRef idx="1">
+              <a:schemeClr val="accent1"/>
+            </a:fillRef>
+            <a:effectRef idx="0">
+              <a:schemeClr val="accent1"/>
+            </a:effectRef>
+            <a:fontRef idx="minor">
+              <a:schemeClr val="lt1"/>
+            </a:fontRef>
+          </p:style>
+          <p:txBody>
+            <a:bodyPr rtlCol="0" anchor="ctr"/>
+            <a:lstStyle/>
+            <a:p>
+              <a:pPr algn="ctr"/>
+              <a:endParaRPr lang="en-US"/>
+            </a:p>
+          </p:txBody>
+        </p:sp>
+        <p:sp>
+          <p:nvSpPr>
+            <p:cNvPr id="3" name="Rounded Rectangle 2">
+              <a:extLst>
+                <a:ext uri="{FF2B5EF4-FFF2-40B4-BE49-F238E27FC236}">
+                  <a16:creationId xmlns:a16="http://schemas.microsoft.com/office/drawing/2014/main" id="{B04950F7-182B-0CF6-3DB6-86D4D2870D02}"/>
+                </a:ext>
+              </a:extLst>
+            </p:cNvPr>
+            <p:cNvSpPr/>
+            <p:nvPr/>
+          </p:nvSpPr>
+          <p:spPr>
+            <a:xfrm>
+              <a:off x="1301462" y="1334449"/>
+              <a:ext cx="2452577" cy="1472610"/>
+            </a:xfrm>
+            <a:prstGeom prst="roundRect">
+              <a:avLst/>
+            </a:prstGeom>
+            <a:solidFill>
+              <a:schemeClr val="accent1"/>
+            </a:solidFill>
+            <a:ln w="38100">
+              <a:solidFill>
+                <a:schemeClr val="tx1"/>
+              </a:solidFill>
+            </a:ln>
+          </p:spPr>
+          <p:style>
+            <a:lnRef idx="2">
+              <a:schemeClr val="accent1">
+                <a:shade val="15000"/>
+              </a:schemeClr>
+            </a:lnRef>
+            <a:fillRef idx="1">
+              <a:schemeClr val="accent1"/>
+            </a:fillRef>
+            <a:effectRef idx="0">
+              <a:schemeClr val="accent1"/>
+            </a:effectRef>
+            <a:fontRef idx="minor">
+              <a:schemeClr val="lt1"/>
+            </a:fontRef>
+          </p:style>
+          <p:txBody>
+            <a:bodyPr rtlCol="0" anchor="ctr"/>
+            <a:lstStyle/>
+            <a:p>
+              <a:pPr algn="ctr"/>
+              <a:endParaRPr lang="en-US"/>
+            </a:p>
+          </p:txBody>
+        </p:sp>
+        <p:sp>
+          <p:nvSpPr>
+            <p:cNvPr id="4" name="TextBox 3">
+              <a:extLst>
+                <a:ext uri="{FF2B5EF4-FFF2-40B4-BE49-F238E27FC236}">
+                  <a16:creationId xmlns:a16="http://schemas.microsoft.com/office/drawing/2014/main" id="{EECE4309-16F4-3E25-E35D-7ADBF99CC1F5}"/>
+                </a:ext>
+              </a:extLst>
+            </p:cNvPr>
+            <p:cNvSpPr txBox="1"/>
+            <p:nvPr/>
+          </p:nvSpPr>
+          <p:spPr>
+            <a:xfrm>
+              <a:off x="1597401" y="1607282"/>
+              <a:ext cx="1860698" cy="923330"/>
+            </a:xfrm>
+            <a:prstGeom prst="rect">
+              <a:avLst/>
+            </a:prstGeom>
+            <a:noFill/>
+          </p:spPr>
+          <p:txBody>
+            <a:bodyPr wrap="square" rtlCol="0">
+              <a:spAutoFit/>
+            </a:bodyPr>
+            <a:lstStyle/>
+            <a:p>
+              <a:pPr algn="ctr"/>
+              <a:r>
+                <a:rPr lang="en-US" dirty="0">
+                  <a:solidFill>
+                    <a:schemeClr val="bg1"/>
+                  </a:solidFill>
+                </a:rPr>
+                <a:t>Value: 1</a:t>
+              </a:r>
+            </a:p>
+            <a:p>
+              <a:pPr algn="ctr"/>
+              <a:r>
+                <a:rPr lang="en-US" dirty="0">
+                  <a:solidFill>
+                    <a:schemeClr val="bg1"/>
+                  </a:solidFill>
+                </a:rPr>
+                <a:t>Address: 1</a:t>
+              </a:r>
+            </a:p>
+            <a:p>
+              <a:pPr algn="ctr"/>
+              <a:r>
+                <a:rPr lang="en-US" dirty="0">
+                  <a:solidFill>
+                    <a:schemeClr val="bg1"/>
+                  </a:solidFill>
+                </a:rPr>
+                <a:t>Type: Integer</a:t>
+              </a:r>
+            </a:p>
+          </p:txBody>
+        </p:sp>
+        <p:sp>
+          <p:nvSpPr>
+            <p:cNvPr id="5" name="Rounded Rectangle 4">
+              <a:extLst>
+                <a:ext uri="{FF2B5EF4-FFF2-40B4-BE49-F238E27FC236}">
+                  <a16:creationId xmlns:a16="http://schemas.microsoft.com/office/drawing/2014/main" id="{40D58FDB-7F8F-1169-B49B-D17314D93175}"/>
+                </a:ext>
+              </a:extLst>
+            </p:cNvPr>
+            <p:cNvSpPr/>
+            <p:nvPr/>
+          </p:nvSpPr>
+          <p:spPr>
+            <a:xfrm>
+              <a:off x="4175797" y="1334449"/>
+              <a:ext cx="2452577" cy="1472610"/>
+            </a:xfrm>
+            <a:prstGeom prst="roundRect">
+              <a:avLst/>
+            </a:prstGeom>
+            <a:solidFill>
+              <a:schemeClr val="accent1"/>
+            </a:solidFill>
+            <a:ln w="38100">
+              <a:solidFill>
+                <a:schemeClr val="tx1"/>
+              </a:solidFill>
+            </a:ln>
+          </p:spPr>
+          <p:style>
+            <a:lnRef idx="2">
+              <a:schemeClr val="accent1">
+                <a:shade val="15000"/>
+              </a:schemeClr>
+            </a:lnRef>
+            <a:fillRef idx="1">
+              <a:schemeClr val="accent1"/>
+            </a:fillRef>
+            <a:effectRef idx="0">
+              <a:schemeClr val="accent1"/>
+            </a:effectRef>
+            <a:fontRef idx="minor">
+              <a:schemeClr val="lt1"/>
+            </a:fontRef>
+          </p:style>
+          <p:txBody>
+            <a:bodyPr rtlCol="0" anchor="ctr"/>
+            <a:lstStyle/>
+            <a:p>
+              <a:pPr algn="ctr"/>
+              <a:endParaRPr lang="en-US"/>
+            </a:p>
+          </p:txBody>
+        </p:sp>
+        <p:sp>
+          <p:nvSpPr>
+            <p:cNvPr id="6" name="TextBox 5">
+              <a:extLst>
+                <a:ext uri="{FF2B5EF4-FFF2-40B4-BE49-F238E27FC236}">
+                  <a16:creationId xmlns:a16="http://schemas.microsoft.com/office/drawing/2014/main" id="{94ED559D-AB29-1D39-68AE-B06D75AE00F1}"/>
+                </a:ext>
+              </a:extLst>
+            </p:cNvPr>
+            <p:cNvSpPr txBox="1"/>
+            <p:nvPr/>
+          </p:nvSpPr>
+          <p:spPr>
+            <a:xfrm>
+              <a:off x="4471736" y="1607282"/>
+              <a:ext cx="1860698" cy="923330"/>
+            </a:xfrm>
+            <a:prstGeom prst="rect">
+              <a:avLst/>
+            </a:prstGeom>
+            <a:noFill/>
+          </p:spPr>
+          <p:txBody>
+            <a:bodyPr wrap="square" rtlCol="0">
+              <a:spAutoFit/>
+            </a:bodyPr>
+            <a:lstStyle/>
+            <a:p>
+              <a:pPr algn="ctr"/>
+              <a:r>
+                <a:rPr lang="en-US" dirty="0">
+                  <a:solidFill>
+                    <a:schemeClr val="bg1"/>
+                  </a:solidFill>
+                </a:rPr>
+                <a:t>Value: 3</a:t>
+              </a:r>
+            </a:p>
+            <a:p>
+              <a:pPr algn="ctr"/>
+              <a:r>
+                <a:rPr lang="en-US" dirty="0">
+                  <a:solidFill>
+                    <a:schemeClr val="bg1"/>
+                  </a:solidFill>
+                </a:rPr>
+                <a:t>Address: 2</a:t>
+              </a:r>
+            </a:p>
+            <a:p>
+              <a:pPr algn="ctr"/>
+              <a:r>
+                <a:rPr lang="en-US" dirty="0">
+                  <a:solidFill>
+                    <a:schemeClr val="bg1"/>
+                  </a:solidFill>
+                </a:rPr>
+                <a:t>Type: Integer</a:t>
+              </a:r>
+            </a:p>
+          </p:txBody>
+        </p:sp>
+        <p:sp>
+          <p:nvSpPr>
+            <p:cNvPr id="7" name="Rounded Rectangle 6">
+              <a:extLst>
+                <a:ext uri="{FF2B5EF4-FFF2-40B4-BE49-F238E27FC236}">
+                  <a16:creationId xmlns:a16="http://schemas.microsoft.com/office/drawing/2014/main" id="{1084F8A5-7EAA-6401-AB8A-95E9C3CE6EC9}"/>
+                </a:ext>
+              </a:extLst>
+            </p:cNvPr>
+            <p:cNvSpPr/>
+            <p:nvPr/>
+          </p:nvSpPr>
+          <p:spPr>
+            <a:xfrm>
+              <a:off x="1301462" y="2959470"/>
+              <a:ext cx="5326912" cy="1083141"/>
+            </a:xfrm>
+            <a:prstGeom prst="roundRect">
+              <a:avLst/>
+            </a:prstGeom>
+            <a:solidFill>
+              <a:schemeClr val="accent1"/>
+            </a:solidFill>
+            <a:ln w="38100">
+              <a:solidFill>
+                <a:schemeClr val="tx1"/>
+              </a:solidFill>
+            </a:ln>
+          </p:spPr>
+          <p:style>
+            <a:lnRef idx="2">
+              <a:schemeClr val="accent1">
+                <a:shade val="15000"/>
+              </a:schemeClr>
+            </a:lnRef>
+            <a:fillRef idx="1">
+              <a:schemeClr val="accent1"/>
+            </a:fillRef>
+            <a:effectRef idx="0">
+              <a:schemeClr val="accent1"/>
+            </a:effectRef>
+            <a:fontRef idx="minor">
+              <a:schemeClr val="lt1"/>
+            </a:fontRef>
+          </p:style>
+          <p:txBody>
+            <a:bodyPr rtlCol="0" anchor="ctr"/>
+            <a:lstStyle/>
+            <a:p>
+              <a:pPr algn="ctr"/>
+              <a:endParaRPr lang="en-US"/>
+            </a:p>
+          </p:txBody>
+        </p:sp>
+        <p:sp>
+          <p:nvSpPr>
+            <p:cNvPr id="8" name="TextBox 7">
+              <a:extLst>
+                <a:ext uri="{FF2B5EF4-FFF2-40B4-BE49-F238E27FC236}">
+                  <a16:creationId xmlns:a16="http://schemas.microsoft.com/office/drawing/2014/main" id="{BB13F362-AEC2-CC58-9093-14293F29380E}"/>
+                </a:ext>
+              </a:extLst>
+            </p:cNvPr>
+            <p:cNvSpPr txBox="1"/>
+            <p:nvPr/>
+          </p:nvSpPr>
+          <p:spPr>
+            <a:xfrm>
+              <a:off x="1451548" y="3090007"/>
+              <a:ext cx="4913326" cy="369332"/>
+            </a:xfrm>
+            <a:prstGeom prst="rect">
+              <a:avLst/>
+            </a:prstGeom>
+            <a:noFill/>
+          </p:spPr>
+          <p:txBody>
+            <a:bodyPr wrap="square" rtlCol="0">
+              <a:spAutoFit/>
+            </a:bodyPr>
+            <a:lstStyle/>
+            <a:p>
+              <a:pPr algn="ctr"/>
+              <a:r>
+                <a:rPr lang="en-US" dirty="0">
+                  <a:solidFill>
+                    <a:schemeClr val="bg1"/>
+                  </a:solidFill>
+                </a:rPr>
+                <a:t>Ref: 01			Ref: 02</a:t>
+              </a:r>
+            </a:p>
+          </p:txBody>
+        </p:sp>
+        <p:cxnSp>
+          <p:nvCxnSpPr>
+            <p:cNvPr id="9" name="Straight Arrow Connector 8">
+              <a:extLst>
+                <a:ext uri="{FF2B5EF4-FFF2-40B4-BE49-F238E27FC236}">
+                  <a16:creationId xmlns:a16="http://schemas.microsoft.com/office/drawing/2014/main" id="{D4C11658-14ED-6F05-B940-614A05993550}"/>
+                </a:ext>
+              </a:extLst>
+            </p:cNvPr>
+            <p:cNvCxnSpPr>
+              <a:cxnSpLocks/>
+            </p:cNvCxnSpPr>
+            <p:nvPr/>
+          </p:nvCxnSpPr>
+          <p:spPr>
+            <a:xfrm flipV="1">
+              <a:off x="2539636" y="2510310"/>
+              <a:ext cx="0" cy="593497"/>
+            </a:xfrm>
+            <a:prstGeom prst="straightConnector1">
+              <a:avLst/>
+            </a:prstGeom>
+            <a:ln w="63500">
+              <a:solidFill>
+                <a:schemeClr val="accent2"/>
+              </a:solidFill>
+              <a:tailEnd type="triangle"/>
+            </a:ln>
+          </p:spPr>
+          <p:style>
+            <a:lnRef idx="2">
+              <a:schemeClr val="accent1"/>
+            </a:lnRef>
+            <a:fillRef idx="0">
+              <a:schemeClr val="accent1"/>
+            </a:fillRef>
+            <a:effectRef idx="1">
+              <a:schemeClr val="accent1"/>
+            </a:effectRef>
+            <a:fontRef idx="minor">
+              <a:schemeClr val="tx1"/>
+            </a:fontRef>
+          </p:style>
+        </p:cxnSp>
+        <p:cxnSp>
+          <p:nvCxnSpPr>
+            <p:cNvPr id="10" name="Straight Arrow Connector 9">
+              <a:extLst>
+                <a:ext uri="{FF2B5EF4-FFF2-40B4-BE49-F238E27FC236}">
+                  <a16:creationId xmlns:a16="http://schemas.microsoft.com/office/drawing/2014/main" id="{461AF991-50DA-77AE-A59D-0642D97F29FD}"/>
+                </a:ext>
+              </a:extLst>
+            </p:cNvPr>
+            <p:cNvCxnSpPr>
+              <a:cxnSpLocks/>
+            </p:cNvCxnSpPr>
+            <p:nvPr/>
+          </p:nvCxnSpPr>
+          <p:spPr>
+            <a:xfrm flipV="1">
+              <a:off x="5402085" y="2530612"/>
+              <a:ext cx="0" cy="593497"/>
+            </a:xfrm>
+            <a:prstGeom prst="straightConnector1">
+              <a:avLst/>
+            </a:prstGeom>
+            <a:ln w="63500">
+              <a:solidFill>
+                <a:schemeClr val="accent2"/>
+              </a:solidFill>
+              <a:tailEnd type="triangle"/>
+            </a:ln>
+          </p:spPr>
+          <p:style>
+            <a:lnRef idx="2">
+              <a:schemeClr val="accent1"/>
+            </a:lnRef>
+            <a:fillRef idx="0">
+              <a:schemeClr val="accent1"/>
+            </a:fillRef>
+            <a:effectRef idx="1">
+              <a:schemeClr val="accent1"/>
+            </a:effectRef>
+            <a:fontRef idx="minor">
+              <a:schemeClr val="tx1"/>
+            </a:fontRef>
+          </p:style>
+        </p:cxnSp>
+        <p:sp>
+          <p:nvSpPr>
+            <p:cNvPr id="17" name="Rounded Rectangle 16">
+              <a:extLst>
+                <a:ext uri="{FF2B5EF4-FFF2-40B4-BE49-F238E27FC236}">
+                  <a16:creationId xmlns:a16="http://schemas.microsoft.com/office/drawing/2014/main" id="{EA58FF94-930E-8C5D-0AEE-F10C7FEC41C6}"/>
+                </a:ext>
+              </a:extLst>
+            </p:cNvPr>
+            <p:cNvSpPr/>
+            <p:nvPr/>
+          </p:nvSpPr>
+          <p:spPr>
+            <a:xfrm>
+              <a:off x="8477828" y="1300665"/>
+              <a:ext cx="2452577" cy="1472610"/>
+            </a:xfrm>
+            <a:prstGeom prst="roundRect">
+              <a:avLst/>
+            </a:prstGeom>
+            <a:solidFill>
+              <a:schemeClr val="accent1"/>
+            </a:solidFill>
+            <a:ln w="38100">
+              <a:solidFill>
+                <a:schemeClr val="tx1"/>
+              </a:solidFill>
+            </a:ln>
+          </p:spPr>
+          <p:style>
+            <a:lnRef idx="2">
+              <a:schemeClr val="accent1">
+                <a:shade val="15000"/>
+              </a:schemeClr>
+            </a:lnRef>
+            <a:fillRef idx="1">
+              <a:schemeClr val="accent1"/>
+            </a:fillRef>
+            <a:effectRef idx="0">
+              <a:schemeClr val="accent1"/>
+            </a:effectRef>
+            <a:fontRef idx="minor">
+              <a:schemeClr val="lt1"/>
+            </a:fontRef>
+          </p:style>
+          <p:txBody>
+            <a:bodyPr rtlCol="0" anchor="ctr"/>
+            <a:lstStyle/>
+            <a:p>
+              <a:pPr algn="ctr"/>
+              <a:endParaRPr lang="en-US"/>
+            </a:p>
+          </p:txBody>
+        </p:sp>
+        <p:sp>
+          <p:nvSpPr>
+            <p:cNvPr id="18" name="TextBox 17">
+              <a:extLst>
+                <a:ext uri="{FF2B5EF4-FFF2-40B4-BE49-F238E27FC236}">
+                  <a16:creationId xmlns:a16="http://schemas.microsoft.com/office/drawing/2014/main" id="{A0B67A97-9179-2768-7ADC-0327BD9B2890}"/>
+                </a:ext>
+              </a:extLst>
+            </p:cNvPr>
+            <p:cNvSpPr txBox="1"/>
+            <p:nvPr/>
+          </p:nvSpPr>
+          <p:spPr>
+            <a:xfrm>
+              <a:off x="8773767" y="1573498"/>
+              <a:ext cx="1860698" cy="923330"/>
+            </a:xfrm>
+            <a:prstGeom prst="rect">
+              <a:avLst/>
+            </a:prstGeom>
+            <a:noFill/>
+          </p:spPr>
+          <p:txBody>
+            <a:bodyPr wrap="square" rtlCol="0">
+              <a:spAutoFit/>
+            </a:bodyPr>
+            <a:lstStyle/>
+            <a:p>
+              <a:pPr algn="ctr"/>
+              <a:r>
+                <a:rPr lang="en-US" dirty="0">
+                  <a:solidFill>
+                    <a:schemeClr val="bg1"/>
+                  </a:solidFill>
+                </a:rPr>
+                <a:t>Value: 6</a:t>
+              </a:r>
+            </a:p>
+            <a:p>
+              <a:pPr algn="ctr"/>
+              <a:r>
+                <a:rPr lang="en-US" dirty="0">
+                  <a:solidFill>
+                    <a:schemeClr val="bg1"/>
+                  </a:solidFill>
+                </a:rPr>
+                <a:t>Address: 3</a:t>
+              </a:r>
+            </a:p>
+            <a:p>
+              <a:pPr algn="ctr"/>
+              <a:r>
+                <a:rPr lang="en-US" dirty="0">
+                  <a:solidFill>
+                    <a:schemeClr val="bg1"/>
+                  </a:solidFill>
+                </a:rPr>
+                <a:t>Type: Integer</a:t>
+              </a:r>
+            </a:p>
+          </p:txBody>
+        </p:sp>
+        <p:sp>
+          <p:nvSpPr>
+            <p:cNvPr id="19" name="Rounded Rectangle 18">
+              <a:extLst>
+                <a:ext uri="{FF2B5EF4-FFF2-40B4-BE49-F238E27FC236}">
+                  <a16:creationId xmlns:a16="http://schemas.microsoft.com/office/drawing/2014/main" id="{9D6B0FFB-887F-30EB-176A-2E29AF93D537}"/>
+                </a:ext>
+              </a:extLst>
+            </p:cNvPr>
+            <p:cNvSpPr/>
+            <p:nvPr/>
+          </p:nvSpPr>
+          <p:spPr>
+            <a:xfrm>
+              <a:off x="11352163" y="1300665"/>
+              <a:ext cx="2452577" cy="1472610"/>
+            </a:xfrm>
+            <a:prstGeom prst="roundRect">
+              <a:avLst/>
+            </a:prstGeom>
+            <a:solidFill>
+              <a:schemeClr val="accent1"/>
+            </a:solidFill>
+            <a:ln w="38100">
+              <a:solidFill>
+                <a:schemeClr val="tx1"/>
+              </a:solidFill>
+            </a:ln>
+          </p:spPr>
+          <p:style>
+            <a:lnRef idx="2">
+              <a:schemeClr val="accent1">
+                <a:shade val="15000"/>
+              </a:schemeClr>
+            </a:lnRef>
+            <a:fillRef idx="1">
+              <a:schemeClr val="accent1"/>
+            </a:fillRef>
+            <a:effectRef idx="0">
+              <a:schemeClr val="accent1"/>
+            </a:effectRef>
+            <a:fontRef idx="minor">
+              <a:schemeClr val="lt1"/>
+            </a:fontRef>
+          </p:style>
+          <p:txBody>
+            <a:bodyPr rtlCol="0" anchor="ctr"/>
+            <a:lstStyle/>
+            <a:p>
+              <a:pPr algn="ctr"/>
+              <a:endParaRPr lang="en-US"/>
+            </a:p>
+          </p:txBody>
+        </p:sp>
+        <p:sp>
+          <p:nvSpPr>
+            <p:cNvPr id="20" name="TextBox 19">
+              <a:extLst>
+                <a:ext uri="{FF2B5EF4-FFF2-40B4-BE49-F238E27FC236}">
+                  <a16:creationId xmlns:a16="http://schemas.microsoft.com/office/drawing/2014/main" id="{44C8471B-177C-F192-FD37-22F37365FECE}"/>
+                </a:ext>
+              </a:extLst>
+            </p:cNvPr>
+            <p:cNvSpPr txBox="1"/>
+            <p:nvPr/>
+          </p:nvSpPr>
+          <p:spPr>
+            <a:xfrm>
+              <a:off x="11648102" y="1573498"/>
+              <a:ext cx="1860698" cy="923330"/>
+            </a:xfrm>
+            <a:prstGeom prst="rect">
+              <a:avLst/>
+            </a:prstGeom>
+            <a:noFill/>
+          </p:spPr>
+          <p:txBody>
+            <a:bodyPr wrap="square" rtlCol="0">
+              <a:spAutoFit/>
+            </a:bodyPr>
+            <a:lstStyle/>
+            <a:p>
+              <a:pPr algn="ctr"/>
+              <a:r>
+                <a:rPr lang="en-US" dirty="0">
+                  <a:solidFill>
+                    <a:schemeClr val="bg1"/>
+                  </a:solidFill>
+                </a:rPr>
+                <a:t>Value: 1</a:t>
+              </a:r>
+            </a:p>
+            <a:p>
+              <a:pPr algn="ctr"/>
+              <a:r>
+                <a:rPr lang="en-US" dirty="0">
+                  <a:solidFill>
+                    <a:schemeClr val="bg1"/>
+                  </a:solidFill>
+                </a:rPr>
+                <a:t>Address: 1</a:t>
+              </a:r>
+            </a:p>
+            <a:p>
+              <a:pPr algn="ctr"/>
+              <a:r>
+                <a:rPr lang="en-US" dirty="0">
+                  <a:solidFill>
+                    <a:schemeClr val="bg1"/>
+                  </a:solidFill>
+                </a:rPr>
+                <a:t>Type: Integer</a:t>
+              </a:r>
+            </a:p>
+          </p:txBody>
+        </p:sp>
+        <p:sp>
+          <p:nvSpPr>
+            <p:cNvPr id="21" name="Rounded Rectangle 20">
+              <a:extLst>
+                <a:ext uri="{FF2B5EF4-FFF2-40B4-BE49-F238E27FC236}">
+                  <a16:creationId xmlns:a16="http://schemas.microsoft.com/office/drawing/2014/main" id="{EE0288C8-5072-11BB-D2B8-421B054CA346}"/>
+                </a:ext>
+              </a:extLst>
+            </p:cNvPr>
+            <p:cNvSpPr/>
+            <p:nvPr/>
+          </p:nvSpPr>
+          <p:spPr>
+            <a:xfrm>
+              <a:off x="8477828" y="2925686"/>
+              <a:ext cx="5326912" cy="1083141"/>
+            </a:xfrm>
+            <a:prstGeom prst="roundRect">
+              <a:avLst/>
+            </a:prstGeom>
+            <a:solidFill>
+              <a:schemeClr val="accent1"/>
+            </a:solidFill>
+            <a:ln w="38100">
+              <a:solidFill>
+                <a:schemeClr val="tx1"/>
+              </a:solidFill>
+            </a:ln>
+          </p:spPr>
+          <p:style>
+            <a:lnRef idx="2">
+              <a:schemeClr val="accent1">
+                <a:shade val="15000"/>
+              </a:schemeClr>
+            </a:lnRef>
+            <a:fillRef idx="1">
+              <a:schemeClr val="accent1"/>
+            </a:fillRef>
+            <a:effectRef idx="0">
+              <a:schemeClr val="accent1"/>
+            </a:effectRef>
+            <a:fontRef idx="minor">
+              <a:schemeClr val="lt1"/>
+            </a:fontRef>
+          </p:style>
+          <p:txBody>
+            <a:bodyPr rtlCol="0" anchor="ctr"/>
+            <a:lstStyle/>
+            <a:p>
+              <a:pPr algn="ctr"/>
+              <a:endParaRPr lang="en-US"/>
+            </a:p>
+          </p:txBody>
+        </p:sp>
+        <p:sp>
+          <p:nvSpPr>
+            <p:cNvPr id="22" name="TextBox 21">
+              <a:extLst>
+                <a:ext uri="{FF2B5EF4-FFF2-40B4-BE49-F238E27FC236}">
+                  <a16:creationId xmlns:a16="http://schemas.microsoft.com/office/drawing/2014/main" id="{1CA1752D-3ED9-0127-5FE9-1E70C340B1FE}"/>
+                </a:ext>
+              </a:extLst>
+            </p:cNvPr>
+            <p:cNvSpPr txBox="1"/>
+            <p:nvPr/>
+          </p:nvSpPr>
+          <p:spPr>
+            <a:xfrm>
+              <a:off x="8672451" y="3035825"/>
+              <a:ext cx="4913326" cy="369332"/>
+            </a:xfrm>
+            <a:prstGeom prst="rect">
+              <a:avLst/>
+            </a:prstGeom>
+            <a:noFill/>
+          </p:spPr>
+          <p:txBody>
+            <a:bodyPr wrap="square" rtlCol="0">
+              <a:spAutoFit/>
+            </a:bodyPr>
+            <a:lstStyle/>
+            <a:p>
+              <a:pPr algn="ctr"/>
+              <a:r>
+                <a:rPr lang="en-US" dirty="0">
+                  <a:solidFill>
+                    <a:schemeClr val="bg1"/>
+                  </a:solidFill>
+                </a:rPr>
+                <a:t>Ref: 01			Ref: 02</a:t>
+              </a:r>
+            </a:p>
+          </p:txBody>
+        </p:sp>
+        <p:cxnSp>
+          <p:nvCxnSpPr>
+            <p:cNvPr id="23" name="Straight Arrow Connector 22">
+              <a:extLst>
+                <a:ext uri="{FF2B5EF4-FFF2-40B4-BE49-F238E27FC236}">
+                  <a16:creationId xmlns:a16="http://schemas.microsoft.com/office/drawing/2014/main" id="{F1D3EC04-62EC-BD03-A45D-E80F778174ED}"/>
+                </a:ext>
+              </a:extLst>
+            </p:cNvPr>
+            <p:cNvCxnSpPr>
+              <a:cxnSpLocks/>
+            </p:cNvCxnSpPr>
+            <p:nvPr/>
+          </p:nvCxnSpPr>
+          <p:spPr>
+            <a:xfrm flipV="1">
+              <a:off x="9716002" y="2476526"/>
+              <a:ext cx="0" cy="593497"/>
+            </a:xfrm>
+            <a:prstGeom prst="straightConnector1">
+              <a:avLst/>
+            </a:prstGeom>
+            <a:ln w="63500">
+              <a:solidFill>
+                <a:schemeClr val="accent2"/>
+              </a:solidFill>
+              <a:tailEnd type="triangle"/>
+            </a:ln>
+          </p:spPr>
+          <p:style>
+            <a:lnRef idx="2">
+              <a:schemeClr val="accent1"/>
+            </a:lnRef>
+            <a:fillRef idx="0">
+              <a:schemeClr val="accent1"/>
+            </a:fillRef>
+            <a:effectRef idx="1">
+              <a:schemeClr val="accent1"/>
+            </a:effectRef>
+            <a:fontRef idx="minor">
+              <a:schemeClr val="tx1"/>
+            </a:fontRef>
+          </p:style>
+        </p:cxnSp>
+        <p:cxnSp>
+          <p:nvCxnSpPr>
+            <p:cNvPr id="24" name="Straight Arrow Connector 23">
+              <a:extLst>
+                <a:ext uri="{FF2B5EF4-FFF2-40B4-BE49-F238E27FC236}">
+                  <a16:creationId xmlns:a16="http://schemas.microsoft.com/office/drawing/2014/main" id="{76C2908B-8F5A-BAFD-AD18-68744C8C5EE6}"/>
+                </a:ext>
+              </a:extLst>
+            </p:cNvPr>
+            <p:cNvCxnSpPr>
+              <a:cxnSpLocks/>
+            </p:cNvCxnSpPr>
+            <p:nvPr/>
+          </p:nvCxnSpPr>
+          <p:spPr>
+            <a:xfrm flipV="1">
+              <a:off x="12667879" y="2476526"/>
+              <a:ext cx="0" cy="593497"/>
+            </a:xfrm>
+            <a:prstGeom prst="straightConnector1">
+              <a:avLst/>
+            </a:prstGeom>
+            <a:ln w="63500">
+              <a:solidFill>
+                <a:schemeClr val="accent2"/>
+              </a:solidFill>
+              <a:tailEnd type="triangle"/>
+            </a:ln>
+          </p:spPr>
+          <p:style>
+            <a:lnRef idx="2">
+              <a:schemeClr val="accent1"/>
+            </a:lnRef>
+            <a:fillRef idx="0">
+              <a:schemeClr val="accent1"/>
+            </a:fillRef>
+            <a:effectRef idx="1">
+              <a:schemeClr val="accent1"/>
+            </a:effectRef>
+            <a:fontRef idx="minor">
+              <a:schemeClr val="tx1"/>
+            </a:fontRef>
+          </p:style>
+        </p:cxnSp>
+        <p:grpSp>
+          <p:nvGrpSpPr>
+            <p:cNvPr id="28" name="Group 27">
+              <a:extLst>
+                <a:ext uri="{FF2B5EF4-FFF2-40B4-BE49-F238E27FC236}">
+                  <a16:creationId xmlns:a16="http://schemas.microsoft.com/office/drawing/2014/main" id="{F175BD45-4BE3-B330-2D12-7F362C599541}"/>
+                </a:ext>
+              </a:extLst>
+            </p:cNvPr>
+            <p:cNvGrpSpPr/>
+            <p:nvPr/>
+          </p:nvGrpSpPr>
+          <p:grpSpPr>
+            <a:xfrm>
+              <a:off x="9973819" y="3884627"/>
+              <a:ext cx="2334930" cy="1441216"/>
+              <a:chOff x="8053475" y="2746628"/>
+              <a:chExt cx="2334930" cy="1441216"/>
+            </a:xfrm>
+          </p:grpSpPr>
+          <p:cxnSp>
+            <p:nvCxnSpPr>
+              <p:cNvPr id="29" name="Straight Arrow Connector 28">
+                <a:extLst>
+                  <a:ext uri="{FF2B5EF4-FFF2-40B4-BE49-F238E27FC236}">
+                    <a16:creationId xmlns:a16="http://schemas.microsoft.com/office/drawing/2014/main" id="{E79E4B50-0AF2-420B-2DB8-DC4A2EB85FBC}"/>
+                  </a:ext>
+                </a:extLst>
+              </p:cNvPr>
+              <p:cNvCxnSpPr>
+                <a:cxnSpLocks/>
+              </p:cNvCxnSpPr>
+              <p:nvPr/>
+            </p:nvCxnSpPr>
+            <p:spPr>
+              <a:xfrm flipV="1">
+                <a:off x="9208770" y="2746628"/>
+                <a:ext cx="0" cy="945766"/>
+              </a:xfrm>
+              <a:prstGeom prst="straightConnector1">
+                <a:avLst/>
+              </a:prstGeom>
+              <a:ln w="63500">
+                <a:solidFill>
+                  <a:schemeClr val="accent2"/>
+                </a:solidFill>
+                <a:tailEnd type="triangle"/>
+              </a:ln>
+            </p:spPr>
+            <p:style>
+              <a:lnRef idx="2">
+                <a:schemeClr val="accent1"/>
+              </a:lnRef>
+              <a:fillRef idx="0">
+                <a:schemeClr val="accent1"/>
+              </a:fillRef>
+              <a:effectRef idx="1">
+                <a:schemeClr val="accent1"/>
+              </a:effectRef>
+              <a:fontRef idx="minor">
+                <a:schemeClr val="tx1"/>
+              </a:fontRef>
+            </p:style>
+          </p:cxnSp>
+          <p:sp>
+            <p:nvSpPr>
+              <p:cNvPr id="30" name="TextBox 29">
+                <a:extLst>
+                  <a:ext uri="{FF2B5EF4-FFF2-40B4-BE49-F238E27FC236}">
+                    <a16:creationId xmlns:a16="http://schemas.microsoft.com/office/drawing/2014/main" id="{50C81553-87C7-470E-FC4A-D1EBBF9123F4}"/>
+                  </a:ext>
+                </a:extLst>
+              </p:cNvPr>
+              <p:cNvSpPr txBox="1"/>
+              <p:nvPr/>
+            </p:nvSpPr>
+            <p:spPr>
+              <a:xfrm>
+                <a:off x="8053475" y="3726179"/>
+                <a:ext cx="2334930" cy="461665"/>
+              </a:xfrm>
+              <a:prstGeom prst="rect">
+                <a:avLst/>
+              </a:prstGeom>
+              <a:noFill/>
+            </p:spPr>
+            <p:txBody>
+              <a:bodyPr wrap="square" rtlCol="0">
+                <a:spAutoFit/>
+              </a:bodyPr>
+              <a:lstStyle/>
+              <a:p>
+                <a:pPr algn="ctr"/>
+                <a:r>
+                  <a:rPr lang="en-US" sz="2400" dirty="0">
+                    <a:latin typeface="Consolas" panose="020B0609020204030204" pitchFamily="49" charset="0"/>
+                    <a:cs typeface="Consolas" panose="020B0609020204030204" pitchFamily="49" charset="0"/>
+                  </a:rPr>
+                  <a:t>X</a:t>
+                </a:r>
+              </a:p>
+            </p:txBody>
+          </p:sp>
+        </p:grpSp>
+        <p:sp>
+          <p:nvSpPr>
+            <p:cNvPr id="31" name="TextBox 30">
+              <a:extLst>
+                <a:ext uri="{FF2B5EF4-FFF2-40B4-BE49-F238E27FC236}">
+                  <a16:creationId xmlns:a16="http://schemas.microsoft.com/office/drawing/2014/main" id="{E9F7305A-952F-EF64-8D3E-BA7BF5D49B10}"/>
+                </a:ext>
+              </a:extLst>
+            </p:cNvPr>
+            <p:cNvSpPr txBox="1"/>
+            <p:nvPr/>
+          </p:nvSpPr>
+          <p:spPr>
+            <a:xfrm>
+              <a:off x="2965692" y="3330638"/>
+              <a:ext cx="1860698" cy="646331"/>
+            </a:xfrm>
+            <a:prstGeom prst="rect">
+              <a:avLst/>
+            </a:prstGeom>
+            <a:noFill/>
+          </p:spPr>
+          <p:txBody>
+            <a:bodyPr wrap="square" rtlCol="0">
+              <a:spAutoFit/>
+            </a:bodyPr>
+            <a:lstStyle/>
+            <a:p>
+              <a:pPr algn="ctr"/>
+              <a:r>
+                <a:rPr lang="en-US" dirty="0">
+                  <a:solidFill>
+                    <a:schemeClr val="bg1"/>
+                  </a:solidFill>
+                </a:rPr>
+                <a:t>Address: 10</a:t>
+              </a:r>
+            </a:p>
+            <a:p>
+              <a:pPr algn="ctr"/>
+              <a:r>
+                <a:rPr lang="en-US" dirty="0">
+                  <a:solidFill>
+                    <a:schemeClr val="bg1"/>
+                  </a:solidFill>
+                </a:rPr>
+                <a:t>Type: List</a:t>
+              </a:r>
+            </a:p>
+          </p:txBody>
+        </p:sp>
+        <p:sp>
+          <p:nvSpPr>
+            <p:cNvPr id="32" name="TextBox 31">
+              <a:extLst>
+                <a:ext uri="{FF2B5EF4-FFF2-40B4-BE49-F238E27FC236}">
+                  <a16:creationId xmlns:a16="http://schemas.microsoft.com/office/drawing/2014/main" id="{21C8F86C-B6AB-0B79-8CD0-112446DAB20C}"/>
+                </a:ext>
+              </a:extLst>
+            </p:cNvPr>
+            <p:cNvSpPr txBox="1"/>
+            <p:nvPr/>
+          </p:nvSpPr>
+          <p:spPr>
+            <a:xfrm>
+              <a:off x="10198765" y="3285864"/>
+              <a:ext cx="1860698" cy="646331"/>
+            </a:xfrm>
+            <a:prstGeom prst="rect">
+              <a:avLst/>
+            </a:prstGeom>
+            <a:noFill/>
+          </p:spPr>
+          <p:txBody>
+            <a:bodyPr wrap="square" rtlCol="0">
+              <a:spAutoFit/>
+            </a:bodyPr>
+            <a:lstStyle/>
+            <a:p>
+              <a:pPr algn="ctr"/>
+              <a:r>
+                <a:rPr lang="en-US" dirty="0">
+                  <a:solidFill>
+                    <a:schemeClr val="bg1"/>
+                  </a:solidFill>
+                </a:rPr>
+                <a:t>Address: 20</a:t>
+              </a:r>
+            </a:p>
+            <a:p>
+              <a:pPr algn="ctr"/>
+              <a:r>
+                <a:rPr lang="en-US" dirty="0">
+                  <a:solidFill>
+                    <a:schemeClr val="bg1"/>
+                  </a:solidFill>
+                </a:rPr>
+                <a:t>Type: List</a:t>
+              </a:r>
+            </a:p>
+          </p:txBody>
+        </p:sp>
+      </p:grpSp>
+    </p:spTree>
+    <p:extLst>
+      <p:ext uri="{BB962C8B-B14F-4D97-AF65-F5344CB8AC3E}">
+        <p14:creationId xmlns:p14="http://schemas.microsoft.com/office/powerpoint/2010/main" val="3318247048"/>
       </p:ext>
     </p:extLst>
   </p:cSld>

</xml_diff>

<commit_message>
HP updated seminar 4
</commit_message>
<xml_diff>
--- a/Week_7_lists_and_testing_code/Seminar_4_scope_and_memory/seminar_scope_and_memory.pptx
+++ b/Week_7_lists_and_testing_code/Seminar_4_scope_and_memory/seminar_scope_and_memory.pptx
@@ -137,10 +137,25 @@
   <pc:docChgLst>
     <pc:chgData name="Hemma Philamore" userId="db50e2f3-17b2-4cc0-b719-fb6254d3e9df" providerId="ADAL" clId="{B5D85944-D90A-5912-90C6-4C26E424D3D6}"/>
     <pc:docChg chg="undo custSel addSld modSld">
-      <pc:chgData name="Hemma Philamore" userId="db50e2f3-17b2-4cc0-b719-fb6254d3e9df" providerId="ADAL" clId="{B5D85944-D90A-5912-90C6-4C26E424D3D6}" dt="2025-10-31T22:54:20.136" v="98" actId="1076"/>
+      <pc:chgData name="Hemma Philamore" userId="db50e2f3-17b2-4cc0-b719-fb6254d3e9df" providerId="ADAL" clId="{B5D85944-D90A-5912-90C6-4C26E424D3D6}" dt="2025-10-31T23:11:21.919" v="100" actId="20577"/>
       <pc:docMkLst>
         <pc:docMk/>
       </pc:docMkLst>
+      <pc:sldChg chg="modSp mod">
+        <pc:chgData name="Hemma Philamore" userId="db50e2f3-17b2-4cc0-b719-fb6254d3e9df" providerId="ADAL" clId="{B5D85944-D90A-5912-90C6-4C26E424D3D6}" dt="2025-10-31T23:11:21.919" v="100" actId="20577"/>
+        <pc:sldMkLst>
+          <pc:docMk/>
+          <pc:sldMk cId="3878556393" sldId="258"/>
+        </pc:sldMkLst>
+        <pc:graphicFrameChg chg="modGraphic">
+          <ac:chgData name="Hemma Philamore" userId="db50e2f3-17b2-4cc0-b719-fb6254d3e9df" providerId="ADAL" clId="{B5D85944-D90A-5912-90C6-4C26E424D3D6}" dt="2025-10-31T23:11:21.919" v="100" actId="20577"/>
+          <ac:graphicFrameMkLst>
+            <pc:docMk/>
+            <pc:sldMk cId="3878556393" sldId="258"/>
+            <ac:graphicFrameMk id="4" creationId="{27FC4CC3-6357-92A1-4A8C-983A6D10A444}"/>
+          </ac:graphicFrameMkLst>
+        </pc:graphicFrameChg>
+      </pc:sldChg>
       <pc:sldChg chg="addSp modSp mod">
         <pc:chgData name="Hemma Philamore" userId="db50e2f3-17b2-4cc0-b719-fb6254d3e9df" providerId="ADAL" clId="{B5D85944-D90A-5912-90C6-4C26E424D3D6}" dt="2025-10-31T22:34:06.322" v="77" actId="164"/>
         <pc:sldMkLst>
@@ -6566,7 +6581,7 @@
           <p:nvPr>
             <p:extLst>
               <p:ext uri="{D42A27DB-BD31-4B8C-83A1-F6EECF244321}">
-                <p14:modId xmlns:p14="http://schemas.microsoft.com/office/powerpoint/2010/main" val="2045844125"/>
+                <p14:modId xmlns:p14="http://schemas.microsoft.com/office/powerpoint/2010/main" val="3591156872"/>
               </p:ext>
             </p:extLst>
           </p:nvPr>
@@ -6836,7 +6851,7 @@
                           <a:latin typeface="Consolas" panose="020B0609020204030204" pitchFamily="49" charset="0"/>
                           <a:cs typeface="Consolas" panose="020B0609020204030204" pitchFamily="49" charset="0"/>
                         </a:rPr>
-                        <a:t>Def </a:t>
+                        <a:t>def </a:t>
                       </a:r>
                       <a:r>
                         <a:rPr lang="en-US" dirty="0" err="1">

</xml_diff>

<commit_message>
HP updated weeks 9 and 10
</commit_message>
<xml_diff>
--- a/Week_7_lists_and_testing_code/Seminar_4_scope_and_memory/seminar_scope_and_memory.pptx
+++ b/Week_7_lists_and_testing_code/Seminar_4_scope_and_memory/seminar_scope_and_memory.pptx
@@ -126,8 +126,7 @@
 <file path=ppt/revisionInfo.xml><?xml version="1.0" encoding="utf-8"?>
 <p1510:revInfo xmlns:a="http://schemas.openxmlformats.org/drawingml/2006/main" xmlns:r="http://schemas.openxmlformats.org/officeDocument/2006/relationships" xmlns:p1510="http://schemas.microsoft.com/office/powerpoint/2015/10/main">
   <p1510:revLst>
-    <p1510:client id="{84C58783-0833-2642-9CD5-D489389CB76F}" v="57" dt="2025-10-31T16:56:34.878"/>
-    <p1510:client id="{AAC1F951-0C65-8B4C-9B54-8D30421C746A}" v="20" dt="2025-10-31T22:47:58.185"/>
+    <p1510:client id="{A14521EB-4666-6F4A-B5EB-C7DB0471B968}" v="1" dt="2025-11-05T19:13:33.245"/>
   </p1510:revLst>
 </p1510:revInfo>
 </file>
@@ -137,7 +136,7 @@
   <pc:docChgLst>
     <pc:chgData name="Hemma Philamore" userId="db50e2f3-17b2-4cc0-b719-fb6254d3e9df" providerId="ADAL" clId="{B5D85944-D90A-5912-90C6-4C26E424D3D6}"/>
     <pc:docChg chg="undo custSel addSld modSld">
-      <pc:chgData name="Hemma Philamore" userId="db50e2f3-17b2-4cc0-b719-fb6254d3e9df" providerId="ADAL" clId="{B5D85944-D90A-5912-90C6-4C26E424D3D6}" dt="2025-10-31T23:11:21.919" v="100" actId="20577"/>
+      <pc:chgData name="Hemma Philamore" userId="db50e2f3-17b2-4cc0-b719-fb6254d3e9df" providerId="ADAL" clId="{B5D85944-D90A-5912-90C6-4C26E424D3D6}" dt="2025-11-05T19:13:33.244" v="142" actId="164"/>
       <pc:docMkLst>
         <pc:docMk/>
       </pc:docMkLst>
@@ -157,7 +156,7 @@
         </pc:graphicFrameChg>
       </pc:sldChg>
       <pc:sldChg chg="addSp modSp mod">
-        <pc:chgData name="Hemma Philamore" userId="db50e2f3-17b2-4cc0-b719-fb6254d3e9df" providerId="ADAL" clId="{B5D85944-D90A-5912-90C6-4C26E424D3D6}" dt="2025-10-31T22:34:06.322" v="77" actId="164"/>
+        <pc:chgData name="Hemma Philamore" userId="db50e2f3-17b2-4cc0-b719-fb6254d3e9df" providerId="ADAL" clId="{B5D85944-D90A-5912-90C6-4C26E424D3D6}" dt="2025-11-05T19:13:33.244" v="142" actId="164"/>
         <pc:sldMkLst>
           <pc:docMk/>
           <pc:sldMk cId="3862914363" sldId="259"/>
@@ -211,7 +210,7 @@
           </ac:spMkLst>
         </pc:spChg>
         <pc:spChg chg="mod">
-          <ac:chgData name="Hemma Philamore" userId="db50e2f3-17b2-4cc0-b719-fb6254d3e9df" providerId="ADAL" clId="{B5D85944-D90A-5912-90C6-4C26E424D3D6}" dt="2025-10-31T22:32:53.771" v="76" actId="27107"/>
+          <ac:chgData name="Hemma Philamore" userId="db50e2f3-17b2-4cc0-b719-fb6254d3e9df" providerId="ADAL" clId="{B5D85944-D90A-5912-90C6-4C26E424D3D6}" dt="2025-11-05T19:13:33.244" v="142" actId="164"/>
           <ac:spMkLst>
             <pc:docMk/>
             <pc:sldMk cId="3862914363" sldId="259"/>
@@ -219,11 +218,19 @@
           </ac:spMkLst>
         </pc:spChg>
         <pc:grpChg chg="add mod">
-          <ac:chgData name="Hemma Philamore" userId="db50e2f3-17b2-4cc0-b719-fb6254d3e9df" providerId="ADAL" clId="{B5D85944-D90A-5912-90C6-4C26E424D3D6}" dt="2025-10-31T22:34:06.322" v="77" actId="164"/>
+          <ac:chgData name="Hemma Philamore" userId="db50e2f3-17b2-4cc0-b719-fb6254d3e9df" providerId="ADAL" clId="{B5D85944-D90A-5912-90C6-4C26E424D3D6}" dt="2025-11-05T19:13:33.244" v="142" actId="164"/>
           <ac:grpSpMkLst>
             <pc:docMk/>
             <pc:sldMk cId="3862914363" sldId="259"/>
             <ac:grpSpMk id="3" creationId="{ECAFB0DE-FA84-14F9-561E-1AC98D47B910}"/>
+          </ac:grpSpMkLst>
+        </pc:grpChg>
+        <pc:grpChg chg="add mod">
+          <ac:chgData name="Hemma Philamore" userId="db50e2f3-17b2-4cc0-b719-fb6254d3e9df" providerId="ADAL" clId="{B5D85944-D90A-5912-90C6-4C26E424D3D6}" dt="2025-11-05T19:13:33.244" v="142" actId="164"/>
+          <ac:grpSpMkLst>
+            <pc:docMk/>
+            <pc:sldMk cId="3862914363" sldId="259"/>
+            <ac:grpSpMk id="4" creationId="{31FB8B8B-46BC-2907-0294-20CEBB985C83}"/>
           </ac:grpSpMkLst>
         </pc:grpChg>
       </pc:sldChg>
@@ -664,22 +671,6 @@
             <ac:spMk id="25" creationId="{D75BE8ED-8BCD-0D5B-CF18-4976EF6B7B88}"/>
           </ac:spMkLst>
         </pc:spChg>
-        <pc:spChg chg="del">
-          <ac:chgData name="Hemma Philamore" userId="db50e2f3-17b2-4cc0-b719-fb6254d3e9df" providerId="ADAL" clId="{B5D85944-D90A-5912-90C6-4C26E424D3D6}" dt="2025-10-31T22:04:48.389" v="32" actId="478"/>
-          <ac:spMkLst>
-            <pc:docMk/>
-            <pc:sldMk cId="3630224590" sldId="261"/>
-            <ac:spMk id="26" creationId="{D98849D2-D84F-336A-DACD-9AD2D69AF5F7}"/>
-          </ac:spMkLst>
-        </pc:spChg>
-        <pc:spChg chg="del">
-          <ac:chgData name="Hemma Philamore" userId="db50e2f3-17b2-4cc0-b719-fb6254d3e9df" providerId="ADAL" clId="{B5D85944-D90A-5912-90C6-4C26E424D3D6}" dt="2025-10-31T22:05:04.890" v="35" actId="478"/>
-          <ac:spMkLst>
-            <pc:docMk/>
-            <pc:sldMk cId="3630224590" sldId="261"/>
-            <ac:spMk id="27" creationId="{F5583A7A-B2A6-4783-A566-BF8760067FEA}"/>
-          </ac:spMkLst>
-        </pc:spChg>
         <pc:spChg chg="add mod">
           <ac:chgData name="Hemma Philamore" userId="db50e2f3-17b2-4cc0-b719-fb6254d3e9df" providerId="ADAL" clId="{B5D85944-D90A-5912-90C6-4C26E424D3D6}" dt="2025-10-31T22:31:55.525" v="73" actId="164"/>
           <ac:spMkLst>
@@ -879,14 +870,6 @@
             <ac:spMk id="13" creationId="{20B816DD-570A-0B4D-2DFA-42BA1E1BB1F4}"/>
           </ac:spMkLst>
         </pc:spChg>
-        <pc:spChg chg="mod">
-          <ac:chgData name="Hemma Philamore" userId="db50e2f3-17b2-4cc0-b719-fb6254d3e9df" providerId="ADAL" clId="{B5D85944-D90A-5912-90C6-4C26E424D3D6}" dt="2025-10-31T22:02:44.869" v="1"/>
-          <ac:spMkLst>
-            <pc:docMk/>
-            <pc:sldMk cId="4195481004" sldId="262"/>
-            <ac:spMk id="16" creationId="{A0D11F68-C85E-56B4-95C3-AAFB784103F8}"/>
-          </ac:spMkLst>
-        </pc:spChg>
         <pc:spChg chg="add mod">
           <ac:chgData name="Hemma Philamore" userId="db50e2f3-17b2-4cc0-b719-fb6254d3e9df" providerId="ADAL" clId="{B5D85944-D90A-5912-90C6-4C26E424D3D6}" dt="2025-10-31T22:32:22.240" v="75" actId="164"/>
           <ac:spMkLst>
@@ -940,14 +923,6 @@
           <ac:spMkLst>
             <pc:docMk/>
             <pc:sldMk cId="4195481004" sldId="262"/>
-            <ac:spMk id="27" creationId="{F3511981-3915-A516-A5CB-4948B90F3C95}"/>
-          </ac:spMkLst>
-        </pc:spChg>
-        <pc:spChg chg="mod">
-          <ac:chgData name="Hemma Philamore" userId="db50e2f3-17b2-4cc0-b719-fb6254d3e9df" providerId="ADAL" clId="{B5D85944-D90A-5912-90C6-4C26E424D3D6}" dt="2025-10-31T22:03:02.741" v="3"/>
-          <ac:spMkLst>
-            <pc:docMk/>
-            <pc:sldMk cId="4195481004" sldId="262"/>
             <ac:spMk id="30" creationId="{2A603D8B-A8EE-1215-2313-CD1FAED95112}"/>
           </ac:spMkLst>
         </pc:spChg>
@@ -973,22 +948,6 @@
             <pc:docMk/>
             <pc:sldMk cId="4195481004" sldId="262"/>
             <ac:grpSpMk id="11" creationId="{FB6EC67E-3704-9A5D-2EB0-7741E2135028}"/>
-          </ac:grpSpMkLst>
-        </pc:grpChg>
-        <pc:grpChg chg="del">
-          <ac:chgData name="Hemma Philamore" userId="db50e2f3-17b2-4cc0-b719-fb6254d3e9df" providerId="ADAL" clId="{B5D85944-D90A-5912-90C6-4C26E424D3D6}" dt="2025-10-31T22:03:19.157" v="7" actId="478"/>
-          <ac:grpSpMkLst>
-            <pc:docMk/>
-            <pc:sldMk cId="4195481004" sldId="262"/>
-            <ac:grpSpMk id="14" creationId="{7B838560-1ECA-1082-836D-FF0DCBBDD4F6}"/>
-          </ac:grpSpMkLst>
-        </pc:grpChg>
-        <pc:grpChg chg="add del mod">
-          <ac:chgData name="Hemma Philamore" userId="db50e2f3-17b2-4cc0-b719-fb6254d3e9df" providerId="ADAL" clId="{B5D85944-D90A-5912-90C6-4C26E424D3D6}" dt="2025-10-31T22:03:11.116" v="5" actId="478"/>
-          <ac:grpSpMkLst>
-            <pc:docMk/>
-            <pc:sldMk cId="4195481004" sldId="262"/>
-            <ac:grpSpMk id="25" creationId="{A35114F7-E407-8B35-1D0C-4C0D41D2CB61}"/>
           </ac:grpSpMkLst>
         </pc:grpChg>
         <pc:grpChg chg="add mod">
@@ -1030,28 +989,12 @@
           <pc:docMk/>
           <pc:sldMk cId="118815274" sldId="263"/>
         </pc:sldMkLst>
-        <pc:spChg chg="del">
-          <ac:chgData name="Hemma Philamore" userId="db50e2f3-17b2-4cc0-b719-fb6254d3e9df" providerId="ADAL" clId="{B5D85944-D90A-5912-90C6-4C26E424D3D6}" dt="2025-10-31T22:47:08.218" v="80" actId="478"/>
-          <ac:spMkLst>
-            <pc:docMk/>
-            <pc:sldMk cId="118815274" sldId="263"/>
-            <ac:spMk id="9" creationId="{71F10D0D-4070-A329-2FEF-51DB3C225250}"/>
-          </ac:spMkLst>
-        </pc:spChg>
         <pc:spChg chg="mod">
           <ac:chgData name="Hemma Philamore" userId="db50e2f3-17b2-4cc0-b719-fb6254d3e9df" providerId="ADAL" clId="{B5D85944-D90A-5912-90C6-4C26E424D3D6}" dt="2025-10-31T22:47:29.254" v="85" actId="1076"/>
           <ac:spMkLst>
             <pc:docMk/>
             <pc:sldMk cId="118815274" sldId="263"/>
             <ac:spMk id="12" creationId="{73A06DFA-1369-7514-D0E2-8C4254013FC3}"/>
-          </ac:spMkLst>
-        </pc:spChg>
-        <pc:spChg chg="mod">
-          <ac:chgData name="Hemma Philamore" userId="db50e2f3-17b2-4cc0-b719-fb6254d3e9df" providerId="ADAL" clId="{B5D85944-D90A-5912-90C6-4C26E424D3D6}" dt="2025-10-31T22:47:53.982" v="86"/>
-          <ac:spMkLst>
-            <pc:docMk/>
-            <pc:sldMk cId="118815274" sldId="263"/>
-            <ac:spMk id="27" creationId="{29DCE0AA-C9B3-F8EB-1E6A-AE4972CCA242}"/>
           </ac:spMkLst>
         </pc:spChg>
         <pc:spChg chg="mod">
@@ -1086,94 +1029,6 @@
             <ac:spMk id="56" creationId="{24F2E9C1-D62D-9396-A1C3-C73249B96ED1}"/>
           </ac:spMkLst>
         </pc:spChg>
-        <pc:spChg chg="mod">
-          <ac:chgData name="Hemma Philamore" userId="db50e2f3-17b2-4cc0-b719-fb6254d3e9df" providerId="ADAL" clId="{B5D85944-D90A-5912-90C6-4C26E424D3D6}" dt="2025-10-31T22:47:53.982" v="86"/>
-          <ac:spMkLst>
-            <pc:docMk/>
-            <pc:sldMk cId="118815274" sldId="263"/>
-            <ac:spMk id="63" creationId="{D09BF560-F40E-2B0F-9C96-6A705DBF2F58}"/>
-          </ac:spMkLst>
-        </pc:spChg>
-        <pc:spChg chg="mod">
-          <ac:chgData name="Hemma Philamore" userId="db50e2f3-17b2-4cc0-b719-fb6254d3e9df" providerId="ADAL" clId="{B5D85944-D90A-5912-90C6-4C26E424D3D6}" dt="2025-10-31T22:47:53.982" v="86"/>
-          <ac:spMkLst>
-            <pc:docMk/>
-            <pc:sldMk cId="118815274" sldId="263"/>
-            <ac:spMk id="66" creationId="{774A9B4A-4424-3E80-A8FB-EF2BA4C1B748}"/>
-          </ac:spMkLst>
-        </pc:spChg>
-        <pc:spChg chg="mod">
-          <ac:chgData name="Hemma Philamore" userId="db50e2f3-17b2-4cc0-b719-fb6254d3e9df" providerId="ADAL" clId="{B5D85944-D90A-5912-90C6-4C26E424D3D6}" dt="2025-10-31T22:47:53.982" v="86"/>
-          <ac:spMkLst>
-            <pc:docMk/>
-            <pc:sldMk cId="118815274" sldId="263"/>
-            <ac:spMk id="68" creationId="{B2A5ABBE-5E85-9AA6-4B8A-9DEF07026FF5}"/>
-          </ac:spMkLst>
-        </pc:spChg>
-        <pc:spChg chg="mod">
-          <ac:chgData name="Hemma Philamore" userId="db50e2f3-17b2-4cc0-b719-fb6254d3e9df" providerId="ADAL" clId="{B5D85944-D90A-5912-90C6-4C26E424D3D6}" dt="2025-10-31T22:47:53.982" v="86"/>
-          <ac:spMkLst>
-            <pc:docMk/>
-            <pc:sldMk cId="118815274" sldId="263"/>
-            <ac:spMk id="72" creationId="{07B3CDBC-0DA5-D629-961F-65D088F64F7D}"/>
-          </ac:spMkLst>
-        </pc:spChg>
-        <pc:spChg chg="mod">
-          <ac:chgData name="Hemma Philamore" userId="db50e2f3-17b2-4cc0-b719-fb6254d3e9df" providerId="ADAL" clId="{B5D85944-D90A-5912-90C6-4C26E424D3D6}" dt="2025-10-31T22:47:53.982" v="86"/>
-          <ac:spMkLst>
-            <pc:docMk/>
-            <pc:sldMk cId="118815274" sldId="263"/>
-            <ac:spMk id="74" creationId="{316D9450-D32A-F218-A98E-EB2013E4C29C}"/>
-          </ac:spMkLst>
-        </pc:spChg>
-        <pc:spChg chg="mod">
-          <ac:chgData name="Hemma Philamore" userId="db50e2f3-17b2-4cc0-b719-fb6254d3e9df" providerId="ADAL" clId="{B5D85944-D90A-5912-90C6-4C26E424D3D6}" dt="2025-10-31T22:47:53.982" v="86"/>
-          <ac:spMkLst>
-            <pc:docMk/>
-            <pc:sldMk cId="118815274" sldId="263"/>
-            <ac:spMk id="76" creationId="{8C6159F7-3B4D-0CFB-A7E9-2B513F9F04B4}"/>
-          </ac:spMkLst>
-        </pc:spChg>
-        <pc:spChg chg="mod">
-          <ac:chgData name="Hemma Philamore" userId="db50e2f3-17b2-4cc0-b719-fb6254d3e9df" providerId="ADAL" clId="{B5D85944-D90A-5912-90C6-4C26E424D3D6}" dt="2025-10-31T22:47:53.982" v="86"/>
-          <ac:spMkLst>
-            <pc:docMk/>
-            <pc:sldMk cId="118815274" sldId="263"/>
-            <ac:spMk id="81" creationId="{0132B1B2-43BA-A5F6-4C2C-87739589694B}"/>
-          </ac:spMkLst>
-        </pc:spChg>
-        <pc:spChg chg="mod">
-          <ac:chgData name="Hemma Philamore" userId="db50e2f3-17b2-4cc0-b719-fb6254d3e9df" providerId="ADAL" clId="{B5D85944-D90A-5912-90C6-4C26E424D3D6}" dt="2025-10-31T22:47:53.982" v="86"/>
-          <ac:spMkLst>
-            <pc:docMk/>
-            <pc:sldMk cId="118815274" sldId="263"/>
-            <ac:spMk id="82" creationId="{D34B2480-B9E7-70CC-2378-18C18E4D6531}"/>
-          </ac:spMkLst>
-        </pc:spChg>
-        <pc:spChg chg="mod">
-          <ac:chgData name="Hemma Philamore" userId="db50e2f3-17b2-4cc0-b719-fb6254d3e9df" providerId="ADAL" clId="{B5D85944-D90A-5912-90C6-4C26E424D3D6}" dt="2025-10-31T22:47:53.982" v="86"/>
-          <ac:spMkLst>
-            <pc:docMk/>
-            <pc:sldMk cId="118815274" sldId="263"/>
-            <ac:spMk id="86" creationId="{AEFE426F-D0CC-D6C2-56FA-C3C01E13D8C2}"/>
-          </ac:spMkLst>
-        </pc:spChg>
-        <pc:grpChg chg="del">
-          <ac:chgData name="Hemma Philamore" userId="db50e2f3-17b2-4cc0-b719-fb6254d3e9df" providerId="ADAL" clId="{B5D85944-D90A-5912-90C6-4C26E424D3D6}" dt="2025-10-31T22:47:08.218" v="80" actId="478"/>
-          <ac:grpSpMkLst>
-            <pc:docMk/>
-            <pc:sldMk cId="118815274" sldId="263"/>
-            <ac:grpSpMk id="7" creationId="{AE69A846-92F3-1C97-D4B6-D940AEDBCC26}"/>
-          </ac:grpSpMkLst>
-        </pc:grpChg>
-        <pc:grpChg chg="del">
-          <ac:chgData name="Hemma Philamore" userId="db50e2f3-17b2-4cc0-b719-fb6254d3e9df" providerId="ADAL" clId="{B5D85944-D90A-5912-90C6-4C26E424D3D6}" dt="2025-10-31T22:48:02.577" v="87" actId="478"/>
-          <ac:grpSpMkLst>
-            <pc:docMk/>
-            <pc:sldMk cId="118815274" sldId="263"/>
-            <ac:grpSpMk id="26" creationId="{C3E10BD8-936C-0C07-4925-6B0CD68D132B}"/>
-          </ac:grpSpMkLst>
-        </pc:grpChg>
         <pc:grpChg chg="add del">
           <ac:chgData name="Hemma Philamore" userId="db50e2f3-17b2-4cc0-b719-fb6254d3e9df" providerId="ADAL" clId="{B5D85944-D90A-5912-90C6-4C26E424D3D6}" dt="2025-10-31T22:47:10.440" v="82" actId="478"/>
           <ac:grpSpMkLst>
@@ -1182,14 +1037,6 @@
             <ac:grpSpMk id="62" creationId="{87DB2D66-6E3A-8128-E952-85DE8137DA03}"/>
           </ac:grpSpMkLst>
         </pc:grpChg>
-        <pc:cxnChg chg="del">
-          <ac:chgData name="Hemma Philamore" userId="db50e2f3-17b2-4cc0-b719-fb6254d3e9df" providerId="ADAL" clId="{B5D85944-D90A-5912-90C6-4C26E424D3D6}" dt="2025-10-31T22:47:11.360" v="83" actId="478"/>
-          <ac:cxnSpMkLst>
-            <pc:docMk/>
-            <pc:sldMk cId="118815274" sldId="263"/>
-            <ac:cxnSpMk id="8" creationId="{79A0614B-01B1-AB00-B3C4-48B3A82E7AF5}"/>
-          </ac:cxnSpMkLst>
-        </pc:cxnChg>
         <pc:cxnChg chg="mod">
           <ac:chgData name="Hemma Philamore" userId="db50e2f3-17b2-4cc0-b719-fb6254d3e9df" providerId="ADAL" clId="{B5D85944-D90A-5912-90C6-4C26E424D3D6}" dt="2025-10-31T22:47:29.254" v="85" actId="1076"/>
           <ac:cxnSpMkLst>
@@ -1221,14 +1068,6 @@
           <pc:docMk/>
           <pc:sldMk cId="3318247048" sldId="264"/>
         </pc:sldMkLst>
-        <pc:spChg chg="del">
-          <ac:chgData name="Hemma Philamore" userId="db50e2f3-17b2-4cc0-b719-fb6254d3e9df" providerId="ADAL" clId="{B5D85944-D90A-5912-90C6-4C26E424D3D6}" dt="2025-10-31T22:48:09.739" v="89" actId="478"/>
-          <ac:spMkLst>
-            <pc:docMk/>
-            <pc:sldMk cId="3318247048" sldId="264"/>
-            <ac:spMk id="13" creationId="{2DB70A16-5335-2BB7-FEA7-B3E01968F648}"/>
-          </ac:spMkLst>
-        </pc:spChg>
         <pc:spChg chg="mod">
           <ac:chgData name="Hemma Philamore" userId="db50e2f3-17b2-4cc0-b719-fb6254d3e9df" providerId="ADAL" clId="{B5D85944-D90A-5912-90C6-4C26E424D3D6}" dt="2025-10-31T22:48:15.790" v="91" actId="20577"/>
           <ac:spMkLst>
@@ -1237,22 +1076,6 @@
             <ac:spMk id="30" creationId="{50C81553-87C7-470E-FC4A-D1EBBF9123F4}"/>
           </ac:spMkLst>
         </pc:spChg>
-        <pc:grpChg chg="del">
-          <ac:chgData name="Hemma Philamore" userId="db50e2f3-17b2-4cc0-b719-fb6254d3e9df" providerId="ADAL" clId="{B5D85944-D90A-5912-90C6-4C26E424D3D6}" dt="2025-10-31T22:48:09.739" v="89" actId="478"/>
-          <ac:grpSpMkLst>
-            <pc:docMk/>
-            <pc:sldMk cId="3318247048" sldId="264"/>
-            <ac:grpSpMk id="11" creationId="{D1249D02-847F-6F0B-D1A5-41D8E11E748F}"/>
-          </ac:grpSpMkLst>
-        </pc:grpChg>
-        <pc:cxnChg chg="del">
-          <ac:chgData name="Hemma Philamore" userId="db50e2f3-17b2-4cc0-b719-fb6254d3e9df" providerId="ADAL" clId="{B5D85944-D90A-5912-90C6-4C26E424D3D6}" dt="2025-10-31T22:48:13.024" v="90" actId="478"/>
-          <ac:cxnSpMkLst>
-            <pc:docMk/>
-            <pc:sldMk cId="3318247048" sldId="264"/>
-            <ac:cxnSpMk id="12" creationId="{6B710EFE-437E-F3A2-C935-AD0CFB30FBC2}"/>
-          </ac:cxnSpMkLst>
-        </pc:cxnChg>
       </pc:sldChg>
     </pc:docChg>
   </pc:docChgLst>
@@ -1331,14 +1154,6 @@
             <ac:spMk id="2" creationId="{FD0601CB-C244-1CF5-571C-4CFA71916AA1}"/>
           </ac:spMkLst>
         </pc:spChg>
-        <pc:spChg chg="del mod">
-          <ac:chgData name="Hemma Philamore" userId="db50e2f3-17b2-4cc0-b719-fb6254d3e9df" providerId="ADAL" clId="{35C0B9A2-A60C-57EC-AD9B-630767BE11FE}" dt="2025-10-31T11:47:26.643" v="392" actId="478"/>
-          <ac:spMkLst>
-            <pc:docMk/>
-            <pc:sldMk cId="3878556393" sldId="258"/>
-            <ac:spMk id="3" creationId="{FFCDE803-633B-E2AA-6B43-F65A1927B9B1}"/>
-          </ac:spMkLst>
-        </pc:spChg>
         <pc:spChg chg="add mod">
           <ac:chgData name="Hemma Philamore" userId="db50e2f3-17b2-4cc0-b719-fb6254d3e9df" providerId="ADAL" clId="{35C0B9A2-A60C-57EC-AD9B-630767BE11FE}" dt="2025-10-31T12:45:14.346" v="2655" actId="20577"/>
           <ac:spMkLst>
@@ -1378,22 +1193,6 @@
             <ac:spMk id="2" creationId="{0BD6A09F-C0AE-4396-13F8-A5819F58D109}"/>
           </ac:spMkLst>
         </pc:spChg>
-        <pc:spChg chg="del">
-          <ac:chgData name="Hemma Philamore" userId="db50e2f3-17b2-4cc0-b719-fb6254d3e9df" providerId="ADAL" clId="{35C0B9A2-A60C-57EC-AD9B-630767BE11FE}" dt="2025-10-31T12:02:20.969" v="1282" actId="478"/>
-          <ac:spMkLst>
-            <pc:docMk/>
-            <pc:sldMk cId="3862914363" sldId="259"/>
-            <ac:spMk id="3" creationId="{7CB20A90-9A7F-509C-D767-84D535328D62}"/>
-          </ac:spMkLst>
-        </pc:spChg>
-        <pc:spChg chg="add del mod">
-          <ac:chgData name="Hemma Philamore" userId="db50e2f3-17b2-4cc0-b719-fb6254d3e9df" providerId="ADAL" clId="{35C0B9A2-A60C-57EC-AD9B-630767BE11FE}" dt="2025-10-31T12:02:22.837" v="1283" actId="478"/>
-          <ac:spMkLst>
-            <pc:docMk/>
-            <pc:sldMk cId="3862914363" sldId="259"/>
-            <ac:spMk id="5" creationId="{B0BA816B-8370-C1F0-C409-731F0D9A2037}"/>
-          </ac:spMkLst>
-        </pc:spChg>
         <pc:spChg chg="add mod">
           <ac:chgData name="Hemma Philamore" userId="db50e2f3-17b2-4cc0-b719-fb6254d3e9df" providerId="ADAL" clId="{35C0B9A2-A60C-57EC-AD9B-630767BE11FE}" dt="2025-10-31T12:17:00.792" v="1686" actId="1076"/>
           <ac:spMkLst>
@@ -1458,28 +1257,12 @@
             <ac:spMk id="13" creationId="{864E0085-F809-E515-7767-4CCA1F130AEE}"/>
           </ac:spMkLst>
         </pc:spChg>
-        <pc:spChg chg="add del mod">
-          <ac:chgData name="Hemma Philamore" userId="db50e2f3-17b2-4cc0-b719-fb6254d3e9df" providerId="ADAL" clId="{35C0B9A2-A60C-57EC-AD9B-630767BE11FE}" dt="2025-10-31T12:38:46.921" v="2421" actId="478"/>
-          <ac:spMkLst>
-            <pc:docMk/>
-            <pc:sldMk cId="3862914363" sldId="259"/>
-            <ac:spMk id="14" creationId="{4C4AEE84-B058-F76F-DD5E-056BD97678C3}"/>
-          </ac:spMkLst>
-        </pc:spChg>
         <pc:spChg chg="add mod">
           <ac:chgData name="Hemma Philamore" userId="db50e2f3-17b2-4cc0-b719-fb6254d3e9df" providerId="ADAL" clId="{35C0B9A2-A60C-57EC-AD9B-630767BE11FE}" dt="2025-10-31T12:39:19.324" v="2496" actId="5793"/>
           <ac:spMkLst>
             <pc:docMk/>
             <pc:sldMk cId="3862914363" sldId="259"/>
             <ac:spMk id="15" creationId="{7A8A12CF-0087-19D5-8538-CAB98ADC8B67}"/>
-          </ac:spMkLst>
-        </pc:spChg>
-        <pc:spChg chg="add del mod">
-          <ac:chgData name="Hemma Philamore" userId="db50e2f3-17b2-4cc0-b719-fb6254d3e9df" providerId="ADAL" clId="{35C0B9A2-A60C-57EC-AD9B-630767BE11FE}" dt="2025-10-31T13:56:18.727" v="2722" actId="478"/>
-          <ac:spMkLst>
-            <pc:docMk/>
-            <pc:sldMk cId="3862914363" sldId="259"/>
-            <ac:spMk id="16" creationId="{0CA223B2-D676-F266-79C9-91664F410590}"/>
           </ac:spMkLst>
         </pc:spChg>
       </pc:sldChg>
@@ -1569,14 +1352,6 @@
             <ac:spMk id="15" creationId="{16C76C04-C9DB-8EFB-26C3-0031B929690E}"/>
           </ac:spMkLst>
         </pc:spChg>
-        <pc:spChg chg="add mod">
-          <ac:chgData name="Hemma Philamore" userId="db50e2f3-17b2-4cc0-b719-fb6254d3e9df" providerId="ADAL" clId="{35C0B9A2-A60C-57EC-AD9B-630767BE11FE}" dt="2025-10-31T16:31:33.171" v="2858" actId="1076"/>
-          <ac:spMkLst>
-            <pc:docMk/>
-            <pc:sldMk cId="2931534844" sldId="260"/>
-            <ac:spMk id="17" creationId="{D36172DA-489B-3002-F8CC-61BD59289E28}"/>
-          </ac:spMkLst>
-        </pc:spChg>
         <pc:spChg chg="mod">
           <ac:chgData name="Hemma Philamore" userId="db50e2f3-17b2-4cc0-b719-fb6254d3e9df" providerId="ADAL" clId="{35C0B9A2-A60C-57EC-AD9B-630767BE11FE}" dt="2025-10-31T16:31:52.475" v="2866" actId="20577"/>
           <ac:spMkLst>
@@ -1690,14 +1465,6 @@
           </ac:spMkLst>
         </pc:spChg>
         <pc:spChg chg="mod">
-          <ac:chgData name="Hemma Philamore" userId="db50e2f3-17b2-4cc0-b719-fb6254d3e9df" providerId="ADAL" clId="{35C0B9A2-A60C-57EC-AD9B-630767BE11FE}" dt="2025-10-31T16:34:09.060" v="2904" actId="20577"/>
-          <ac:spMkLst>
-            <pc:docMk/>
-            <pc:sldMk cId="2931534844" sldId="260"/>
-            <ac:spMk id="44" creationId="{0542CBE0-6A2B-8AE6-9005-E57CACB6E20C}"/>
-          </ac:spMkLst>
-        </pc:spChg>
-        <pc:spChg chg="mod">
           <ac:chgData name="Hemma Philamore" userId="db50e2f3-17b2-4cc0-b719-fb6254d3e9df" providerId="ADAL" clId="{35C0B9A2-A60C-57EC-AD9B-630767BE11FE}" dt="2025-10-31T16:34:28.964" v="2916" actId="20577"/>
           <ac:spMkLst>
             <pc:docMk/>
@@ -1729,22 +1496,6 @@
             <ac:spMk id="50" creationId="{39A24F7F-6ECB-599A-25BE-C5A15F5EE060}"/>
           </ac:spMkLst>
         </pc:spChg>
-        <pc:spChg chg="mod">
-          <ac:chgData name="Hemma Philamore" userId="db50e2f3-17b2-4cc0-b719-fb6254d3e9df" providerId="ADAL" clId="{35C0B9A2-A60C-57EC-AD9B-630767BE11FE}" dt="2025-10-31T16:34:37.178" v="2917"/>
-          <ac:spMkLst>
-            <pc:docMk/>
-            <pc:sldMk cId="2931534844" sldId="260"/>
-            <ac:spMk id="53" creationId="{51E5D490-0B23-4F7E-E8F2-555532BEBBC2}"/>
-          </ac:spMkLst>
-        </pc:spChg>
-        <pc:spChg chg="mod">
-          <ac:chgData name="Hemma Philamore" userId="db50e2f3-17b2-4cc0-b719-fb6254d3e9df" providerId="ADAL" clId="{35C0B9A2-A60C-57EC-AD9B-630767BE11FE}" dt="2025-10-31T16:34:37.178" v="2917"/>
-          <ac:spMkLst>
-            <pc:docMk/>
-            <pc:sldMk cId="2931534844" sldId="260"/>
-            <ac:spMk id="56" creationId="{E6DF6EEC-CDA9-CC42-54BA-0CB5644C8533}"/>
-          </ac:spMkLst>
-        </pc:spChg>
         <pc:spChg chg="add mod">
           <ac:chgData name="Hemma Philamore" userId="db50e2f3-17b2-4cc0-b719-fb6254d3e9df" providerId="ADAL" clId="{35C0B9A2-A60C-57EC-AD9B-630767BE11FE}" dt="2025-10-31T16:34:44.187" v="2918" actId="1076"/>
           <ac:spMkLst>
@@ -1817,36 +1568,12 @@
             <ac:grpSpMk id="39" creationId="{CEE31683-68E7-B029-83A5-70D8E586657C}"/>
           </ac:grpSpMkLst>
         </pc:grpChg>
-        <pc:grpChg chg="add del mod">
-          <ac:chgData name="Hemma Philamore" userId="db50e2f3-17b2-4cc0-b719-fb6254d3e9df" providerId="ADAL" clId="{35C0B9A2-A60C-57EC-AD9B-630767BE11FE}" dt="2025-10-31T16:34:10.853" v="2905" actId="478"/>
-          <ac:grpSpMkLst>
-            <pc:docMk/>
-            <pc:sldMk cId="2931534844" sldId="260"/>
-            <ac:grpSpMk id="42" creationId="{D6D4B1F4-C887-8FA5-2226-79284968FC4D}"/>
-          </ac:grpSpMkLst>
-        </pc:grpChg>
         <pc:grpChg chg="add mod">
           <ac:chgData name="Hemma Philamore" userId="db50e2f3-17b2-4cc0-b719-fb6254d3e9df" providerId="ADAL" clId="{35C0B9A2-A60C-57EC-AD9B-630767BE11FE}" dt="2025-10-31T16:34:24.666" v="2909" actId="1076"/>
           <ac:grpSpMkLst>
             <pc:docMk/>
             <pc:sldMk cId="2931534844" sldId="260"/>
             <ac:grpSpMk id="45" creationId="{9C6E0396-E5DA-EBA1-58A2-02E0F77CDF08}"/>
-          </ac:grpSpMkLst>
-        </pc:grpChg>
-        <pc:grpChg chg="add del mod">
-          <ac:chgData name="Hemma Philamore" userId="db50e2f3-17b2-4cc0-b719-fb6254d3e9df" providerId="ADAL" clId="{35C0B9A2-A60C-57EC-AD9B-630767BE11FE}" dt="2025-10-31T16:34:52.204" v="2920" actId="478"/>
-          <ac:grpSpMkLst>
-            <pc:docMk/>
-            <pc:sldMk cId="2931534844" sldId="260"/>
-            <ac:grpSpMk id="51" creationId="{C4FE00F9-5044-D5E4-4651-85C2F1B179D4}"/>
-          </ac:grpSpMkLst>
-        </pc:grpChg>
-        <pc:grpChg chg="add del mod">
-          <ac:chgData name="Hemma Philamore" userId="db50e2f3-17b2-4cc0-b719-fb6254d3e9df" providerId="ADAL" clId="{35C0B9A2-A60C-57EC-AD9B-630767BE11FE}" dt="2025-10-31T16:34:51.170" v="2919" actId="478"/>
-          <ac:grpSpMkLst>
-            <pc:docMk/>
-            <pc:sldMk cId="2931534844" sldId="260"/>
-            <ac:grpSpMk id="54" creationId="{5C5B07FF-6AED-D8DA-E408-A870CDFB37C1}"/>
           </ac:grpSpMkLst>
         </pc:grpChg>
         <pc:grpChg chg="add mod">
@@ -1881,14 +1608,6 @@
             <ac:cxnSpMk id="14" creationId="{2772F313-4F05-4DBE-8F62-2BF348AD132A}"/>
           </ac:cxnSpMkLst>
         </pc:cxnChg>
-        <pc:cxnChg chg="add mod">
-          <ac:chgData name="Hemma Philamore" userId="db50e2f3-17b2-4cc0-b719-fb6254d3e9df" providerId="ADAL" clId="{35C0B9A2-A60C-57EC-AD9B-630767BE11FE}" dt="2025-10-31T16:31:33.171" v="2858" actId="1076"/>
-          <ac:cxnSpMkLst>
-            <pc:docMk/>
-            <pc:sldMk cId="2931534844" sldId="260"/>
-            <ac:cxnSpMk id="16" creationId="{48915A24-A467-9A7C-D376-970BD9B92C3D}"/>
-          </ac:cxnSpMkLst>
-        </pc:cxnChg>
         <pc:cxnChg chg="mod">
           <ac:chgData name="Hemma Philamore" userId="db50e2f3-17b2-4cc0-b719-fb6254d3e9df" providerId="ADAL" clId="{35C0B9A2-A60C-57EC-AD9B-630767BE11FE}" dt="2025-10-31T16:31:49.305" v="2863"/>
           <ac:cxnSpMkLst>
@@ -1922,27 +1641,11 @@
           </ac:cxnSpMkLst>
         </pc:cxnChg>
         <pc:cxnChg chg="mod">
-          <ac:chgData name="Hemma Philamore" userId="db50e2f3-17b2-4cc0-b719-fb6254d3e9df" providerId="ADAL" clId="{35C0B9A2-A60C-57EC-AD9B-630767BE11FE}" dt="2025-10-31T16:33:09.904" v="2882"/>
-          <ac:cxnSpMkLst>
-            <pc:docMk/>
-            <pc:sldMk cId="2931534844" sldId="260"/>
-            <ac:cxnSpMk id="43" creationId="{474DB00C-FB79-A0D5-A4C3-FF090E1FE6F9}"/>
-          </ac:cxnSpMkLst>
-        </pc:cxnChg>
-        <pc:cxnChg chg="mod">
           <ac:chgData name="Hemma Philamore" userId="db50e2f3-17b2-4cc0-b719-fb6254d3e9df" providerId="ADAL" clId="{35C0B9A2-A60C-57EC-AD9B-630767BE11FE}" dt="2025-10-31T16:34:13.863" v="2906"/>
           <ac:cxnSpMkLst>
             <pc:docMk/>
             <pc:sldMk cId="2931534844" sldId="260"/>
             <ac:cxnSpMk id="46" creationId="{759C3B87-D5CD-5663-7440-CCCDADBC2B73}"/>
-          </ac:cxnSpMkLst>
-        </pc:cxnChg>
-        <pc:cxnChg chg="mod">
-          <ac:chgData name="Hemma Philamore" userId="db50e2f3-17b2-4cc0-b719-fb6254d3e9df" providerId="ADAL" clId="{35C0B9A2-A60C-57EC-AD9B-630767BE11FE}" dt="2025-10-31T16:34:37.178" v="2917"/>
-          <ac:cxnSpMkLst>
-            <pc:docMk/>
-            <pc:sldMk cId="2931534844" sldId="260"/>
-            <ac:cxnSpMk id="52" creationId="{F7046108-297B-8E9A-F8CC-BDC4DD47C937}"/>
           </ac:cxnSpMkLst>
         </pc:cxnChg>
         <pc:cxnChg chg="mod">
@@ -1961,13 +1664,6 @@
             <ac:cxnSpMk id="63" creationId="{BDCC56B8-7707-1FC9-6685-86A8178CF175}"/>
           </ac:cxnSpMkLst>
         </pc:cxnChg>
-      </pc:sldChg>
-      <pc:sldChg chg="del">
-        <pc:chgData name="Hemma Philamore" userId="db50e2f3-17b2-4cc0-b719-fb6254d3e9df" providerId="ADAL" clId="{35C0B9A2-A60C-57EC-AD9B-630767BE11FE}" dt="2025-10-31T12:23:12.457" v="2134" actId="2696"/>
-        <pc:sldMkLst>
-          <pc:docMk/>
-          <pc:sldMk cId="1672918485" sldId="261"/>
-        </pc:sldMkLst>
       </pc:sldChg>
       <pc:sldChg chg="addSp delSp modSp new mod">
         <pc:chgData name="Hemma Philamore" userId="db50e2f3-17b2-4cc0-b719-fb6254d3e9df" providerId="ADAL" clId="{35C0B9A2-A60C-57EC-AD9B-630767BE11FE}" dt="2025-10-31T16:57:58.698" v="3158" actId="20577"/>
@@ -2055,14 +1751,6 @@
             <ac:spMk id="15" creationId="{7BB21781-D6FE-A643-9505-8724C2EAC4AE}"/>
           </ac:spMkLst>
         </pc:spChg>
-        <pc:spChg chg="add del mod">
-          <ac:chgData name="Hemma Philamore" userId="db50e2f3-17b2-4cc0-b719-fb6254d3e9df" providerId="ADAL" clId="{35C0B9A2-A60C-57EC-AD9B-630767BE11FE}" dt="2025-10-31T16:54:03.507" v="3076" actId="478"/>
-          <ac:spMkLst>
-            <pc:docMk/>
-            <pc:sldMk cId="3630224590" sldId="261"/>
-            <ac:spMk id="19" creationId="{5A8AB565-3A5F-F044-93D4-0283DEED078D}"/>
-          </ac:spMkLst>
-        </pc:spChg>
         <pc:spChg chg="add mod">
           <ac:chgData name="Hemma Philamore" userId="db50e2f3-17b2-4cc0-b719-fb6254d3e9df" providerId="ADAL" clId="{35C0B9A2-A60C-57EC-AD9B-630767BE11FE}" dt="2025-10-31T16:55:55.042" v="3104" actId="1076"/>
           <ac:spMkLst>
@@ -2116,22 +1804,6 @@
           <ac:spMkLst>
             <pc:docMk/>
             <pc:sldMk cId="3630224590" sldId="261"/>
-            <ac:spMk id="26" creationId="{D98849D2-D84F-336A-DACD-9AD2D69AF5F7}"/>
-          </ac:spMkLst>
-        </pc:spChg>
-        <pc:spChg chg="add mod">
-          <ac:chgData name="Hemma Philamore" userId="db50e2f3-17b2-4cc0-b719-fb6254d3e9df" providerId="ADAL" clId="{35C0B9A2-A60C-57EC-AD9B-630767BE11FE}" dt="2025-10-31T16:55:55.042" v="3104" actId="1076"/>
-          <ac:spMkLst>
-            <pc:docMk/>
-            <pc:sldMk cId="3630224590" sldId="261"/>
-            <ac:spMk id="27" creationId="{F5583A7A-B2A6-4783-A566-BF8760067FEA}"/>
-          </ac:spMkLst>
-        </pc:spChg>
-        <pc:spChg chg="add mod">
-          <ac:chgData name="Hemma Philamore" userId="db50e2f3-17b2-4cc0-b719-fb6254d3e9df" providerId="ADAL" clId="{35C0B9A2-A60C-57EC-AD9B-630767BE11FE}" dt="2025-10-31T16:55:55.042" v="3104" actId="1076"/>
-          <ac:spMkLst>
-            <pc:docMk/>
-            <pc:sldMk cId="3630224590" sldId="261"/>
             <ac:spMk id="30" creationId="{895ED45B-4DE6-B8D0-602C-94FB2FA00194}"/>
           </ac:spMkLst>
         </pc:spChg>
@@ -2311,28 +1983,12 @@
             <ac:cxnSpMk id="18" creationId="{942A755E-1B11-CCC2-C13C-E137B9EF0920}"/>
           </ac:cxnSpMkLst>
         </pc:cxnChg>
-        <pc:cxnChg chg="del">
-          <ac:chgData name="Hemma Philamore" userId="db50e2f3-17b2-4cc0-b719-fb6254d3e9df" providerId="ADAL" clId="{35C0B9A2-A60C-57EC-AD9B-630767BE11FE}" dt="2025-10-31T16:54:14.238" v="3078" actId="478"/>
-          <ac:cxnSpMkLst>
-            <pc:docMk/>
-            <pc:sldMk cId="3630224590" sldId="261"/>
-            <ac:cxnSpMk id="29" creationId="{9170F052-8899-6DA4-E28C-25FE0FB4A2CC}"/>
-          </ac:cxnSpMkLst>
-        </pc:cxnChg>
         <pc:cxnChg chg="add mod">
           <ac:chgData name="Hemma Philamore" userId="db50e2f3-17b2-4cc0-b719-fb6254d3e9df" providerId="ADAL" clId="{35C0B9A2-A60C-57EC-AD9B-630767BE11FE}" dt="2025-10-31T16:55:34.075" v="3102" actId="14100"/>
           <ac:cxnSpMkLst>
             <pc:docMk/>
             <pc:sldMk cId="3630224590" sldId="261"/>
             <ac:cxnSpMk id="39" creationId="{9EFFF1C3-520B-1317-6C2B-B8BC00D277CB}"/>
-          </ac:cxnSpMkLst>
-        </pc:cxnChg>
-        <pc:cxnChg chg="del mod">
-          <ac:chgData name="Hemma Philamore" userId="db50e2f3-17b2-4cc0-b719-fb6254d3e9df" providerId="ADAL" clId="{35C0B9A2-A60C-57EC-AD9B-630767BE11FE}" dt="2025-10-31T16:56:07.184" v="3108" actId="478"/>
-          <ac:cxnSpMkLst>
-            <pc:docMk/>
-            <pc:sldMk cId="3630224590" sldId="261"/>
-            <ac:cxnSpMk id="58" creationId="{0535C9FA-3572-48D9-BC3D-408D3CE5A421}"/>
           </ac:cxnSpMkLst>
         </pc:cxnChg>
         <pc:cxnChg chg="add mod">
@@ -2351,251 +2007,6 @@
             <ac:cxnSpMk id="60" creationId="{65DCE0D6-2BCB-F362-6FAA-9B565380A44E}"/>
           </ac:cxnSpMkLst>
         </pc:cxnChg>
-      </pc:sldChg>
-      <pc:sldChg chg="del">
-        <pc:chgData name="Hemma Philamore" userId="db50e2f3-17b2-4cc0-b719-fb6254d3e9df" providerId="ADAL" clId="{35C0B9A2-A60C-57EC-AD9B-630767BE11FE}" dt="2025-10-31T12:23:12.457" v="2134" actId="2696"/>
-        <pc:sldMkLst>
-          <pc:docMk/>
-          <pc:sldMk cId="2580241657" sldId="262"/>
-        </pc:sldMkLst>
-      </pc:sldChg>
-      <pc:sldChg chg="del">
-        <pc:chgData name="Hemma Philamore" userId="db50e2f3-17b2-4cc0-b719-fb6254d3e9df" providerId="ADAL" clId="{35C0B9A2-A60C-57EC-AD9B-630767BE11FE}" dt="2025-10-31T12:23:12.457" v="2134" actId="2696"/>
-        <pc:sldMkLst>
-          <pc:docMk/>
-          <pc:sldMk cId="2547702290" sldId="263"/>
-        </pc:sldMkLst>
-      </pc:sldChg>
-      <pc:sldChg chg="del">
-        <pc:chgData name="Hemma Philamore" userId="db50e2f3-17b2-4cc0-b719-fb6254d3e9df" providerId="ADAL" clId="{35C0B9A2-A60C-57EC-AD9B-630767BE11FE}" dt="2025-10-31T12:23:12.457" v="2134" actId="2696"/>
-        <pc:sldMkLst>
-          <pc:docMk/>
-          <pc:sldMk cId="2832435519" sldId="265"/>
-        </pc:sldMkLst>
-      </pc:sldChg>
-      <pc:sldChg chg="del">
-        <pc:chgData name="Hemma Philamore" userId="db50e2f3-17b2-4cc0-b719-fb6254d3e9df" providerId="ADAL" clId="{35C0B9A2-A60C-57EC-AD9B-630767BE11FE}" dt="2025-10-31T12:23:12.457" v="2134" actId="2696"/>
-        <pc:sldMkLst>
-          <pc:docMk/>
-          <pc:sldMk cId="2927885972" sldId="267"/>
-        </pc:sldMkLst>
-      </pc:sldChg>
-      <pc:sldChg chg="del">
-        <pc:chgData name="Hemma Philamore" userId="db50e2f3-17b2-4cc0-b719-fb6254d3e9df" providerId="ADAL" clId="{35C0B9A2-A60C-57EC-AD9B-630767BE11FE}" dt="2025-10-31T12:23:12.457" v="2134" actId="2696"/>
-        <pc:sldMkLst>
-          <pc:docMk/>
-          <pc:sldMk cId="2527479403" sldId="268"/>
-        </pc:sldMkLst>
-      </pc:sldChg>
-      <pc:sldChg chg="del">
-        <pc:chgData name="Hemma Philamore" userId="db50e2f3-17b2-4cc0-b719-fb6254d3e9df" providerId="ADAL" clId="{35C0B9A2-A60C-57EC-AD9B-630767BE11FE}" dt="2025-10-31T12:23:12.457" v="2134" actId="2696"/>
-        <pc:sldMkLst>
-          <pc:docMk/>
-          <pc:sldMk cId="2278053495" sldId="269"/>
-        </pc:sldMkLst>
-      </pc:sldChg>
-      <pc:sldChg chg="del">
-        <pc:chgData name="Hemma Philamore" userId="db50e2f3-17b2-4cc0-b719-fb6254d3e9df" providerId="ADAL" clId="{35C0B9A2-A60C-57EC-AD9B-630767BE11FE}" dt="2025-10-31T12:23:12.457" v="2134" actId="2696"/>
-        <pc:sldMkLst>
-          <pc:docMk/>
-          <pc:sldMk cId="2621570483" sldId="270"/>
-        </pc:sldMkLst>
-      </pc:sldChg>
-      <pc:sldChg chg="del">
-        <pc:chgData name="Hemma Philamore" userId="db50e2f3-17b2-4cc0-b719-fb6254d3e9df" providerId="ADAL" clId="{35C0B9A2-A60C-57EC-AD9B-630767BE11FE}" dt="2025-10-31T12:23:12.457" v="2134" actId="2696"/>
-        <pc:sldMkLst>
-          <pc:docMk/>
-          <pc:sldMk cId="1781179640" sldId="271"/>
-        </pc:sldMkLst>
-      </pc:sldChg>
-      <pc:sldChg chg="del">
-        <pc:chgData name="Hemma Philamore" userId="db50e2f3-17b2-4cc0-b719-fb6254d3e9df" providerId="ADAL" clId="{35C0B9A2-A60C-57EC-AD9B-630767BE11FE}" dt="2025-10-31T12:23:12.457" v="2134" actId="2696"/>
-        <pc:sldMkLst>
-          <pc:docMk/>
-          <pc:sldMk cId="878202596" sldId="272"/>
-        </pc:sldMkLst>
-      </pc:sldChg>
-      <pc:sldChg chg="del">
-        <pc:chgData name="Hemma Philamore" userId="db50e2f3-17b2-4cc0-b719-fb6254d3e9df" providerId="ADAL" clId="{35C0B9A2-A60C-57EC-AD9B-630767BE11FE}" dt="2025-10-31T12:23:12.457" v="2134" actId="2696"/>
-        <pc:sldMkLst>
-          <pc:docMk/>
-          <pc:sldMk cId="3112048377" sldId="274"/>
-        </pc:sldMkLst>
-      </pc:sldChg>
-      <pc:sldChg chg="del">
-        <pc:chgData name="Hemma Philamore" userId="db50e2f3-17b2-4cc0-b719-fb6254d3e9df" providerId="ADAL" clId="{35C0B9A2-A60C-57EC-AD9B-630767BE11FE}" dt="2025-10-31T12:23:12.457" v="2134" actId="2696"/>
-        <pc:sldMkLst>
-          <pc:docMk/>
-          <pc:sldMk cId="3895602738" sldId="275"/>
-        </pc:sldMkLst>
-      </pc:sldChg>
-      <pc:sldChg chg="del">
-        <pc:chgData name="Hemma Philamore" userId="db50e2f3-17b2-4cc0-b719-fb6254d3e9df" providerId="ADAL" clId="{35C0B9A2-A60C-57EC-AD9B-630767BE11FE}" dt="2025-10-31T12:23:12.457" v="2134" actId="2696"/>
-        <pc:sldMkLst>
-          <pc:docMk/>
-          <pc:sldMk cId="1006599899" sldId="276"/>
-        </pc:sldMkLst>
-      </pc:sldChg>
-      <pc:sldChg chg="del">
-        <pc:chgData name="Hemma Philamore" userId="db50e2f3-17b2-4cc0-b719-fb6254d3e9df" providerId="ADAL" clId="{35C0B9A2-A60C-57EC-AD9B-630767BE11FE}" dt="2025-10-31T12:23:12.457" v="2134" actId="2696"/>
-        <pc:sldMkLst>
-          <pc:docMk/>
-          <pc:sldMk cId="2583233967" sldId="277"/>
-        </pc:sldMkLst>
-      </pc:sldChg>
-      <pc:sldChg chg="del">
-        <pc:chgData name="Hemma Philamore" userId="db50e2f3-17b2-4cc0-b719-fb6254d3e9df" providerId="ADAL" clId="{35C0B9A2-A60C-57EC-AD9B-630767BE11FE}" dt="2025-10-31T12:23:12.457" v="2134" actId="2696"/>
-        <pc:sldMkLst>
-          <pc:docMk/>
-          <pc:sldMk cId="1581026259" sldId="278"/>
-        </pc:sldMkLst>
-      </pc:sldChg>
-      <pc:sldChg chg="del">
-        <pc:chgData name="Hemma Philamore" userId="db50e2f3-17b2-4cc0-b719-fb6254d3e9df" providerId="ADAL" clId="{35C0B9A2-A60C-57EC-AD9B-630767BE11FE}" dt="2025-10-31T12:23:12.457" v="2134" actId="2696"/>
-        <pc:sldMkLst>
-          <pc:docMk/>
-          <pc:sldMk cId="3864897966" sldId="280"/>
-        </pc:sldMkLst>
-      </pc:sldChg>
-      <pc:sldChg chg="del">
-        <pc:chgData name="Hemma Philamore" userId="db50e2f3-17b2-4cc0-b719-fb6254d3e9df" providerId="ADAL" clId="{35C0B9A2-A60C-57EC-AD9B-630767BE11FE}" dt="2025-10-31T12:23:12.457" v="2134" actId="2696"/>
-        <pc:sldMkLst>
-          <pc:docMk/>
-          <pc:sldMk cId="341663083" sldId="281"/>
-        </pc:sldMkLst>
-      </pc:sldChg>
-      <pc:sldChg chg="del">
-        <pc:chgData name="Hemma Philamore" userId="db50e2f3-17b2-4cc0-b719-fb6254d3e9df" providerId="ADAL" clId="{35C0B9A2-A60C-57EC-AD9B-630767BE11FE}" dt="2025-10-31T12:23:12.457" v="2134" actId="2696"/>
-        <pc:sldMkLst>
-          <pc:docMk/>
-          <pc:sldMk cId="1089495760" sldId="282"/>
-        </pc:sldMkLst>
-      </pc:sldChg>
-      <pc:sldChg chg="del">
-        <pc:chgData name="Hemma Philamore" userId="db50e2f3-17b2-4cc0-b719-fb6254d3e9df" providerId="ADAL" clId="{35C0B9A2-A60C-57EC-AD9B-630767BE11FE}" dt="2025-10-31T12:23:12.457" v="2134" actId="2696"/>
-        <pc:sldMkLst>
-          <pc:docMk/>
-          <pc:sldMk cId="3438819171" sldId="283"/>
-        </pc:sldMkLst>
-      </pc:sldChg>
-      <pc:sldChg chg="del">
-        <pc:chgData name="Hemma Philamore" userId="db50e2f3-17b2-4cc0-b719-fb6254d3e9df" providerId="ADAL" clId="{35C0B9A2-A60C-57EC-AD9B-630767BE11FE}" dt="2025-10-31T12:23:12.457" v="2134" actId="2696"/>
-        <pc:sldMkLst>
-          <pc:docMk/>
-          <pc:sldMk cId="3549710539" sldId="284"/>
-        </pc:sldMkLst>
-      </pc:sldChg>
-      <pc:sldChg chg="del">
-        <pc:chgData name="Hemma Philamore" userId="db50e2f3-17b2-4cc0-b719-fb6254d3e9df" providerId="ADAL" clId="{35C0B9A2-A60C-57EC-AD9B-630767BE11FE}" dt="2025-10-31T12:23:12.457" v="2134" actId="2696"/>
-        <pc:sldMkLst>
-          <pc:docMk/>
-          <pc:sldMk cId="3400175826" sldId="285"/>
-        </pc:sldMkLst>
-      </pc:sldChg>
-      <pc:sldChg chg="del">
-        <pc:chgData name="Hemma Philamore" userId="db50e2f3-17b2-4cc0-b719-fb6254d3e9df" providerId="ADAL" clId="{35C0B9A2-A60C-57EC-AD9B-630767BE11FE}" dt="2025-10-31T12:23:12.457" v="2134" actId="2696"/>
-        <pc:sldMkLst>
-          <pc:docMk/>
-          <pc:sldMk cId="1965968288" sldId="286"/>
-        </pc:sldMkLst>
-      </pc:sldChg>
-      <pc:sldChg chg="del">
-        <pc:chgData name="Hemma Philamore" userId="db50e2f3-17b2-4cc0-b719-fb6254d3e9df" providerId="ADAL" clId="{35C0B9A2-A60C-57EC-AD9B-630767BE11FE}" dt="2025-10-31T12:23:12.457" v="2134" actId="2696"/>
-        <pc:sldMkLst>
-          <pc:docMk/>
-          <pc:sldMk cId="4188381686" sldId="287"/>
-        </pc:sldMkLst>
-      </pc:sldChg>
-      <pc:sldChg chg="del">
-        <pc:chgData name="Hemma Philamore" userId="db50e2f3-17b2-4cc0-b719-fb6254d3e9df" providerId="ADAL" clId="{35C0B9A2-A60C-57EC-AD9B-630767BE11FE}" dt="2025-10-31T12:23:12.457" v="2134" actId="2696"/>
-        <pc:sldMkLst>
-          <pc:docMk/>
-          <pc:sldMk cId="2820390002" sldId="292"/>
-        </pc:sldMkLst>
-      </pc:sldChg>
-      <pc:sldChg chg="del">
-        <pc:chgData name="Hemma Philamore" userId="db50e2f3-17b2-4cc0-b719-fb6254d3e9df" providerId="ADAL" clId="{35C0B9A2-A60C-57EC-AD9B-630767BE11FE}" dt="2025-10-31T12:23:12.457" v="2134" actId="2696"/>
-        <pc:sldMkLst>
-          <pc:docMk/>
-          <pc:sldMk cId="1020734577" sldId="293"/>
-        </pc:sldMkLst>
-      </pc:sldChg>
-      <pc:sldChg chg="del">
-        <pc:chgData name="Hemma Philamore" userId="db50e2f3-17b2-4cc0-b719-fb6254d3e9df" providerId="ADAL" clId="{35C0B9A2-A60C-57EC-AD9B-630767BE11FE}" dt="2025-10-31T12:23:12.457" v="2134" actId="2696"/>
-        <pc:sldMkLst>
-          <pc:docMk/>
-          <pc:sldMk cId="2514507470" sldId="294"/>
-        </pc:sldMkLst>
-      </pc:sldChg>
-      <pc:sldChg chg="del">
-        <pc:chgData name="Hemma Philamore" userId="db50e2f3-17b2-4cc0-b719-fb6254d3e9df" providerId="ADAL" clId="{35C0B9A2-A60C-57EC-AD9B-630767BE11FE}" dt="2025-10-31T12:23:12.457" v="2134" actId="2696"/>
-        <pc:sldMkLst>
-          <pc:docMk/>
-          <pc:sldMk cId="1185023457" sldId="295"/>
-        </pc:sldMkLst>
-      </pc:sldChg>
-      <pc:sldChg chg="del">
-        <pc:chgData name="Hemma Philamore" userId="db50e2f3-17b2-4cc0-b719-fb6254d3e9df" providerId="ADAL" clId="{35C0B9A2-A60C-57EC-AD9B-630767BE11FE}" dt="2025-10-31T12:23:12.457" v="2134" actId="2696"/>
-        <pc:sldMkLst>
-          <pc:docMk/>
-          <pc:sldMk cId="2734499210" sldId="296"/>
-        </pc:sldMkLst>
-      </pc:sldChg>
-      <pc:sldChg chg="del">
-        <pc:chgData name="Hemma Philamore" userId="db50e2f3-17b2-4cc0-b719-fb6254d3e9df" providerId="ADAL" clId="{35C0B9A2-A60C-57EC-AD9B-630767BE11FE}" dt="2025-10-31T12:23:12.457" v="2134" actId="2696"/>
-        <pc:sldMkLst>
-          <pc:docMk/>
-          <pc:sldMk cId="3809527063" sldId="297"/>
-        </pc:sldMkLst>
-      </pc:sldChg>
-      <pc:sldChg chg="del">
-        <pc:chgData name="Hemma Philamore" userId="db50e2f3-17b2-4cc0-b719-fb6254d3e9df" providerId="ADAL" clId="{35C0B9A2-A60C-57EC-AD9B-630767BE11FE}" dt="2025-10-31T12:23:12.457" v="2134" actId="2696"/>
-        <pc:sldMkLst>
-          <pc:docMk/>
-          <pc:sldMk cId="704847650" sldId="298"/>
-        </pc:sldMkLst>
-      </pc:sldChg>
-      <pc:sldChg chg="del">
-        <pc:chgData name="Hemma Philamore" userId="db50e2f3-17b2-4cc0-b719-fb6254d3e9df" providerId="ADAL" clId="{35C0B9A2-A60C-57EC-AD9B-630767BE11FE}" dt="2025-10-31T12:23:12.457" v="2134" actId="2696"/>
-        <pc:sldMkLst>
-          <pc:docMk/>
-          <pc:sldMk cId="843374860" sldId="299"/>
-        </pc:sldMkLst>
-      </pc:sldChg>
-      <pc:sldChg chg="del">
-        <pc:chgData name="Hemma Philamore" userId="db50e2f3-17b2-4cc0-b719-fb6254d3e9df" providerId="ADAL" clId="{35C0B9A2-A60C-57EC-AD9B-630767BE11FE}" dt="2025-10-31T12:23:12.457" v="2134" actId="2696"/>
-        <pc:sldMkLst>
-          <pc:docMk/>
-          <pc:sldMk cId="3926886840" sldId="300"/>
-        </pc:sldMkLst>
-      </pc:sldChg>
-      <pc:sldChg chg="del">
-        <pc:chgData name="Hemma Philamore" userId="db50e2f3-17b2-4cc0-b719-fb6254d3e9df" providerId="ADAL" clId="{35C0B9A2-A60C-57EC-AD9B-630767BE11FE}" dt="2025-10-31T12:23:12.457" v="2134" actId="2696"/>
-        <pc:sldMkLst>
-          <pc:docMk/>
-          <pc:sldMk cId="3765792024" sldId="301"/>
-        </pc:sldMkLst>
-      </pc:sldChg>
-      <pc:sldChg chg="del">
-        <pc:chgData name="Hemma Philamore" userId="db50e2f3-17b2-4cc0-b719-fb6254d3e9df" providerId="ADAL" clId="{35C0B9A2-A60C-57EC-AD9B-630767BE11FE}" dt="2025-10-31T12:23:12.457" v="2134" actId="2696"/>
-        <pc:sldMkLst>
-          <pc:docMk/>
-          <pc:sldMk cId="3329769779" sldId="302"/>
-        </pc:sldMkLst>
-      </pc:sldChg>
-      <pc:sldChg chg="del">
-        <pc:chgData name="Hemma Philamore" userId="db50e2f3-17b2-4cc0-b719-fb6254d3e9df" providerId="ADAL" clId="{35C0B9A2-A60C-57EC-AD9B-630767BE11FE}" dt="2025-10-31T12:23:12.457" v="2134" actId="2696"/>
-        <pc:sldMkLst>
-          <pc:docMk/>
-          <pc:sldMk cId="337175999" sldId="303"/>
-        </pc:sldMkLst>
-      </pc:sldChg>
-      <pc:sldChg chg="del">
-        <pc:chgData name="Hemma Philamore" userId="db50e2f3-17b2-4cc0-b719-fb6254d3e9df" providerId="ADAL" clId="{35C0B9A2-A60C-57EC-AD9B-630767BE11FE}" dt="2025-10-31T12:23:12.457" v="2134" actId="2696"/>
-        <pc:sldMkLst>
-          <pc:docMk/>
-          <pc:sldMk cId="3497437243" sldId="304"/>
-        </pc:sldMkLst>
       </pc:sldChg>
     </pc:docChg>
   </pc:docChgLst>
@@ -2684,7 +2095,7 @@
           <a:p>
             <a:fld id="{822FFC1C-5262-4543-9BBE-0C5AA43086FB}" type="datetimeFigureOut">
               <a:rPr lang="en-US" smtClean="0"/>
-              <a:t>10/31/25</a:t>
+              <a:t>11/5/25</a:t>
             </a:fld>
             <a:endParaRPr lang="en-US"/>
           </a:p>
@@ -3188,7 +2599,7 @@
           <a:p>
             <a:fld id="{12CB69F8-D140-384A-AC86-0BBD87A381F0}" type="datetimeFigureOut">
               <a:rPr lang="en-US" smtClean="0"/>
-              <a:t>10/31/25</a:t>
+              <a:t>11/5/25</a:t>
             </a:fld>
             <a:endParaRPr lang="en-US"/>
           </a:p>
@@ -3388,7 +2799,7 @@
           <a:p>
             <a:fld id="{12CB69F8-D140-384A-AC86-0BBD87A381F0}" type="datetimeFigureOut">
               <a:rPr lang="en-US" smtClean="0"/>
-              <a:t>10/31/25</a:t>
+              <a:t>11/5/25</a:t>
             </a:fld>
             <a:endParaRPr lang="en-US"/>
           </a:p>
@@ -3598,7 +3009,7 @@
           <a:p>
             <a:fld id="{12CB69F8-D140-384A-AC86-0BBD87A381F0}" type="datetimeFigureOut">
               <a:rPr lang="en-US" smtClean="0"/>
-              <a:t>10/31/25</a:t>
+              <a:t>11/5/25</a:t>
             </a:fld>
             <a:endParaRPr lang="en-US"/>
           </a:p>
@@ -3798,7 +3209,7 @@
           <a:p>
             <a:fld id="{12CB69F8-D140-384A-AC86-0BBD87A381F0}" type="datetimeFigureOut">
               <a:rPr lang="en-US" smtClean="0"/>
-              <a:t>10/31/25</a:t>
+              <a:t>11/5/25</a:t>
             </a:fld>
             <a:endParaRPr lang="en-US"/>
           </a:p>
@@ -4074,7 +3485,7 @@
           <a:p>
             <a:fld id="{12CB69F8-D140-384A-AC86-0BBD87A381F0}" type="datetimeFigureOut">
               <a:rPr lang="en-US" smtClean="0"/>
-              <a:t>10/31/25</a:t>
+              <a:t>11/5/25</a:t>
             </a:fld>
             <a:endParaRPr lang="en-US"/>
           </a:p>
@@ -4342,7 +3753,7 @@
           <a:p>
             <a:fld id="{12CB69F8-D140-384A-AC86-0BBD87A381F0}" type="datetimeFigureOut">
               <a:rPr lang="en-US" smtClean="0"/>
-              <a:t>10/31/25</a:t>
+              <a:t>11/5/25</a:t>
             </a:fld>
             <a:endParaRPr lang="en-US"/>
           </a:p>
@@ -4757,7 +4168,7 @@
           <a:p>
             <a:fld id="{12CB69F8-D140-384A-AC86-0BBD87A381F0}" type="datetimeFigureOut">
               <a:rPr lang="en-US" smtClean="0"/>
-              <a:t>10/31/25</a:t>
+              <a:t>11/5/25</a:t>
             </a:fld>
             <a:endParaRPr lang="en-US"/>
           </a:p>
@@ -4899,7 +4310,7 @@
           <a:p>
             <a:fld id="{12CB69F8-D140-384A-AC86-0BBD87A381F0}" type="datetimeFigureOut">
               <a:rPr lang="en-US" smtClean="0"/>
-              <a:t>10/31/25</a:t>
+              <a:t>11/5/25</a:t>
             </a:fld>
             <a:endParaRPr lang="en-US"/>
           </a:p>
@@ -5012,7 +4423,7 @@
           <a:p>
             <a:fld id="{12CB69F8-D140-384A-AC86-0BBD87A381F0}" type="datetimeFigureOut">
               <a:rPr lang="en-US" smtClean="0"/>
-              <a:t>10/31/25</a:t>
+              <a:t>11/5/25</a:t>
             </a:fld>
             <a:endParaRPr lang="en-US"/>
           </a:p>
@@ -5325,7 +4736,7 @@
           <a:p>
             <a:fld id="{12CB69F8-D140-384A-AC86-0BBD87A381F0}" type="datetimeFigureOut">
               <a:rPr lang="en-US" smtClean="0"/>
-              <a:t>10/31/25</a:t>
+              <a:t>11/5/25</a:t>
             </a:fld>
             <a:endParaRPr lang="en-US"/>
           </a:p>
@@ -5614,7 +5025,7 @@
           <a:p>
             <a:fld id="{12CB69F8-D140-384A-AC86-0BBD87A381F0}" type="datetimeFigureOut">
               <a:rPr lang="en-US" smtClean="0"/>
-              <a:t>10/31/25</a:t>
+              <a:t>11/5/25</a:t>
             </a:fld>
             <a:endParaRPr lang="en-US"/>
           </a:p>
@@ -5857,7 +5268,7 @@
           <a:p>
             <a:fld id="{12CB69F8-D140-384A-AC86-0BBD87A381F0}" type="datetimeFigureOut">
               <a:rPr lang="en-US" smtClean="0"/>
-              <a:t>10/31/25</a:t>
+              <a:t>11/5/25</a:t>
             </a:fld>
             <a:endParaRPr lang="en-US"/>
           </a:p>
@@ -7064,10 +6475,10 @@
       </p:sp>
       <p:grpSp>
         <p:nvGrpSpPr>
-          <p:cNvPr id="3" name="Group 2">
+          <p:cNvPr id="4" name="Group 3">
             <a:extLst>
               <a:ext uri="{FF2B5EF4-FFF2-40B4-BE49-F238E27FC236}">
-                <a16:creationId xmlns:a16="http://schemas.microsoft.com/office/drawing/2014/main" id="{ECAFB0DE-FA84-14F9-561E-1AC98D47B910}"/>
+                <a16:creationId xmlns:a16="http://schemas.microsoft.com/office/drawing/2014/main" id="{31FB8B8B-46BC-2907-0294-20CEBB985C83}"/>
               </a:ext>
             </a:extLst>
           </p:cNvPr>
@@ -7077,198 +6488,339 @@
         <p:grpSpPr>
           <a:xfrm>
             <a:off x="1148316" y="1546168"/>
-            <a:ext cx="3600000" cy="3600000"/>
+            <a:ext cx="10319023" cy="3729491"/>
             <a:chOff x="1148316" y="1546168"/>
-            <a:chExt cx="3600000" cy="3600000"/>
+            <a:chExt cx="10319023" cy="3729491"/>
           </a:xfrm>
         </p:grpSpPr>
-        <p:sp>
-          <p:nvSpPr>
-            <p:cNvPr id="6" name="Rounded Rectangle 5">
+        <p:grpSp>
+          <p:nvGrpSpPr>
+            <p:cNvPr id="3" name="Group 2">
               <a:extLst>
                 <a:ext uri="{FF2B5EF4-FFF2-40B4-BE49-F238E27FC236}">
-                  <a16:creationId xmlns:a16="http://schemas.microsoft.com/office/drawing/2014/main" id="{E4083C7B-F5C8-3203-8283-F35B955156B2}"/>
+                  <a16:creationId xmlns:a16="http://schemas.microsoft.com/office/drawing/2014/main" id="{ECAFB0DE-FA84-14F9-561E-1AC98D47B910}"/>
                 </a:ext>
               </a:extLst>
             </p:cNvPr>
-            <p:cNvSpPr/>
+            <p:cNvGrpSpPr/>
             <p:nvPr/>
-          </p:nvSpPr>
-          <p:spPr>
+          </p:nvGrpSpPr>
+          <p:grpSpPr>
             <a:xfrm>
               <a:off x="1148316" y="1546168"/>
               <a:ext cx="3600000" cy="3600000"/>
+              <a:chOff x="1148316" y="1546168"/>
+              <a:chExt cx="3600000" cy="3600000"/>
             </a:xfrm>
-            <a:prstGeom prst="roundRect">
-              <a:avLst/>
-            </a:prstGeom>
-            <a:solidFill>
-              <a:schemeClr val="accent5">
-                <a:lumMod val="20000"/>
-                <a:lumOff val="80000"/>
-              </a:schemeClr>
-            </a:solidFill>
-            <a:ln w="57150">
+          </p:grpSpPr>
+          <p:sp>
+            <p:nvSpPr>
+              <p:cNvPr id="6" name="Rounded Rectangle 5">
+                <a:extLst>
+                  <a:ext uri="{FF2B5EF4-FFF2-40B4-BE49-F238E27FC236}">
+                    <a16:creationId xmlns:a16="http://schemas.microsoft.com/office/drawing/2014/main" id="{E4083C7B-F5C8-3203-8283-F35B955156B2}"/>
+                  </a:ext>
+                </a:extLst>
+              </p:cNvPr>
+              <p:cNvSpPr/>
+              <p:nvPr/>
+            </p:nvSpPr>
+            <p:spPr>
+              <a:xfrm>
+                <a:off x="1148316" y="1546168"/>
+                <a:ext cx="3600000" cy="3600000"/>
+              </a:xfrm>
+              <a:prstGeom prst="roundRect">
+                <a:avLst/>
+              </a:prstGeom>
               <a:solidFill>
                 <a:schemeClr val="accent5">
-                  <a:lumMod val="60000"/>
-                  <a:lumOff val="40000"/>
+                  <a:lumMod val="20000"/>
+                  <a:lumOff val="80000"/>
                 </a:schemeClr>
               </a:solidFill>
-            </a:ln>
-          </p:spPr>
-          <p:style>
-            <a:lnRef idx="2">
-              <a:schemeClr val="accent1">
-                <a:shade val="15000"/>
-              </a:schemeClr>
-            </a:lnRef>
-            <a:fillRef idx="1">
-              <a:schemeClr val="accent1"/>
-            </a:fillRef>
-            <a:effectRef idx="0">
-              <a:schemeClr val="accent1"/>
-            </a:effectRef>
-            <a:fontRef idx="minor">
-              <a:schemeClr val="lt1"/>
-            </a:fontRef>
-          </p:style>
-          <p:txBody>
-            <a:bodyPr rtlCol="0" anchor="ctr"/>
-            <a:lstStyle/>
-            <a:p>
-              <a:pPr algn="ctr"/>
-              <a:endParaRPr lang="en-US"/>
-            </a:p>
-          </p:txBody>
-        </p:sp>
+              <a:ln w="57150">
+                <a:solidFill>
+                  <a:schemeClr val="accent5">
+                    <a:lumMod val="60000"/>
+                    <a:lumOff val="40000"/>
+                  </a:schemeClr>
+                </a:solidFill>
+              </a:ln>
+            </p:spPr>
+            <p:style>
+              <a:lnRef idx="2">
+                <a:schemeClr val="accent1">
+                  <a:shade val="15000"/>
+                </a:schemeClr>
+              </a:lnRef>
+              <a:fillRef idx="1">
+                <a:schemeClr val="accent1"/>
+              </a:fillRef>
+              <a:effectRef idx="0">
+                <a:schemeClr val="accent1"/>
+              </a:effectRef>
+              <a:fontRef idx="minor">
+                <a:schemeClr val="lt1"/>
+              </a:fontRef>
+            </p:style>
+            <p:txBody>
+              <a:bodyPr rtlCol="0" anchor="ctr"/>
+              <a:lstStyle/>
+              <a:p>
+                <a:pPr algn="ctr"/>
+                <a:endParaRPr lang="en-US"/>
+              </a:p>
+            </p:txBody>
+          </p:sp>
+          <p:sp>
+            <p:nvSpPr>
+              <p:cNvPr id="7" name="Rounded Rectangle 6">
+                <a:extLst>
+                  <a:ext uri="{FF2B5EF4-FFF2-40B4-BE49-F238E27FC236}">
+                    <a16:creationId xmlns:a16="http://schemas.microsoft.com/office/drawing/2014/main" id="{D49EE039-E017-5213-4A1A-5351580CB051}"/>
+                  </a:ext>
+                </a:extLst>
+              </p:cNvPr>
+              <p:cNvSpPr/>
+              <p:nvPr/>
+            </p:nvSpPr>
+            <p:spPr>
+              <a:xfrm>
+                <a:off x="1375144" y="1753502"/>
+                <a:ext cx="2520000" cy="2520000"/>
+              </a:xfrm>
+              <a:prstGeom prst="roundRect">
+                <a:avLst/>
+              </a:prstGeom>
+              <a:solidFill>
+                <a:schemeClr val="accent6">
+                  <a:lumMod val="20000"/>
+                  <a:lumOff val="80000"/>
+                </a:schemeClr>
+              </a:solidFill>
+              <a:ln w="57150">
+                <a:solidFill>
+                  <a:srgbClr val="00B050"/>
+                </a:solidFill>
+              </a:ln>
+            </p:spPr>
+            <p:style>
+              <a:lnRef idx="2">
+                <a:schemeClr val="accent1">
+                  <a:shade val="15000"/>
+                </a:schemeClr>
+              </a:lnRef>
+              <a:fillRef idx="1">
+                <a:schemeClr val="accent1"/>
+              </a:fillRef>
+              <a:effectRef idx="0">
+                <a:schemeClr val="accent1"/>
+              </a:effectRef>
+              <a:fontRef idx="minor">
+                <a:schemeClr val="lt1"/>
+              </a:fontRef>
+            </p:style>
+            <p:txBody>
+              <a:bodyPr rtlCol="0" anchor="ctr"/>
+              <a:lstStyle/>
+              <a:p>
+                <a:pPr algn="ctr"/>
+                <a:endParaRPr lang="en-US"/>
+              </a:p>
+            </p:txBody>
+          </p:sp>
+          <p:sp>
+            <p:nvSpPr>
+              <p:cNvPr id="8" name="Rounded Rectangle 7">
+                <a:extLst>
+                  <a:ext uri="{FF2B5EF4-FFF2-40B4-BE49-F238E27FC236}">
+                    <a16:creationId xmlns:a16="http://schemas.microsoft.com/office/drawing/2014/main" id="{8742CBA3-0C44-97AD-95CB-878B02460A73}"/>
+                  </a:ext>
+                </a:extLst>
+              </p:cNvPr>
+              <p:cNvSpPr/>
+              <p:nvPr/>
+            </p:nvSpPr>
+            <p:spPr>
+              <a:xfrm>
+                <a:off x="1601972" y="2008683"/>
+                <a:ext cx="1440000" cy="1440000"/>
+              </a:xfrm>
+              <a:prstGeom prst="roundRect">
+                <a:avLst/>
+              </a:prstGeom>
+              <a:solidFill>
+                <a:schemeClr val="tx2">
+                  <a:lumMod val="10000"/>
+                  <a:lumOff val="90000"/>
+                </a:schemeClr>
+              </a:solidFill>
+              <a:ln w="57150">
+                <a:solidFill>
+                  <a:schemeClr val="tx2">
+                    <a:lumMod val="50000"/>
+                    <a:lumOff val="50000"/>
+                  </a:schemeClr>
+                </a:solidFill>
+              </a:ln>
+            </p:spPr>
+            <p:style>
+              <a:lnRef idx="2">
+                <a:schemeClr val="accent1">
+                  <a:shade val="15000"/>
+                </a:schemeClr>
+              </a:lnRef>
+              <a:fillRef idx="1">
+                <a:schemeClr val="accent1"/>
+              </a:fillRef>
+              <a:effectRef idx="0">
+                <a:schemeClr val="accent1"/>
+              </a:effectRef>
+              <a:fontRef idx="minor">
+                <a:schemeClr val="lt1"/>
+              </a:fontRef>
+            </p:style>
+            <p:txBody>
+              <a:bodyPr rtlCol="0" anchor="ctr"/>
+              <a:lstStyle/>
+              <a:p>
+                <a:pPr algn="ctr"/>
+                <a:endParaRPr lang="en-US">
+                  <a:solidFill>
+                    <a:srgbClr val="0070C0"/>
+                  </a:solidFill>
+                </a:endParaRPr>
+              </a:p>
+            </p:txBody>
+          </p:sp>
+          <p:sp>
+            <p:nvSpPr>
+              <p:cNvPr id="9" name="TextBox 8">
+                <a:extLst>
+                  <a:ext uri="{FF2B5EF4-FFF2-40B4-BE49-F238E27FC236}">
+                    <a16:creationId xmlns:a16="http://schemas.microsoft.com/office/drawing/2014/main" id="{8C44DAAA-FDD2-46A7-24DD-A60918539CA8}"/>
+                  </a:ext>
+                </a:extLst>
+              </p:cNvPr>
+              <p:cNvSpPr txBox="1"/>
+              <p:nvPr/>
+            </p:nvSpPr>
+            <p:spPr>
+              <a:xfrm>
+                <a:off x="2470339" y="2598003"/>
+                <a:ext cx="329610" cy="830997"/>
+              </a:xfrm>
+              <a:prstGeom prst="rect">
+                <a:avLst/>
+              </a:prstGeom>
+              <a:noFill/>
+            </p:spPr>
+            <p:txBody>
+              <a:bodyPr wrap="square" rtlCol="0">
+                <a:spAutoFit/>
+              </a:bodyPr>
+              <a:lstStyle/>
+              <a:p>
+                <a:r>
+                  <a:rPr lang="en-US" sz="4800" b="1" dirty="0">
+                    <a:solidFill>
+                      <a:srgbClr val="0070C0"/>
+                    </a:solidFill>
+                  </a:rPr>
+                  <a:t>L</a:t>
+                </a:r>
+              </a:p>
+            </p:txBody>
+          </p:sp>
+          <p:sp>
+            <p:nvSpPr>
+              <p:cNvPr id="10" name="TextBox 9">
+                <a:extLst>
+                  <a:ext uri="{FF2B5EF4-FFF2-40B4-BE49-F238E27FC236}">
+                    <a16:creationId xmlns:a16="http://schemas.microsoft.com/office/drawing/2014/main" id="{A9AE8EB1-17F0-F40C-EDAC-9F01BD1D91DC}"/>
+                  </a:ext>
+                </a:extLst>
+              </p:cNvPr>
+              <p:cNvSpPr txBox="1"/>
+              <p:nvPr/>
+            </p:nvSpPr>
+            <p:spPr>
+              <a:xfrm>
+                <a:off x="3138948" y="3346168"/>
+                <a:ext cx="329610" cy="830997"/>
+              </a:xfrm>
+              <a:prstGeom prst="rect">
+                <a:avLst/>
+              </a:prstGeom>
+              <a:noFill/>
+            </p:spPr>
+            <p:txBody>
+              <a:bodyPr wrap="square" rtlCol="0">
+                <a:spAutoFit/>
+              </a:bodyPr>
+              <a:lstStyle/>
+              <a:p>
+                <a:r>
+                  <a:rPr lang="en-US" sz="4800" b="1" dirty="0">
+                    <a:solidFill>
+                      <a:srgbClr val="00B050"/>
+                    </a:solidFill>
+                  </a:rPr>
+                  <a:t>G</a:t>
+                </a:r>
+              </a:p>
+            </p:txBody>
+          </p:sp>
+          <p:sp>
+            <p:nvSpPr>
+              <p:cNvPr id="11" name="TextBox 10">
+                <a:extLst>
+                  <a:ext uri="{FF2B5EF4-FFF2-40B4-BE49-F238E27FC236}">
+                    <a16:creationId xmlns:a16="http://schemas.microsoft.com/office/drawing/2014/main" id="{7075A657-5F4C-F6D3-91B9-857745115D02}"/>
+                  </a:ext>
+                </a:extLst>
+              </p:cNvPr>
+              <p:cNvSpPr txBox="1"/>
+              <p:nvPr/>
+            </p:nvSpPr>
+            <p:spPr>
+              <a:xfrm>
+                <a:off x="3957167" y="4273502"/>
+                <a:ext cx="329610" cy="830997"/>
+              </a:xfrm>
+              <a:prstGeom prst="rect">
+                <a:avLst/>
+              </a:prstGeom>
+              <a:noFill/>
+            </p:spPr>
+            <p:txBody>
+              <a:bodyPr wrap="square" rtlCol="0">
+                <a:spAutoFit/>
+              </a:bodyPr>
+              <a:lstStyle/>
+              <a:p>
+                <a:r>
+                  <a:rPr lang="en-US" sz="4800" b="1" dirty="0">
+                    <a:solidFill>
+                      <a:schemeClr val="accent5">
+                        <a:lumMod val="60000"/>
+                        <a:lumOff val="40000"/>
+                      </a:schemeClr>
+                    </a:solidFill>
+                  </a:rPr>
+                  <a:t>B</a:t>
+                </a:r>
+              </a:p>
+            </p:txBody>
+          </p:sp>
+        </p:grpSp>
         <p:sp>
           <p:nvSpPr>
-            <p:cNvPr id="7" name="Rounded Rectangle 6">
+            <p:cNvPr id="12" name="TextBox 11">
               <a:extLst>
                 <a:ext uri="{FF2B5EF4-FFF2-40B4-BE49-F238E27FC236}">
-                  <a16:creationId xmlns:a16="http://schemas.microsoft.com/office/drawing/2014/main" id="{D49EE039-E017-5213-4A1A-5351580CB051}"/>
-                </a:ext>
-              </a:extLst>
-            </p:cNvPr>
-            <p:cNvSpPr/>
-            <p:nvPr/>
-          </p:nvSpPr>
-          <p:spPr>
-            <a:xfrm>
-              <a:off x="1375144" y="1753502"/>
-              <a:ext cx="2520000" cy="2520000"/>
-            </a:xfrm>
-            <a:prstGeom prst="roundRect">
-              <a:avLst/>
-            </a:prstGeom>
-            <a:solidFill>
-              <a:schemeClr val="accent6">
-                <a:lumMod val="20000"/>
-                <a:lumOff val="80000"/>
-              </a:schemeClr>
-            </a:solidFill>
-            <a:ln w="57150">
-              <a:solidFill>
-                <a:srgbClr val="00B050"/>
-              </a:solidFill>
-            </a:ln>
-          </p:spPr>
-          <p:style>
-            <a:lnRef idx="2">
-              <a:schemeClr val="accent1">
-                <a:shade val="15000"/>
-              </a:schemeClr>
-            </a:lnRef>
-            <a:fillRef idx="1">
-              <a:schemeClr val="accent1"/>
-            </a:fillRef>
-            <a:effectRef idx="0">
-              <a:schemeClr val="accent1"/>
-            </a:effectRef>
-            <a:fontRef idx="minor">
-              <a:schemeClr val="lt1"/>
-            </a:fontRef>
-          </p:style>
-          <p:txBody>
-            <a:bodyPr rtlCol="0" anchor="ctr"/>
-            <a:lstStyle/>
-            <a:p>
-              <a:pPr algn="ctr"/>
-              <a:endParaRPr lang="en-US"/>
-            </a:p>
-          </p:txBody>
-        </p:sp>
-        <p:sp>
-          <p:nvSpPr>
-            <p:cNvPr id="8" name="Rounded Rectangle 7">
-              <a:extLst>
-                <a:ext uri="{FF2B5EF4-FFF2-40B4-BE49-F238E27FC236}">
-                  <a16:creationId xmlns:a16="http://schemas.microsoft.com/office/drawing/2014/main" id="{8742CBA3-0C44-97AD-95CB-878B02460A73}"/>
-                </a:ext>
-              </a:extLst>
-            </p:cNvPr>
-            <p:cNvSpPr/>
-            <p:nvPr/>
-          </p:nvSpPr>
-          <p:spPr>
-            <a:xfrm>
-              <a:off x="1601972" y="2008683"/>
-              <a:ext cx="1440000" cy="1440000"/>
-            </a:xfrm>
-            <a:prstGeom prst="roundRect">
-              <a:avLst/>
-            </a:prstGeom>
-            <a:solidFill>
-              <a:schemeClr val="tx2">
-                <a:lumMod val="10000"/>
-                <a:lumOff val="90000"/>
-              </a:schemeClr>
-            </a:solidFill>
-            <a:ln w="57150">
-              <a:solidFill>
-                <a:schemeClr val="tx2">
-                  <a:lumMod val="50000"/>
-                  <a:lumOff val="50000"/>
-                </a:schemeClr>
-              </a:solidFill>
-            </a:ln>
-          </p:spPr>
-          <p:style>
-            <a:lnRef idx="2">
-              <a:schemeClr val="accent1">
-                <a:shade val="15000"/>
-              </a:schemeClr>
-            </a:lnRef>
-            <a:fillRef idx="1">
-              <a:schemeClr val="accent1"/>
-            </a:fillRef>
-            <a:effectRef idx="0">
-              <a:schemeClr val="accent1"/>
-            </a:effectRef>
-            <a:fontRef idx="minor">
-              <a:schemeClr val="lt1"/>
-            </a:fontRef>
-          </p:style>
-          <p:txBody>
-            <a:bodyPr rtlCol="0" anchor="ctr"/>
-            <a:lstStyle/>
-            <a:p>
-              <a:pPr algn="ctr"/>
-              <a:endParaRPr lang="en-US">
-                <a:solidFill>
-                  <a:srgbClr val="0070C0"/>
-                </a:solidFill>
-              </a:endParaRPr>
-            </a:p>
-          </p:txBody>
-        </p:sp>
-        <p:sp>
-          <p:nvSpPr>
-            <p:cNvPr id="9" name="TextBox 8">
-              <a:extLst>
-                <a:ext uri="{FF2B5EF4-FFF2-40B4-BE49-F238E27FC236}">
-                  <a16:creationId xmlns:a16="http://schemas.microsoft.com/office/drawing/2014/main" id="{8C44DAAA-FDD2-46A7-24DD-A60918539CA8}"/>
+                  <a16:creationId xmlns:a16="http://schemas.microsoft.com/office/drawing/2014/main" id="{A246302D-E437-DC9D-B47A-40DF2D83D455}"/>
                 </a:ext>
               </a:extLst>
             </p:cNvPr>
@@ -7277,8 +6829,8 @@
           </p:nvSpPr>
           <p:spPr>
             <a:xfrm>
-              <a:off x="2470339" y="2598003"/>
-              <a:ext cx="329610" cy="830997"/>
+              <a:off x="5608800" y="1859339"/>
+              <a:ext cx="5858539" cy="3416320"/>
             </a:xfrm>
             <a:prstGeom prst="rect">
               <a:avLst/>
@@ -7292,85 +6844,51 @@
             <a:lstStyle/>
             <a:p>
               <a:r>
-                <a:rPr lang="en-US" sz="4800" b="1" dirty="0">
+                <a:rPr lang="en-US" b="1" dirty="0">
                   <a:solidFill>
                     <a:srgbClr val="0070C0"/>
                   </a:solidFill>
                 </a:rPr>
-                <a:t>L</a:t>
+                <a:t>Local scope: </a:t>
               </a:r>
             </a:p>
-          </p:txBody>
-        </p:sp>
-        <p:sp>
-          <p:nvSpPr>
-            <p:cNvPr id="10" name="TextBox 9">
-              <a:extLst>
-                <a:ext uri="{FF2B5EF4-FFF2-40B4-BE49-F238E27FC236}">
-                  <a16:creationId xmlns:a16="http://schemas.microsoft.com/office/drawing/2014/main" id="{A9AE8EB1-17F0-F40C-EDAC-9F01BD1D91DC}"/>
-                </a:ext>
-              </a:extLst>
-            </p:cNvPr>
-            <p:cNvSpPr txBox="1"/>
-            <p:nvPr/>
-          </p:nvSpPr>
-          <p:spPr>
-            <a:xfrm>
-              <a:off x="3138948" y="3346168"/>
-              <a:ext cx="329610" cy="830997"/>
-            </a:xfrm>
-            <a:prstGeom prst="rect">
-              <a:avLst/>
-            </a:prstGeom>
-            <a:noFill/>
-          </p:spPr>
-          <p:txBody>
-            <a:bodyPr wrap="square" rtlCol="0">
-              <a:spAutoFit/>
-            </a:bodyPr>
-            <a:lstStyle/>
             <a:p>
               <a:r>
-                <a:rPr lang="en-US" sz="4800" b="1" dirty="0">
+                <a:rPr lang="en-US" dirty="0"/>
+                <a:t>Names defined within a function and function arguments Accessible within the body of a function</a:t>
+              </a:r>
+            </a:p>
+            <a:p>
+              <a:endParaRPr lang="en-US" dirty="0"/>
+            </a:p>
+            <a:p>
+              <a:r>
+                <a:rPr lang="en-US" b="1" dirty="0">
                   <a:solidFill>
                     <a:srgbClr val="00B050"/>
                   </a:solidFill>
                 </a:rPr>
-                <a:t>G</a:t>
+                <a:t>Global scope: </a:t>
               </a:r>
             </a:p>
-          </p:txBody>
-        </p:sp>
-        <p:sp>
-          <p:nvSpPr>
-            <p:cNvPr id="11" name="TextBox 10">
-              <a:extLst>
-                <a:ext uri="{FF2B5EF4-FFF2-40B4-BE49-F238E27FC236}">
-                  <a16:creationId xmlns:a16="http://schemas.microsoft.com/office/drawing/2014/main" id="{7075A657-5F4C-F6D3-91B9-857745115D02}"/>
-                </a:ext>
-              </a:extLst>
-            </p:cNvPr>
-            <p:cNvSpPr txBox="1"/>
-            <p:nvPr/>
-          </p:nvSpPr>
-          <p:spPr>
-            <a:xfrm>
-              <a:off x="3957167" y="4273502"/>
-              <a:ext cx="329610" cy="830997"/>
-            </a:xfrm>
-            <a:prstGeom prst="rect">
-              <a:avLst/>
-            </a:prstGeom>
-            <a:noFill/>
-          </p:spPr>
-          <p:txBody>
-            <a:bodyPr wrap="square" rtlCol="0">
-              <a:spAutoFit/>
-            </a:bodyPr>
-            <a:lstStyle/>
             <a:p>
               <a:r>
-                <a:rPr lang="en-US" sz="4800" b="1" dirty="0">
+                <a:rPr lang="en-US" dirty="0"/>
+                <a:t>Names defined at the top level of a program</a:t>
+              </a:r>
+            </a:p>
+            <a:p>
+              <a:r>
+                <a:rPr lang="en-US" dirty="0"/>
+                <a:t>Accessible within the body of a file (module) </a:t>
+              </a:r>
+            </a:p>
+            <a:p>
+              <a:endParaRPr lang="en-US" dirty="0"/>
+            </a:p>
+            <a:p>
+              <a:r>
+                <a:rPr lang="en-US" b="1" dirty="0">
                   <a:solidFill>
                     <a:schemeClr val="accent5">
                       <a:lumMod val="60000"/>
@@ -7378,119 +6896,27 @@
                     </a:schemeClr>
                   </a:solidFill>
                 </a:rPr>
-                <a:t>B</a:t>
+                <a:t>Built-in scope:</a:t>
               </a:r>
+            </a:p>
+            <a:p>
+              <a:r>
+                <a:rPr lang="en-US" dirty="0"/>
+                <a:t>Names defined automatically when you run a program</a:t>
+              </a:r>
+            </a:p>
+            <a:p>
+              <a:r>
+                <a:rPr lang="en-US" dirty="0"/>
+                <a:t>Accessible everywhere (e.g. across multiple files)</a:t>
+              </a:r>
+            </a:p>
+            <a:p>
+              <a:endParaRPr lang="en-US" dirty="0"/>
             </a:p>
           </p:txBody>
         </p:sp>
       </p:grpSp>
-      <p:sp>
-        <p:nvSpPr>
-          <p:cNvPr id="12" name="TextBox 11">
-            <a:extLst>
-              <a:ext uri="{FF2B5EF4-FFF2-40B4-BE49-F238E27FC236}">
-                <a16:creationId xmlns:a16="http://schemas.microsoft.com/office/drawing/2014/main" id="{A246302D-E437-DC9D-B47A-40DF2D83D455}"/>
-              </a:ext>
-            </a:extLst>
-          </p:cNvPr>
-          <p:cNvSpPr txBox="1"/>
-          <p:nvPr/>
-        </p:nvSpPr>
-        <p:spPr>
-          <a:xfrm>
-            <a:off x="5608800" y="1859339"/>
-            <a:ext cx="5858539" cy="3416320"/>
-          </a:xfrm>
-          <a:prstGeom prst="rect">
-            <a:avLst/>
-          </a:prstGeom>
-          <a:noFill/>
-        </p:spPr>
-        <p:txBody>
-          <a:bodyPr wrap="square" rtlCol="0">
-            <a:spAutoFit/>
-          </a:bodyPr>
-          <a:lstStyle/>
-          <a:p>
-            <a:r>
-              <a:rPr lang="en-US" b="1" dirty="0">
-                <a:solidFill>
-                  <a:srgbClr val="0070C0"/>
-                </a:solidFill>
-              </a:rPr>
-              <a:t>Local scope: </a:t>
-            </a:r>
-          </a:p>
-          <a:p>
-            <a:r>
-              <a:rPr lang="en-US" dirty="0"/>
-              <a:t>Function arguments and definitions within a function</a:t>
-            </a:r>
-          </a:p>
-          <a:p>
-            <a:r>
-              <a:rPr lang="en-US" dirty="0"/>
-              <a:t>Accessible within the body of a function</a:t>
-            </a:r>
-          </a:p>
-          <a:p>
-            <a:endParaRPr lang="en-US" dirty="0"/>
-          </a:p>
-          <a:p>
-            <a:r>
-              <a:rPr lang="en-US" b="1" dirty="0">
-                <a:solidFill>
-                  <a:srgbClr val="00B050"/>
-                </a:solidFill>
-              </a:rPr>
-              <a:t>Global scope: </a:t>
-            </a:r>
-          </a:p>
-          <a:p>
-            <a:r>
-              <a:rPr lang="en-US" dirty="0"/>
-              <a:t>Names defined at the top level of a program</a:t>
-            </a:r>
-          </a:p>
-          <a:p>
-            <a:r>
-              <a:rPr lang="en-US" dirty="0"/>
-              <a:t>Accessible within the body of a file (module) </a:t>
-            </a:r>
-          </a:p>
-          <a:p>
-            <a:endParaRPr lang="en-US" dirty="0"/>
-          </a:p>
-          <a:p>
-            <a:r>
-              <a:rPr lang="en-US" b="1" dirty="0">
-                <a:solidFill>
-                  <a:schemeClr val="accent5">
-                    <a:lumMod val="60000"/>
-                    <a:lumOff val="40000"/>
-                  </a:schemeClr>
-                </a:solidFill>
-              </a:rPr>
-              <a:t>Built-in scope:</a:t>
-            </a:r>
-          </a:p>
-          <a:p>
-            <a:r>
-              <a:rPr lang="en-US" dirty="0"/>
-              <a:t>Names defined automatically when you run a program</a:t>
-            </a:r>
-          </a:p>
-          <a:p>
-            <a:r>
-              <a:rPr lang="en-US" dirty="0"/>
-              <a:t>Accessible everywhere (e.g. across multiple files)</a:t>
-            </a:r>
-          </a:p>
-          <a:p>
-            <a:endParaRPr lang="en-US" dirty="0"/>
-          </a:p>
-        </p:txBody>
-      </p:sp>
       <p:sp>
         <p:nvSpPr>
           <p:cNvPr id="13" name="TextBox 12">

</xml_diff>